<commit_message>
build based on e39b962
</commit_message>
<xml_diff>
--- a/latest/assets/figures.pptx
+++ b/latest/assets/figures.pptx
@@ -6,6 +6,7 @@
   </p:sldMasterIdLst>
   <p:sldIdLst>
     <p:sldId id="256" r:id="rId2"/>
+    <p:sldId id="257" r:id="rId3"/>
   </p:sldIdLst>
   <p:sldSz cx="9144000" cy="6858000" type="screen4x3"/>
   <p:notesSz cx="6858000" cy="9144000"/>
@@ -254,7 +255,7 @@
           <a:p>
             <a:fld id="{B22DF019-3CA4-4DC1-8436-443526D0032F}" type="datetimeFigureOut">
               <a:rPr kumimoji="1" lang="ja-JP" altLang="en-US" smtClean="0"/>
-              <a:t>2016/3/29</a:t>
+              <a:t>2016/3/30</a:t>
             </a:fld>
             <a:endParaRPr kumimoji="1" lang="ja-JP" altLang="en-US"/>
           </a:p>
@@ -456,7 +457,7 @@
           <a:p>
             <a:fld id="{B22DF019-3CA4-4DC1-8436-443526D0032F}" type="datetimeFigureOut">
               <a:rPr kumimoji="1" lang="ja-JP" altLang="en-US" smtClean="0"/>
-              <a:t>2016/3/29</a:t>
+              <a:t>2016/3/30</a:t>
             </a:fld>
             <a:endParaRPr kumimoji="1" lang="ja-JP" altLang="en-US"/>
           </a:p>
@@ -668,7 +669,7 @@
           <a:p>
             <a:fld id="{B22DF019-3CA4-4DC1-8436-443526D0032F}" type="datetimeFigureOut">
               <a:rPr kumimoji="1" lang="ja-JP" altLang="en-US" smtClean="0"/>
-              <a:t>2016/3/29</a:t>
+              <a:t>2016/3/30</a:t>
             </a:fld>
             <a:endParaRPr kumimoji="1" lang="ja-JP" altLang="en-US"/>
           </a:p>
@@ -870,7 +871,7 @@
           <a:p>
             <a:fld id="{B22DF019-3CA4-4DC1-8436-443526D0032F}" type="datetimeFigureOut">
               <a:rPr kumimoji="1" lang="ja-JP" altLang="en-US" smtClean="0"/>
-              <a:t>2016/3/29</a:t>
+              <a:t>2016/3/30</a:t>
             </a:fld>
             <a:endParaRPr kumimoji="1" lang="ja-JP" altLang="en-US"/>
           </a:p>
@@ -1114,7 +1115,7 @@
           <a:p>
             <a:fld id="{B22DF019-3CA4-4DC1-8436-443526D0032F}" type="datetimeFigureOut">
               <a:rPr kumimoji="1" lang="ja-JP" altLang="en-US" smtClean="0"/>
-              <a:t>2016/3/29</a:t>
+              <a:t>2016/3/30</a:t>
             </a:fld>
             <a:endParaRPr kumimoji="1" lang="ja-JP" altLang="en-US"/>
           </a:p>
@@ -1410,7 +1411,7 @@
           <a:p>
             <a:fld id="{B22DF019-3CA4-4DC1-8436-443526D0032F}" type="datetimeFigureOut">
               <a:rPr kumimoji="1" lang="ja-JP" altLang="en-US" smtClean="0"/>
-              <a:t>2016/3/29</a:t>
+              <a:t>2016/3/30</a:t>
             </a:fld>
             <a:endParaRPr kumimoji="1" lang="ja-JP" altLang="en-US"/>
           </a:p>
@@ -1841,7 +1842,7 @@
           <a:p>
             <a:fld id="{B22DF019-3CA4-4DC1-8436-443526D0032F}" type="datetimeFigureOut">
               <a:rPr kumimoji="1" lang="ja-JP" altLang="en-US" smtClean="0"/>
-              <a:t>2016/3/29</a:t>
+              <a:t>2016/3/30</a:t>
             </a:fld>
             <a:endParaRPr kumimoji="1" lang="ja-JP" altLang="en-US"/>
           </a:p>
@@ -1959,7 +1960,7 @@
           <a:p>
             <a:fld id="{B22DF019-3CA4-4DC1-8436-443526D0032F}" type="datetimeFigureOut">
               <a:rPr kumimoji="1" lang="ja-JP" altLang="en-US" smtClean="0"/>
-              <a:t>2016/3/29</a:t>
+              <a:t>2016/3/30</a:t>
             </a:fld>
             <a:endParaRPr kumimoji="1" lang="ja-JP" altLang="en-US"/>
           </a:p>
@@ -2054,7 +2055,7 @@
           <a:p>
             <a:fld id="{B22DF019-3CA4-4DC1-8436-443526D0032F}" type="datetimeFigureOut">
               <a:rPr kumimoji="1" lang="ja-JP" altLang="en-US" smtClean="0"/>
-              <a:t>2016/3/29</a:t>
+              <a:t>2016/3/30</a:t>
             </a:fld>
             <a:endParaRPr kumimoji="1" lang="ja-JP" altLang="en-US"/>
           </a:p>
@@ -2363,7 +2364,7 @@
           <a:p>
             <a:fld id="{B22DF019-3CA4-4DC1-8436-443526D0032F}" type="datetimeFigureOut">
               <a:rPr kumimoji="1" lang="ja-JP" altLang="en-US" smtClean="0"/>
-              <a:t>2016/3/29</a:t>
+              <a:t>2016/3/30</a:t>
             </a:fld>
             <a:endParaRPr kumimoji="1" lang="ja-JP" altLang="en-US"/>
           </a:p>
@@ -2620,7 +2621,7 @@
           <a:p>
             <a:fld id="{B22DF019-3CA4-4DC1-8436-443526D0032F}" type="datetimeFigureOut">
               <a:rPr kumimoji="1" lang="ja-JP" altLang="en-US" smtClean="0"/>
-              <a:t>2016/3/29</a:t>
+              <a:t>2016/3/30</a:t>
             </a:fld>
             <a:endParaRPr kumimoji="1" lang="ja-JP" altLang="en-US"/>
           </a:p>
@@ -2865,7 +2866,7 @@
           <a:p>
             <a:fld id="{B22DF019-3CA4-4DC1-8436-443526D0032F}" type="datetimeFigureOut">
               <a:rPr kumimoji="1" lang="ja-JP" altLang="en-US" smtClean="0"/>
-              <a:t>2016/3/29</a:t>
+              <a:t>2016/3/30</a:t>
             </a:fld>
             <a:endParaRPr kumimoji="1" lang="ja-JP" altLang="en-US"/>
           </a:p>
@@ -3284,101 +3285,11 @@
           <a:prstGeom prst="rect">
             <a:avLst/>
           </a:prstGeom>
-        </p:spPr>
-        <p:style>
-          <a:lnRef idx="2">
-            <a:schemeClr val="accent1">
-              <a:shade val="50000"/>
-            </a:schemeClr>
-          </a:lnRef>
-          <a:fillRef idx="1">
-            <a:schemeClr val="accent1"/>
-          </a:fillRef>
-          <a:effectRef idx="0">
-            <a:schemeClr val="accent1"/>
-          </a:effectRef>
-          <a:fontRef idx="minor">
-            <a:schemeClr val="lt1"/>
-          </a:fontRef>
-        </p:style>
-        <p:txBody>
-          <a:bodyPr rtlCol="0" anchor="ctr"/>
-          <a:lstStyle/>
-          <a:p>
-            <a:pPr algn="ctr"/>
-            <a:r>
-              <a:rPr kumimoji="1" lang="en-US" altLang="ja-JP" sz="2400" dirty="0" smtClean="0"/>
-              <a:t>W</a:t>
-            </a:r>
-            <a:endParaRPr kumimoji="1" lang="ja-JP" altLang="en-US" sz="2400" dirty="0"/>
-          </a:p>
-        </p:txBody>
-      </p:sp>
-      <p:sp>
-        <p:nvSpPr>
-          <p:cNvPr id="6" name="正方形/長方形 5"/>
-          <p:cNvSpPr/>
-          <p:nvPr/>
-        </p:nvSpPr>
-        <p:spPr>
-          <a:xfrm>
-            <a:off x="3863790" y="1011218"/>
-            <a:ext cx="522506" cy="1247887"/>
-          </a:xfrm>
-          <a:prstGeom prst="rect">
-            <a:avLst/>
-          </a:prstGeom>
-        </p:spPr>
-        <p:style>
-          <a:lnRef idx="2">
-            <a:schemeClr val="accent1">
-              <a:shade val="50000"/>
-            </a:schemeClr>
-          </a:lnRef>
-          <a:fillRef idx="1">
-            <a:schemeClr val="accent1"/>
-          </a:fillRef>
-          <a:effectRef idx="0">
-            <a:schemeClr val="accent1"/>
-          </a:effectRef>
-          <a:fontRef idx="minor">
-            <a:schemeClr val="lt1"/>
-          </a:fontRef>
-        </p:style>
-        <p:txBody>
-          <a:bodyPr rtlCol="0" anchor="ctr"/>
-          <a:lstStyle/>
-          <a:p>
-            <a:pPr algn="ctr"/>
-            <a:r>
-              <a:rPr kumimoji="1" lang="en-US" altLang="ja-JP" sz="2400" dirty="0" smtClean="0"/>
-              <a:t>x</a:t>
-            </a:r>
-            <a:endParaRPr kumimoji="1" lang="ja-JP" altLang="en-US" sz="2400" dirty="0"/>
-          </a:p>
-        </p:txBody>
-      </p:sp>
-      <p:sp>
-        <p:nvSpPr>
-          <p:cNvPr id="7" name="正方形/長方形 6"/>
-          <p:cNvSpPr/>
-          <p:nvPr/>
-        </p:nvSpPr>
-        <p:spPr>
-          <a:xfrm>
-            <a:off x="1140310" y="1269402"/>
-            <a:ext cx="522506" cy="731520"/>
-          </a:xfrm>
-          <a:prstGeom prst="rect">
-            <a:avLst/>
-          </a:prstGeom>
           <a:solidFill>
-            <a:srgbClr val="92D050"/>
+            <a:srgbClr val="C00000"/>
           </a:solidFill>
-          <a:ln w="25400">
-            <a:solidFill>
-              <a:srgbClr val="00B050"/>
-            </a:solidFill>
+          <a:ln>
+            <a:noFill/>
           </a:ln>
         </p:spPr>
         <p:style>
@@ -3403,8 +3314,8 @@
           <a:p>
             <a:pPr algn="ctr"/>
             <a:r>
-              <a:rPr lang="en-US" altLang="ja-JP" sz="2400" dirty="0"/>
-              <a:t>y</a:t>
+              <a:rPr kumimoji="1" lang="en-US" altLang="ja-JP" sz="2400" dirty="0" smtClean="0"/>
+              <a:t>W</a:t>
             </a:r>
             <a:endParaRPr kumimoji="1" lang="ja-JP" altLang="en-US" sz="2400" dirty="0"/>
           </a:p>
@@ -3412,18 +3323,24 @@
       </p:sp>
       <p:sp>
         <p:nvSpPr>
-          <p:cNvPr id="8" name="正方形/長方形 7"/>
+          <p:cNvPr id="6" name="正方形/長方形 5"/>
           <p:cNvSpPr/>
           <p:nvPr/>
         </p:nvSpPr>
         <p:spPr>
           <a:xfrm>
-            <a:off x="5014943" y="1245768"/>
-            <a:ext cx="276918" cy="731520"/>
+            <a:off x="3863790" y="1011218"/>
+            <a:ext cx="522506" cy="1247887"/>
           </a:xfrm>
           <a:prstGeom prst="rect">
             <a:avLst/>
           </a:prstGeom>
+          <a:solidFill>
+            <a:srgbClr val="00B0F0"/>
+          </a:solidFill>
+          <a:ln>
+            <a:noFill/>
+          </a:ln>
         </p:spPr>
         <p:style>
           <a:lnRef idx="2">
@@ -3448,6 +3365,106 @@
             <a:pPr algn="ctr"/>
             <a:r>
               <a:rPr kumimoji="1" lang="en-US" altLang="ja-JP" sz="2400" dirty="0" smtClean="0"/>
+              <a:t>x</a:t>
+            </a:r>
+            <a:endParaRPr kumimoji="1" lang="ja-JP" altLang="en-US" sz="2400" dirty="0"/>
+          </a:p>
+        </p:txBody>
+      </p:sp>
+      <p:sp>
+        <p:nvSpPr>
+          <p:cNvPr id="7" name="正方形/長方形 6"/>
+          <p:cNvSpPr/>
+          <p:nvPr/>
+        </p:nvSpPr>
+        <p:spPr>
+          <a:xfrm>
+            <a:off x="1140310" y="1269402"/>
+            <a:ext cx="522506" cy="731520"/>
+          </a:xfrm>
+          <a:prstGeom prst="rect">
+            <a:avLst/>
+          </a:prstGeom>
+          <a:solidFill>
+            <a:srgbClr val="92D050"/>
+          </a:solidFill>
+          <a:ln w="25400">
+            <a:noFill/>
+          </a:ln>
+        </p:spPr>
+        <p:style>
+          <a:lnRef idx="2">
+            <a:schemeClr val="accent1">
+              <a:shade val="50000"/>
+            </a:schemeClr>
+          </a:lnRef>
+          <a:fillRef idx="1">
+            <a:schemeClr val="accent1"/>
+          </a:fillRef>
+          <a:effectRef idx="0">
+            <a:schemeClr val="accent1"/>
+          </a:effectRef>
+          <a:fontRef idx="minor">
+            <a:schemeClr val="lt1"/>
+          </a:fontRef>
+        </p:style>
+        <p:txBody>
+          <a:bodyPr rtlCol="0" anchor="ctr"/>
+          <a:lstStyle/>
+          <a:p>
+            <a:pPr algn="ctr"/>
+            <a:r>
+              <a:rPr lang="en-US" altLang="ja-JP" sz="2400" dirty="0"/>
+              <a:t>y</a:t>
+            </a:r>
+            <a:endParaRPr kumimoji="1" lang="ja-JP" altLang="en-US" sz="2400" dirty="0"/>
+          </a:p>
+        </p:txBody>
+      </p:sp>
+      <p:sp>
+        <p:nvSpPr>
+          <p:cNvPr id="8" name="正方形/長方形 7"/>
+          <p:cNvSpPr/>
+          <p:nvPr/>
+        </p:nvSpPr>
+        <p:spPr>
+          <a:xfrm>
+            <a:off x="5014943" y="1245768"/>
+            <a:ext cx="276918" cy="731520"/>
+          </a:xfrm>
+          <a:prstGeom prst="rect">
+            <a:avLst/>
+          </a:prstGeom>
+          <a:solidFill>
+            <a:srgbClr val="C00000"/>
+          </a:solidFill>
+          <a:ln>
+            <a:noFill/>
+          </a:ln>
+        </p:spPr>
+        <p:style>
+          <a:lnRef idx="2">
+            <a:schemeClr val="accent1">
+              <a:shade val="50000"/>
+            </a:schemeClr>
+          </a:lnRef>
+          <a:fillRef idx="1">
+            <a:schemeClr val="accent1"/>
+          </a:fillRef>
+          <a:effectRef idx="0">
+            <a:schemeClr val="accent1"/>
+          </a:effectRef>
+          <a:fontRef idx="minor">
+            <a:schemeClr val="lt1"/>
+          </a:fontRef>
+        </p:style>
+        <p:txBody>
+          <a:bodyPr rtlCol="0" anchor="ctr"/>
+          <a:lstStyle/>
+          <a:p>
+            <a:pPr algn="ctr"/>
+            <a:r>
+              <a:rPr kumimoji="1" lang="en-US" altLang="ja-JP" sz="2400" dirty="0" smtClean="0"/>
               <a:t>b</a:t>
             </a:r>
             <a:endParaRPr kumimoji="1" lang="ja-JP" altLang="en-US" sz="2400" dirty="0"/>
@@ -3518,6 +3535,721 @@
     <p:extLst>
       <p:ext uri="{BB962C8B-B14F-4D97-AF65-F5344CB8AC3E}">
         <p14:creationId xmlns:p14="http://schemas.microsoft.com/office/powerpoint/2010/main" val="1679567099"/>
+      </p:ext>
+    </p:extLst>
+  </p:cSld>
+  <p:clrMapOvr>
+    <a:masterClrMapping/>
+  </p:clrMapOvr>
+  <p:timing>
+    <p:tnLst>
+      <p:par>
+        <p:cTn id="1" dur="indefinite" restart="never" nodeType="tmRoot"/>
+      </p:par>
+    </p:tnLst>
+  </p:timing>
+</p:sld>
+</file>
+
+<file path=ppt/slides/slide2.xml><?xml version="1.0" encoding="utf-8"?>
+<p:sld xmlns:a="http://schemas.openxmlformats.org/drawingml/2006/main" xmlns:r="http://schemas.openxmlformats.org/officeDocument/2006/relationships" xmlns:p="http://schemas.openxmlformats.org/presentationml/2006/main">
+  <p:cSld>
+    <p:spTree>
+      <p:nvGrpSpPr>
+        <p:cNvPr id="1" name=""/>
+        <p:cNvGrpSpPr/>
+        <p:nvPr/>
+      </p:nvGrpSpPr>
+      <p:grpSpPr>
+        <a:xfrm>
+          <a:off x="0" y="0"/>
+          <a:ext cx="0" cy="0"/>
+          <a:chOff x="0" y="0"/>
+          <a:chExt cx="0" cy="0"/>
+        </a:xfrm>
+      </p:grpSpPr>
+      <p:sp>
+        <p:nvSpPr>
+          <p:cNvPr id="9" name="正方形/長方形 8"/>
+          <p:cNvSpPr/>
+          <p:nvPr/>
+        </p:nvSpPr>
+        <p:spPr>
+          <a:xfrm>
+            <a:off x="980740" y="2280621"/>
+            <a:ext cx="1439730" cy="441063"/>
+          </a:xfrm>
+          <a:prstGeom prst="rect">
+            <a:avLst/>
+          </a:prstGeom>
+          <a:solidFill>
+            <a:srgbClr val="00B0F0"/>
+          </a:solidFill>
+          <a:ln>
+            <a:noFill/>
+          </a:ln>
+        </p:spPr>
+        <p:style>
+          <a:lnRef idx="2">
+            <a:schemeClr val="accent1">
+              <a:shade val="50000"/>
+            </a:schemeClr>
+          </a:lnRef>
+          <a:fillRef idx="1">
+            <a:schemeClr val="accent1"/>
+          </a:fillRef>
+          <a:effectRef idx="0">
+            <a:schemeClr val="accent1"/>
+          </a:effectRef>
+          <a:fontRef idx="minor">
+            <a:schemeClr val="lt1"/>
+          </a:fontRef>
+        </p:style>
+        <p:txBody>
+          <a:bodyPr rtlCol="0" anchor="ctr"/>
+          <a:lstStyle/>
+          <a:p>
+            <a:pPr algn="ctr"/>
+            <a:r>
+              <a:rPr kumimoji="1" lang="en-US" altLang="ja-JP" sz="2400" dirty="0" smtClean="0"/>
+              <a:t>f1</a:t>
+            </a:r>
+            <a:endParaRPr kumimoji="1" lang="ja-JP" altLang="en-US" sz="2400" dirty="0"/>
+          </a:p>
+        </p:txBody>
+      </p:sp>
+      <p:sp>
+        <p:nvSpPr>
+          <p:cNvPr id="10" name="正方形/長方形 9"/>
+          <p:cNvSpPr/>
+          <p:nvPr/>
+        </p:nvSpPr>
+        <p:spPr>
+          <a:xfrm>
+            <a:off x="980740" y="1421802"/>
+            <a:ext cx="1439730" cy="441063"/>
+          </a:xfrm>
+          <a:prstGeom prst="rect">
+            <a:avLst/>
+          </a:prstGeom>
+          <a:solidFill>
+            <a:srgbClr val="00B0F0"/>
+          </a:solidFill>
+          <a:ln>
+            <a:noFill/>
+          </a:ln>
+        </p:spPr>
+        <p:style>
+          <a:lnRef idx="2">
+            <a:schemeClr val="accent1">
+              <a:shade val="50000"/>
+            </a:schemeClr>
+          </a:lnRef>
+          <a:fillRef idx="1">
+            <a:schemeClr val="accent1"/>
+          </a:fillRef>
+          <a:effectRef idx="0">
+            <a:schemeClr val="accent1"/>
+          </a:effectRef>
+          <a:fontRef idx="minor">
+            <a:schemeClr val="lt1"/>
+          </a:fontRef>
+        </p:style>
+        <p:txBody>
+          <a:bodyPr rtlCol="0" anchor="ctr"/>
+          <a:lstStyle/>
+          <a:p>
+            <a:pPr algn="ctr"/>
+            <a:r>
+              <a:rPr kumimoji="1" lang="en-US" altLang="ja-JP" sz="2400" dirty="0" smtClean="0"/>
+              <a:t>f2</a:t>
+            </a:r>
+            <a:endParaRPr kumimoji="1" lang="ja-JP" altLang="en-US" sz="2400" dirty="0"/>
+          </a:p>
+        </p:txBody>
+      </p:sp>
+      <p:cxnSp>
+        <p:nvCxnSpPr>
+          <p:cNvPr id="3" name="直線矢印コネクタ 2"/>
+          <p:cNvCxnSpPr>
+            <a:stCxn id="9" idx="0"/>
+            <a:endCxn id="10" idx="2"/>
+          </p:cNvCxnSpPr>
+          <p:nvPr/>
+        </p:nvCxnSpPr>
+        <p:spPr>
+          <a:xfrm flipV="1">
+            <a:off x="1700605" y="1862865"/>
+            <a:ext cx="0" cy="417756"/>
+          </a:xfrm>
+          <a:prstGeom prst="straightConnector1">
+            <a:avLst/>
+          </a:prstGeom>
+          <a:ln w="31750">
+            <a:solidFill>
+              <a:schemeClr val="tx1"/>
+            </a:solidFill>
+            <a:tailEnd type="triangle"/>
+          </a:ln>
+        </p:spPr>
+        <p:style>
+          <a:lnRef idx="1">
+            <a:schemeClr val="accent1"/>
+          </a:lnRef>
+          <a:fillRef idx="0">
+            <a:schemeClr val="accent1"/>
+          </a:fillRef>
+          <a:effectRef idx="0">
+            <a:schemeClr val="accent1"/>
+          </a:effectRef>
+          <a:fontRef idx="minor">
+            <a:schemeClr val="tx1"/>
+          </a:fontRef>
+        </p:style>
+      </p:cxnSp>
+      <p:sp>
+        <p:nvSpPr>
+          <p:cNvPr id="14" name="正方形/長方形 13"/>
+          <p:cNvSpPr/>
+          <p:nvPr/>
+        </p:nvSpPr>
+        <p:spPr>
+          <a:xfrm>
+            <a:off x="980740" y="556708"/>
+            <a:ext cx="1439730" cy="441063"/>
+          </a:xfrm>
+          <a:prstGeom prst="rect">
+            <a:avLst/>
+          </a:prstGeom>
+          <a:solidFill>
+            <a:srgbClr val="00B0F0"/>
+          </a:solidFill>
+          <a:ln>
+            <a:noFill/>
+          </a:ln>
+        </p:spPr>
+        <p:style>
+          <a:lnRef idx="2">
+            <a:schemeClr val="accent1">
+              <a:shade val="50000"/>
+            </a:schemeClr>
+          </a:lnRef>
+          <a:fillRef idx="1">
+            <a:schemeClr val="accent1"/>
+          </a:fillRef>
+          <a:effectRef idx="0">
+            <a:schemeClr val="accent1"/>
+          </a:effectRef>
+          <a:fontRef idx="minor">
+            <a:schemeClr val="lt1"/>
+          </a:fontRef>
+        </p:style>
+        <p:txBody>
+          <a:bodyPr rtlCol="0" anchor="ctr"/>
+          <a:lstStyle/>
+          <a:p>
+            <a:pPr algn="ctr"/>
+            <a:r>
+              <a:rPr kumimoji="1" lang="en-US" altLang="ja-JP" sz="2400" dirty="0" smtClean="0"/>
+              <a:t>f3</a:t>
+            </a:r>
+            <a:endParaRPr kumimoji="1" lang="ja-JP" altLang="en-US" sz="2400" dirty="0"/>
+          </a:p>
+        </p:txBody>
+      </p:sp>
+      <p:cxnSp>
+        <p:nvCxnSpPr>
+          <p:cNvPr id="15" name="直線矢印コネクタ 14"/>
+          <p:cNvCxnSpPr>
+            <a:stCxn id="10" idx="0"/>
+            <a:endCxn id="14" idx="2"/>
+          </p:cNvCxnSpPr>
+          <p:nvPr/>
+        </p:nvCxnSpPr>
+        <p:spPr>
+          <a:xfrm flipV="1">
+            <a:off x="1700605" y="997771"/>
+            <a:ext cx="0" cy="424031"/>
+          </a:xfrm>
+          <a:prstGeom prst="straightConnector1">
+            <a:avLst/>
+          </a:prstGeom>
+          <a:ln w="31750">
+            <a:solidFill>
+              <a:schemeClr val="tx1"/>
+            </a:solidFill>
+            <a:tailEnd type="triangle"/>
+          </a:ln>
+        </p:spPr>
+        <p:style>
+          <a:lnRef idx="1">
+            <a:schemeClr val="accent1"/>
+          </a:lnRef>
+          <a:fillRef idx="0">
+            <a:schemeClr val="accent1"/>
+          </a:fillRef>
+          <a:effectRef idx="0">
+            <a:schemeClr val="accent1"/>
+          </a:effectRef>
+          <a:fontRef idx="minor">
+            <a:schemeClr val="tx1"/>
+          </a:fontRef>
+        </p:style>
+      </p:cxnSp>
+      <p:sp>
+        <p:nvSpPr>
+          <p:cNvPr id="16" name="正方形/長方形 15"/>
+          <p:cNvSpPr/>
+          <p:nvPr/>
+        </p:nvSpPr>
+        <p:spPr>
+          <a:xfrm>
+            <a:off x="6006355" y="4436632"/>
+            <a:ext cx="1439730" cy="441063"/>
+          </a:xfrm>
+          <a:prstGeom prst="rect">
+            <a:avLst/>
+          </a:prstGeom>
+          <a:solidFill>
+            <a:srgbClr val="00B0F0"/>
+          </a:solidFill>
+          <a:ln>
+            <a:noFill/>
+          </a:ln>
+        </p:spPr>
+        <p:style>
+          <a:lnRef idx="2">
+            <a:schemeClr val="accent1">
+              <a:shade val="50000"/>
+            </a:schemeClr>
+          </a:lnRef>
+          <a:fillRef idx="1">
+            <a:schemeClr val="accent1"/>
+          </a:fillRef>
+          <a:effectRef idx="0">
+            <a:schemeClr val="accent1"/>
+          </a:effectRef>
+          <a:fontRef idx="minor">
+            <a:schemeClr val="lt1"/>
+          </a:fontRef>
+        </p:style>
+        <p:txBody>
+          <a:bodyPr rtlCol="0" anchor="ctr"/>
+          <a:lstStyle/>
+          <a:p>
+            <a:pPr algn="ctr"/>
+            <a:r>
+              <a:rPr kumimoji="1" lang="en-US" altLang="ja-JP" sz="2400" dirty="0" smtClean="0"/>
+              <a:t>f1</a:t>
+            </a:r>
+            <a:endParaRPr kumimoji="1" lang="ja-JP" altLang="en-US" sz="2400" dirty="0"/>
+          </a:p>
+        </p:txBody>
+      </p:sp>
+      <p:sp>
+        <p:nvSpPr>
+          <p:cNvPr id="17" name="正方形/長方形 16"/>
+          <p:cNvSpPr/>
+          <p:nvPr/>
+        </p:nvSpPr>
+        <p:spPr>
+          <a:xfrm>
+            <a:off x="4969588" y="3602911"/>
+            <a:ext cx="1439730" cy="441063"/>
+          </a:xfrm>
+          <a:prstGeom prst="rect">
+            <a:avLst/>
+          </a:prstGeom>
+          <a:solidFill>
+            <a:srgbClr val="00B0F0"/>
+          </a:solidFill>
+          <a:ln>
+            <a:noFill/>
+          </a:ln>
+        </p:spPr>
+        <p:style>
+          <a:lnRef idx="2">
+            <a:schemeClr val="accent1">
+              <a:shade val="50000"/>
+            </a:schemeClr>
+          </a:lnRef>
+          <a:fillRef idx="1">
+            <a:schemeClr val="accent1"/>
+          </a:fillRef>
+          <a:effectRef idx="0">
+            <a:schemeClr val="accent1"/>
+          </a:effectRef>
+          <a:fontRef idx="minor">
+            <a:schemeClr val="lt1"/>
+          </a:fontRef>
+        </p:style>
+        <p:txBody>
+          <a:bodyPr rtlCol="0" anchor="ctr"/>
+          <a:lstStyle/>
+          <a:p>
+            <a:pPr algn="ctr"/>
+            <a:r>
+              <a:rPr kumimoji="1" lang="en-US" altLang="ja-JP" sz="2400" dirty="0" smtClean="0"/>
+              <a:t>f2</a:t>
+            </a:r>
+            <a:endParaRPr kumimoji="1" lang="ja-JP" altLang="en-US" sz="2400" dirty="0"/>
+          </a:p>
+        </p:txBody>
+      </p:sp>
+      <p:cxnSp>
+        <p:nvCxnSpPr>
+          <p:cNvPr id="18" name="直線矢印コネクタ 17"/>
+          <p:cNvCxnSpPr>
+            <a:stCxn id="16" idx="0"/>
+            <a:endCxn id="17" idx="2"/>
+          </p:cNvCxnSpPr>
+          <p:nvPr/>
+        </p:nvCxnSpPr>
+        <p:spPr>
+          <a:xfrm flipH="1" flipV="1">
+            <a:off x="5689453" y="4043974"/>
+            <a:ext cx="1036767" cy="392658"/>
+          </a:xfrm>
+          <a:prstGeom prst="straightConnector1">
+            <a:avLst/>
+          </a:prstGeom>
+          <a:ln w="31750">
+            <a:solidFill>
+              <a:schemeClr val="tx1"/>
+            </a:solidFill>
+            <a:headEnd type="none"/>
+            <a:tailEnd type="triangle"/>
+          </a:ln>
+        </p:spPr>
+        <p:style>
+          <a:lnRef idx="1">
+            <a:schemeClr val="accent1"/>
+          </a:lnRef>
+          <a:fillRef idx="0">
+            <a:schemeClr val="accent1"/>
+          </a:fillRef>
+          <a:effectRef idx="0">
+            <a:schemeClr val="accent1"/>
+          </a:effectRef>
+          <a:fontRef idx="minor">
+            <a:schemeClr val="tx1"/>
+          </a:fontRef>
+        </p:style>
+      </p:cxnSp>
+      <p:sp>
+        <p:nvSpPr>
+          <p:cNvPr id="19" name="正方形/長方形 18"/>
+          <p:cNvSpPr/>
+          <p:nvPr/>
+        </p:nvSpPr>
+        <p:spPr>
+          <a:xfrm>
+            <a:off x="4969588" y="2720785"/>
+            <a:ext cx="1439730" cy="441063"/>
+          </a:xfrm>
+          <a:prstGeom prst="rect">
+            <a:avLst/>
+          </a:prstGeom>
+          <a:solidFill>
+            <a:srgbClr val="00B0F0"/>
+          </a:solidFill>
+          <a:ln>
+            <a:noFill/>
+          </a:ln>
+        </p:spPr>
+        <p:style>
+          <a:lnRef idx="2">
+            <a:schemeClr val="accent1">
+              <a:shade val="50000"/>
+            </a:schemeClr>
+          </a:lnRef>
+          <a:fillRef idx="1">
+            <a:schemeClr val="accent1"/>
+          </a:fillRef>
+          <a:effectRef idx="0">
+            <a:schemeClr val="accent1"/>
+          </a:effectRef>
+          <a:fontRef idx="minor">
+            <a:schemeClr val="lt1"/>
+          </a:fontRef>
+        </p:style>
+        <p:txBody>
+          <a:bodyPr rtlCol="0" anchor="ctr"/>
+          <a:lstStyle/>
+          <a:p>
+            <a:pPr algn="ctr"/>
+            <a:r>
+              <a:rPr kumimoji="1" lang="en-US" altLang="ja-JP" sz="2400" dirty="0" smtClean="0"/>
+              <a:t>f3</a:t>
+            </a:r>
+            <a:endParaRPr kumimoji="1" lang="ja-JP" altLang="en-US" sz="2400" dirty="0"/>
+          </a:p>
+        </p:txBody>
+      </p:sp>
+      <p:cxnSp>
+        <p:nvCxnSpPr>
+          <p:cNvPr id="20" name="直線矢印コネクタ 19"/>
+          <p:cNvCxnSpPr>
+            <a:stCxn id="17" idx="0"/>
+            <a:endCxn id="19" idx="2"/>
+          </p:cNvCxnSpPr>
+          <p:nvPr/>
+        </p:nvCxnSpPr>
+        <p:spPr>
+          <a:xfrm flipV="1">
+            <a:off x="5689453" y="3161848"/>
+            <a:ext cx="0" cy="441063"/>
+          </a:xfrm>
+          <a:prstGeom prst="straightConnector1">
+            <a:avLst/>
+          </a:prstGeom>
+          <a:ln w="31750">
+            <a:solidFill>
+              <a:schemeClr val="tx1"/>
+            </a:solidFill>
+            <a:headEnd type="none"/>
+            <a:tailEnd type="triangle"/>
+          </a:ln>
+        </p:spPr>
+        <p:style>
+          <a:lnRef idx="1">
+            <a:schemeClr val="accent1"/>
+          </a:lnRef>
+          <a:fillRef idx="0">
+            <a:schemeClr val="accent1"/>
+          </a:fillRef>
+          <a:effectRef idx="0">
+            <a:schemeClr val="accent1"/>
+          </a:effectRef>
+          <a:fontRef idx="minor">
+            <a:schemeClr val="tx1"/>
+          </a:fontRef>
+        </p:style>
+      </p:cxnSp>
+      <p:sp>
+        <p:nvSpPr>
+          <p:cNvPr id="22" name="正方形/長方形 21"/>
+          <p:cNvSpPr/>
+          <p:nvPr/>
+        </p:nvSpPr>
+        <p:spPr>
+          <a:xfrm>
+            <a:off x="7037294" y="3602910"/>
+            <a:ext cx="1439730" cy="441063"/>
+          </a:xfrm>
+          <a:prstGeom prst="rect">
+            <a:avLst/>
+          </a:prstGeom>
+          <a:solidFill>
+            <a:srgbClr val="00B0F0"/>
+          </a:solidFill>
+          <a:ln>
+            <a:noFill/>
+          </a:ln>
+        </p:spPr>
+        <p:style>
+          <a:lnRef idx="2">
+            <a:schemeClr val="accent1">
+              <a:shade val="50000"/>
+            </a:schemeClr>
+          </a:lnRef>
+          <a:fillRef idx="1">
+            <a:schemeClr val="accent1"/>
+          </a:fillRef>
+          <a:effectRef idx="0">
+            <a:schemeClr val="accent1"/>
+          </a:effectRef>
+          <a:fontRef idx="minor">
+            <a:schemeClr val="lt1"/>
+          </a:fontRef>
+        </p:style>
+        <p:txBody>
+          <a:bodyPr rtlCol="0" anchor="ctr"/>
+          <a:lstStyle/>
+          <a:p>
+            <a:pPr algn="ctr"/>
+            <a:r>
+              <a:rPr kumimoji="1" lang="en-US" altLang="ja-JP" sz="2400" dirty="0" smtClean="0"/>
+              <a:t>f4</a:t>
+            </a:r>
+            <a:endParaRPr kumimoji="1" lang="ja-JP" altLang="en-US" sz="2400" dirty="0"/>
+          </a:p>
+        </p:txBody>
+      </p:sp>
+      <p:cxnSp>
+        <p:nvCxnSpPr>
+          <p:cNvPr id="25" name="直線矢印コネクタ 24"/>
+          <p:cNvCxnSpPr>
+            <a:stCxn id="16" idx="0"/>
+            <a:endCxn id="22" idx="2"/>
+          </p:cNvCxnSpPr>
+          <p:nvPr/>
+        </p:nvCxnSpPr>
+        <p:spPr>
+          <a:xfrm flipV="1">
+            <a:off x="6726220" y="4043973"/>
+            <a:ext cx="1030939" cy="392659"/>
+          </a:xfrm>
+          <a:prstGeom prst="straightConnector1">
+            <a:avLst/>
+          </a:prstGeom>
+          <a:ln w="31750">
+            <a:solidFill>
+              <a:schemeClr val="tx1"/>
+            </a:solidFill>
+            <a:headEnd type="none"/>
+            <a:tailEnd type="triangle"/>
+          </a:ln>
+        </p:spPr>
+        <p:style>
+          <a:lnRef idx="1">
+            <a:schemeClr val="accent1"/>
+          </a:lnRef>
+          <a:fillRef idx="0">
+            <a:schemeClr val="accent1"/>
+          </a:fillRef>
+          <a:effectRef idx="0">
+            <a:schemeClr val="accent1"/>
+          </a:effectRef>
+          <a:fontRef idx="minor">
+            <a:schemeClr val="tx1"/>
+          </a:fontRef>
+        </p:style>
+      </p:cxnSp>
+      <p:sp>
+        <p:nvSpPr>
+          <p:cNvPr id="41" name="正方形/長方形 40"/>
+          <p:cNvSpPr/>
+          <p:nvPr/>
+        </p:nvSpPr>
+        <p:spPr>
+          <a:xfrm>
+            <a:off x="6006355" y="1957893"/>
+            <a:ext cx="1439730" cy="441063"/>
+          </a:xfrm>
+          <a:prstGeom prst="rect">
+            <a:avLst/>
+          </a:prstGeom>
+          <a:solidFill>
+            <a:srgbClr val="00B0F0"/>
+          </a:solidFill>
+          <a:ln>
+            <a:noFill/>
+          </a:ln>
+        </p:spPr>
+        <p:style>
+          <a:lnRef idx="2">
+            <a:schemeClr val="accent1">
+              <a:shade val="50000"/>
+            </a:schemeClr>
+          </a:lnRef>
+          <a:fillRef idx="1">
+            <a:schemeClr val="accent1"/>
+          </a:fillRef>
+          <a:effectRef idx="0">
+            <a:schemeClr val="accent1"/>
+          </a:effectRef>
+          <a:fontRef idx="minor">
+            <a:schemeClr val="lt1"/>
+          </a:fontRef>
+        </p:style>
+        <p:txBody>
+          <a:bodyPr rtlCol="0" anchor="ctr"/>
+          <a:lstStyle/>
+          <a:p>
+            <a:pPr algn="ctr"/>
+            <a:r>
+              <a:rPr kumimoji="1" lang="en-US" altLang="ja-JP" sz="2400" dirty="0" smtClean="0"/>
+              <a:t>f5</a:t>
+            </a:r>
+            <a:endParaRPr kumimoji="1" lang="ja-JP" altLang="en-US" sz="2400" dirty="0"/>
+          </a:p>
+        </p:txBody>
+      </p:sp>
+      <p:cxnSp>
+        <p:nvCxnSpPr>
+          <p:cNvPr id="42" name="直線矢印コネクタ 41"/>
+          <p:cNvCxnSpPr>
+            <a:stCxn id="19" idx="0"/>
+            <a:endCxn id="41" idx="2"/>
+          </p:cNvCxnSpPr>
+          <p:nvPr/>
+        </p:nvCxnSpPr>
+        <p:spPr>
+          <a:xfrm flipV="1">
+            <a:off x="5689453" y="2398956"/>
+            <a:ext cx="1036767" cy="321829"/>
+          </a:xfrm>
+          <a:prstGeom prst="straightConnector1">
+            <a:avLst/>
+          </a:prstGeom>
+          <a:ln w="31750">
+            <a:solidFill>
+              <a:schemeClr val="tx1"/>
+            </a:solidFill>
+            <a:headEnd type="none"/>
+            <a:tailEnd type="triangle"/>
+          </a:ln>
+        </p:spPr>
+        <p:style>
+          <a:lnRef idx="1">
+            <a:schemeClr val="accent1"/>
+          </a:lnRef>
+          <a:fillRef idx="0">
+            <a:schemeClr val="accent1"/>
+          </a:fillRef>
+          <a:effectRef idx="0">
+            <a:schemeClr val="accent1"/>
+          </a:effectRef>
+          <a:fontRef idx="minor">
+            <a:schemeClr val="tx1"/>
+          </a:fontRef>
+        </p:style>
+      </p:cxnSp>
+      <p:cxnSp>
+        <p:nvCxnSpPr>
+          <p:cNvPr id="45" name="直線矢印コネクタ 44"/>
+          <p:cNvCxnSpPr>
+            <a:stCxn id="22" idx="0"/>
+            <a:endCxn id="41" idx="2"/>
+          </p:cNvCxnSpPr>
+          <p:nvPr/>
+        </p:nvCxnSpPr>
+        <p:spPr>
+          <a:xfrm flipH="1" flipV="1">
+            <a:off x="6726220" y="2398956"/>
+            <a:ext cx="1030939" cy="1203954"/>
+          </a:xfrm>
+          <a:prstGeom prst="straightConnector1">
+            <a:avLst/>
+          </a:prstGeom>
+          <a:ln w="31750">
+            <a:solidFill>
+              <a:schemeClr val="tx1"/>
+            </a:solidFill>
+            <a:headEnd type="none"/>
+            <a:tailEnd type="triangle"/>
+          </a:ln>
+        </p:spPr>
+        <p:style>
+          <a:lnRef idx="1">
+            <a:schemeClr val="accent1"/>
+          </a:lnRef>
+          <a:fillRef idx="0">
+            <a:schemeClr val="accent1"/>
+          </a:fillRef>
+          <a:effectRef idx="0">
+            <a:schemeClr val="accent1"/>
+          </a:effectRef>
+          <a:fontRef idx="minor">
+            <a:schemeClr val="tx1"/>
+          </a:fontRef>
+        </p:style>
+      </p:cxnSp>
+    </p:spTree>
+    <p:extLst>
+      <p:ext uri="{BB962C8B-B14F-4D97-AF65-F5344CB8AC3E}">
+        <p14:creationId xmlns:p14="http://schemas.microsoft.com/office/powerpoint/2010/main" val="2745259806"/>
       </p:ext>
     </p:extLst>
   </p:cSld>

</xml_diff>

<commit_message>
build based on b2093d2
</commit_message>
<xml_diff>
--- a/latest/assets/figures.pptx
+++ b/latest/assets/figures.pptx
@@ -255,7 +255,7 @@
           <a:p>
             <a:fld id="{B22DF019-3CA4-4DC1-8436-443526D0032F}" type="datetimeFigureOut">
               <a:rPr kumimoji="1" lang="ja-JP" altLang="en-US" smtClean="0"/>
-              <a:t>2016/3/30</a:t>
+              <a:t>2016/4/5</a:t>
             </a:fld>
             <a:endParaRPr kumimoji="1" lang="ja-JP" altLang="en-US"/>
           </a:p>
@@ -457,7 +457,7 @@
           <a:p>
             <a:fld id="{B22DF019-3CA4-4DC1-8436-443526D0032F}" type="datetimeFigureOut">
               <a:rPr kumimoji="1" lang="ja-JP" altLang="en-US" smtClean="0"/>
-              <a:t>2016/3/30</a:t>
+              <a:t>2016/4/5</a:t>
             </a:fld>
             <a:endParaRPr kumimoji="1" lang="ja-JP" altLang="en-US"/>
           </a:p>
@@ -669,7 +669,7 @@
           <a:p>
             <a:fld id="{B22DF019-3CA4-4DC1-8436-443526D0032F}" type="datetimeFigureOut">
               <a:rPr kumimoji="1" lang="ja-JP" altLang="en-US" smtClean="0"/>
-              <a:t>2016/3/30</a:t>
+              <a:t>2016/4/5</a:t>
             </a:fld>
             <a:endParaRPr kumimoji="1" lang="ja-JP" altLang="en-US"/>
           </a:p>
@@ -871,7 +871,7 @@
           <a:p>
             <a:fld id="{B22DF019-3CA4-4DC1-8436-443526D0032F}" type="datetimeFigureOut">
               <a:rPr kumimoji="1" lang="ja-JP" altLang="en-US" smtClean="0"/>
-              <a:t>2016/3/30</a:t>
+              <a:t>2016/4/5</a:t>
             </a:fld>
             <a:endParaRPr kumimoji="1" lang="ja-JP" altLang="en-US"/>
           </a:p>
@@ -1115,7 +1115,7 @@
           <a:p>
             <a:fld id="{B22DF019-3CA4-4DC1-8436-443526D0032F}" type="datetimeFigureOut">
               <a:rPr kumimoji="1" lang="ja-JP" altLang="en-US" smtClean="0"/>
-              <a:t>2016/3/30</a:t>
+              <a:t>2016/4/5</a:t>
             </a:fld>
             <a:endParaRPr kumimoji="1" lang="ja-JP" altLang="en-US"/>
           </a:p>
@@ -1411,7 +1411,7 @@
           <a:p>
             <a:fld id="{B22DF019-3CA4-4DC1-8436-443526D0032F}" type="datetimeFigureOut">
               <a:rPr kumimoji="1" lang="ja-JP" altLang="en-US" smtClean="0"/>
-              <a:t>2016/3/30</a:t>
+              <a:t>2016/4/5</a:t>
             </a:fld>
             <a:endParaRPr kumimoji="1" lang="ja-JP" altLang="en-US"/>
           </a:p>
@@ -1842,7 +1842,7 @@
           <a:p>
             <a:fld id="{B22DF019-3CA4-4DC1-8436-443526D0032F}" type="datetimeFigureOut">
               <a:rPr kumimoji="1" lang="ja-JP" altLang="en-US" smtClean="0"/>
-              <a:t>2016/3/30</a:t>
+              <a:t>2016/4/5</a:t>
             </a:fld>
             <a:endParaRPr kumimoji="1" lang="ja-JP" altLang="en-US"/>
           </a:p>
@@ -1960,7 +1960,7 @@
           <a:p>
             <a:fld id="{B22DF019-3CA4-4DC1-8436-443526D0032F}" type="datetimeFigureOut">
               <a:rPr kumimoji="1" lang="ja-JP" altLang="en-US" smtClean="0"/>
-              <a:t>2016/3/30</a:t>
+              <a:t>2016/4/5</a:t>
             </a:fld>
             <a:endParaRPr kumimoji="1" lang="ja-JP" altLang="en-US"/>
           </a:p>
@@ -2055,7 +2055,7 @@
           <a:p>
             <a:fld id="{B22DF019-3CA4-4DC1-8436-443526D0032F}" type="datetimeFigureOut">
               <a:rPr kumimoji="1" lang="ja-JP" altLang="en-US" smtClean="0"/>
-              <a:t>2016/3/30</a:t>
+              <a:t>2016/4/5</a:t>
             </a:fld>
             <a:endParaRPr kumimoji="1" lang="ja-JP" altLang="en-US"/>
           </a:p>
@@ -2364,7 +2364,7 @@
           <a:p>
             <a:fld id="{B22DF019-3CA4-4DC1-8436-443526D0032F}" type="datetimeFigureOut">
               <a:rPr kumimoji="1" lang="ja-JP" altLang="en-US" smtClean="0"/>
-              <a:t>2016/3/30</a:t>
+              <a:t>2016/4/5</a:t>
             </a:fld>
             <a:endParaRPr kumimoji="1" lang="ja-JP" altLang="en-US"/>
           </a:p>
@@ -2621,7 +2621,7 @@
           <a:p>
             <a:fld id="{B22DF019-3CA4-4DC1-8436-443526D0032F}" type="datetimeFigureOut">
               <a:rPr kumimoji="1" lang="ja-JP" altLang="en-US" smtClean="0"/>
-              <a:t>2016/3/30</a:t>
+              <a:t>2016/4/5</a:t>
             </a:fld>
             <a:endParaRPr kumimoji="1" lang="ja-JP" altLang="en-US"/>
           </a:p>
@@ -2866,7 +2866,7 @@
           <a:p>
             <a:fld id="{B22DF019-3CA4-4DC1-8436-443526D0032F}" type="datetimeFigureOut">
               <a:rPr kumimoji="1" lang="ja-JP" altLang="en-US" smtClean="0"/>
-              <a:t>2016/3/30</a:t>
+              <a:t>2016/4/5</a:t>
             </a:fld>
             <a:endParaRPr kumimoji="1" lang="ja-JP" altLang="en-US"/>
           </a:p>
@@ -3365,7 +3365,7 @@
             <a:pPr algn="ctr"/>
             <a:r>
               <a:rPr kumimoji="1" lang="en-US" altLang="ja-JP" sz="2400" dirty="0" smtClean="0"/>
-              <a:t>x</a:t>
+              <a:t>X</a:t>
             </a:r>
             <a:endParaRPr kumimoji="1" lang="ja-JP" altLang="en-US" sz="2400" dirty="0"/>
           </a:p>
@@ -3414,8 +3414,8 @@
           <a:p>
             <a:pPr algn="ctr"/>
             <a:r>
-              <a:rPr lang="en-US" altLang="ja-JP" sz="2400" dirty="0"/>
-              <a:t>y</a:t>
+              <a:rPr lang="en-US" altLang="ja-JP" sz="2400" dirty="0" smtClean="0"/>
+              <a:t>Y</a:t>
             </a:r>
             <a:endParaRPr kumimoji="1" lang="ja-JP" altLang="en-US" sz="2400" dirty="0"/>
           </a:p>
@@ -3510,6 +3510,266 @@
         <p:spPr>
           <a:xfrm>
             <a:off x="4507452" y="1269402"/>
+            <a:ext cx="439544" cy="707886"/>
+          </a:xfrm>
+          <a:prstGeom prst="rect">
+            <a:avLst/>
+          </a:prstGeom>
+          <a:noFill/>
+        </p:spPr>
+        <p:txBody>
+          <a:bodyPr wrap="none" rtlCol="0">
+            <a:spAutoFit/>
+          </a:bodyPr>
+          <a:lstStyle/>
+          <a:p>
+            <a:r>
+              <a:rPr lang="en-US" altLang="ja-JP" sz="4000" dirty="0" smtClean="0"/>
+              <a:t>+</a:t>
+            </a:r>
+            <a:endParaRPr kumimoji="1" lang="en-US" altLang="ja-JP" sz="4000" dirty="0" smtClean="0"/>
+          </a:p>
+        </p:txBody>
+      </p:sp>
+      <p:sp>
+        <p:nvSpPr>
+          <p:cNvPr id="9" name="正方形/長方形 8"/>
+          <p:cNvSpPr/>
+          <p:nvPr/>
+        </p:nvSpPr>
+        <p:spPr>
+          <a:xfrm>
+            <a:off x="2417647" y="3885304"/>
+            <a:ext cx="1003285" cy="1247886"/>
+          </a:xfrm>
+          <a:prstGeom prst="rect">
+            <a:avLst/>
+          </a:prstGeom>
+          <a:solidFill>
+            <a:srgbClr val="C00000"/>
+          </a:solidFill>
+          <a:ln>
+            <a:noFill/>
+          </a:ln>
+        </p:spPr>
+        <p:style>
+          <a:lnRef idx="2">
+            <a:schemeClr val="accent1">
+              <a:shade val="50000"/>
+            </a:schemeClr>
+          </a:lnRef>
+          <a:fillRef idx="1">
+            <a:schemeClr val="accent1"/>
+          </a:fillRef>
+          <a:effectRef idx="0">
+            <a:schemeClr val="accent1"/>
+          </a:effectRef>
+          <a:fontRef idx="minor">
+            <a:schemeClr val="lt1"/>
+          </a:fontRef>
+        </p:style>
+        <p:txBody>
+          <a:bodyPr rtlCol="0" anchor="ctr"/>
+          <a:lstStyle/>
+          <a:p>
+            <a:pPr algn="ctr"/>
+            <a:r>
+              <a:rPr kumimoji="1" lang="en-US" altLang="ja-JP" sz="2400" dirty="0" smtClean="0"/>
+              <a:t>P</a:t>
+            </a:r>
+            <a:endParaRPr kumimoji="1" lang="ja-JP" altLang="en-US" sz="2400" dirty="0"/>
+          </a:p>
+        </p:txBody>
+      </p:sp>
+      <p:sp>
+        <p:nvSpPr>
+          <p:cNvPr id="10" name="正方形/長方形 9"/>
+          <p:cNvSpPr/>
+          <p:nvPr/>
+        </p:nvSpPr>
+        <p:spPr>
+          <a:xfrm>
+            <a:off x="3893239" y="3885303"/>
+            <a:ext cx="522506" cy="1247887"/>
+          </a:xfrm>
+          <a:prstGeom prst="rect">
+            <a:avLst/>
+          </a:prstGeom>
+          <a:solidFill>
+            <a:srgbClr val="00B0F0"/>
+          </a:solidFill>
+          <a:ln>
+            <a:noFill/>
+          </a:ln>
+        </p:spPr>
+        <p:style>
+          <a:lnRef idx="2">
+            <a:schemeClr val="accent1">
+              <a:shade val="50000"/>
+            </a:schemeClr>
+          </a:lnRef>
+          <a:fillRef idx="1">
+            <a:schemeClr val="accent1"/>
+          </a:fillRef>
+          <a:effectRef idx="0">
+            <a:schemeClr val="accent1"/>
+          </a:effectRef>
+          <a:fontRef idx="minor">
+            <a:schemeClr val="lt1"/>
+          </a:fontRef>
+        </p:style>
+        <p:txBody>
+          <a:bodyPr rtlCol="0" anchor="ctr"/>
+          <a:lstStyle/>
+          <a:p>
+            <a:pPr algn="ctr"/>
+            <a:r>
+              <a:rPr kumimoji="1" lang="en-US" altLang="ja-JP" sz="2400" dirty="0" smtClean="0"/>
+              <a:t>X</a:t>
+            </a:r>
+            <a:endParaRPr kumimoji="1" lang="ja-JP" altLang="en-US" sz="2400" dirty="0"/>
+          </a:p>
+        </p:txBody>
+      </p:sp>
+      <p:sp>
+        <p:nvSpPr>
+          <p:cNvPr id="11" name="正方形/長方形 10"/>
+          <p:cNvSpPr/>
+          <p:nvPr/>
+        </p:nvSpPr>
+        <p:spPr>
+          <a:xfrm>
+            <a:off x="1169759" y="4143487"/>
+            <a:ext cx="522506" cy="731520"/>
+          </a:xfrm>
+          <a:prstGeom prst="rect">
+            <a:avLst/>
+          </a:prstGeom>
+          <a:solidFill>
+            <a:srgbClr val="92D050"/>
+          </a:solidFill>
+          <a:ln w="25400">
+            <a:noFill/>
+          </a:ln>
+        </p:spPr>
+        <p:style>
+          <a:lnRef idx="2">
+            <a:schemeClr val="accent1">
+              <a:shade val="50000"/>
+            </a:schemeClr>
+          </a:lnRef>
+          <a:fillRef idx="1">
+            <a:schemeClr val="accent1"/>
+          </a:fillRef>
+          <a:effectRef idx="0">
+            <a:schemeClr val="accent1"/>
+          </a:effectRef>
+          <a:fontRef idx="minor">
+            <a:schemeClr val="lt1"/>
+          </a:fontRef>
+        </p:style>
+        <p:txBody>
+          <a:bodyPr rtlCol="0" anchor="ctr"/>
+          <a:lstStyle/>
+          <a:p>
+            <a:pPr algn="ctr"/>
+            <a:r>
+              <a:rPr lang="en-US" altLang="ja-JP" sz="2400" dirty="0" smtClean="0"/>
+              <a:t>Y</a:t>
+            </a:r>
+            <a:endParaRPr kumimoji="1" lang="ja-JP" altLang="en-US" sz="2400" dirty="0"/>
+          </a:p>
+        </p:txBody>
+      </p:sp>
+      <p:sp>
+        <p:nvSpPr>
+          <p:cNvPr id="14" name="正方形/長方形 13"/>
+          <p:cNvSpPr/>
+          <p:nvPr/>
+        </p:nvSpPr>
+        <p:spPr>
+          <a:xfrm>
+            <a:off x="5044392" y="4119853"/>
+            <a:ext cx="276918" cy="731520"/>
+          </a:xfrm>
+          <a:prstGeom prst="rect">
+            <a:avLst/>
+          </a:prstGeom>
+          <a:solidFill>
+            <a:srgbClr val="C00000"/>
+          </a:solidFill>
+          <a:ln>
+            <a:noFill/>
+          </a:ln>
+        </p:spPr>
+        <p:style>
+          <a:lnRef idx="2">
+            <a:schemeClr val="accent1">
+              <a:shade val="50000"/>
+            </a:schemeClr>
+          </a:lnRef>
+          <a:fillRef idx="1">
+            <a:schemeClr val="accent1"/>
+          </a:fillRef>
+          <a:effectRef idx="0">
+            <a:schemeClr val="accent1"/>
+          </a:effectRef>
+          <a:fontRef idx="minor">
+            <a:schemeClr val="lt1"/>
+          </a:fontRef>
+        </p:style>
+        <p:txBody>
+          <a:bodyPr rtlCol="0" anchor="ctr"/>
+          <a:lstStyle/>
+          <a:p>
+            <a:pPr algn="ctr"/>
+            <a:r>
+              <a:rPr kumimoji="1" lang="en-US" altLang="ja-JP" sz="2400" dirty="0" smtClean="0"/>
+              <a:t>b</a:t>
+            </a:r>
+            <a:endParaRPr kumimoji="1" lang="ja-JP" altLang="en-US" sz="2400" dirty="0"/>
+          </a:p>
+        </p:txBody>
+      </p:sp>
+      <p:sp>
+        <p:nvSpPr>
+          <p:cNvPr id="15" name="テキスト ボックス 14"/>
+          <p:cNvSpPr txBox="1"/>
+          <p:nvPr/>
+        </p:nvSpPr>
+        <p:spPr>
+          <a:xfrm>
+            <a:off x="1835184" y="4143487"/>
+            <a:ext cx="439544" cy="707886"/>
+          </a:xfrm>
+          <a:prstGeom prst="rect">
+            <a:avLst/>
+          </a:prstGeom>
+          <a:noFill/>
+        </p:spPr>
+        <p:txBody>
+          <a:bodyPr wrap="none" rtlCol="0">
+            <a:spAutoFit/>
+          </a:bodyPr>
+          <a:lstStyle/>
+          <a:p>
+            <a:r>
+              <a:rPr lang="en-US" altLang="ja-JP" sz="4000" dirty="0"/>
+              <a:t>=</a:t>
+            </a:r>
+            <a:endParaRPr kumimoji="1" lang="en-US" altLang="ja-JP" sz="4000" dirty="0" smtClean="0"/>
+          </a:p>
+        </p:txBody>
+      </p:sp>
+      <p:sp>
+        <p:nvSpPr>
+          <p:cNvPr id="16" name="テキスト ボックス 15"/>
+          <p:cNvSpPr txBox="1"/>
+          <p:nvPr/>
+        </p:nvSpPr>
+        <p:spPr>
+          <a:xfrm>
+            <a:off x="4536901" y="4143487"/>
             <a:ext cx="439544" cy="707886"/>
           </a:xfrm>
           <a:prstGeom prst="rect">

</xml_diff>

<commit_message>
build based on 66bd810
</commit_message>
<xml_diff>
--- a/latest/assets/figures.pptx
+++ b/latest/assets/figures.pptx
@@ -6,7 +6,9 @@
   </p:sldMasterIdLst>
   <p:sldIdLst>
     <p:sldId id="256" r:id="rId2"/>
-    <p:sldId id="257" r:id="rId3"/>
+    <p:sldId id="258" r:id="rId3"/>
+    <p:sldId id="259" r:id="rId4"/>
+    <p:sldId id="257" r:id="rId5"/>
   </p:sldIdLst>
   <p:sldSz cx="9144000" cy="6858000" type="screen4x3"/>
   <p:notesSz cx="6858000" cy="9144000"/>
@@ -255,7 +257,7 @@
           <a:p>
             <a:fld id="{B22DF019-3CA4-4DC1-8436-443526D0032F}" type="datetimeFigureOut">
               <a:rPr kumimoji="1" lang="ja-JP" altLang="en-US" smtClean="0"/>
-              <a:t>2016/4/5</a:t>
+              <a:t>2016/6/21</a:t>
             </a:fld>
             <a:endParaRPr kumimoji="1" lang="ja-JP" altLang="en-US"/>
           </a:p>
@@ -457,7 +459,7 @@
           <a:p>
             <a:fld id="{B22DF019-3CA4-4DC1-8436-443526D0032F}" type="datetimeFigureOut">
               <a:rPr kumimoji="1" lang="ja-JP" altLang="en-US" smtClean="0"/>
-              <a:t>2016/4/5</a:t>
+              <a:t>2016/6/21</a:t>
             </a:fld>
             <a:endParaRPr kumimoji="1" lang="ja-JP" altLang="en-US"/>
           </a:p>
@@ -669,7 +671,7 @@
           <a:p>
             <a:fld id="{B22DF019-3CA4-4DC1-8436-443526D0032F}" type="datetimeFigureOut">
               <a:rPr kumimoji="1" lang="ja-JP" altLang="en-US" smtClean="0"/>
-              <a:t>2016/4/5</a:t>
+              <a:t>2016/6/21</a:t>
             </a:fld>
             <a:endParaRPr kumimoji="1" lang="ja-JP" altLang="en-US"/>
           </a:p>
@@ -871,7 +873,7 @@
           <a:p>
             <a:fld id="{B22DF019-3CA4-4DC1-8436-443526D0032F}" type="datetimeFigureOut">
               <a:rPr kumimoji="1" lang="ja-JP" altLang="en-US" smtClean="0"/>
-              <a:t>2016/4/5</a:t>
+              <a:t>2016/6/21</a:t>
             </a:fld>
             <a:endParaRPr kumimoji="1" lang="ja-JP" altLang="en-US"/>
           </a:p>
@@ -1115,7 +1117,7 @@
           <a:p>
             <a:fld id="{B22DF019-3CA4-4DC1-8436-443526D0032F}" type="datetimeFigureOut">
               <a:rPr kumimoji="1" lang="ja-JP" altLang="en-US" smtClean="0"/>
-              <a:t>2016/4/5</a:t>
+              <a:t>2016/6/21</a:t>
             </a:fld>
             <a:endParaRPr kumimoji="1" lang="ja-JP" altLang="en-US"/>
           </a:p>
@@ -1411,7 +1413,7 @@
           <a:p>
             <a:fld id="{B22DF019-3CA4-4DC1-8436-443526D0032F}" type="datetimeFigureOut">
               <a:rPr kumimoji="1" lang="ja-JP" altLang="en-US" smtClean="0"/>
-              <a:t>2016/4/5</a:t>
+              <a:t>2016/6/21</a:t>
             </a:fld>
             <a:endParaRPr kumimoji="1" lang="ja-JP" altLang="en-US"/>
           </a:p>
@@ -1842,7 +1844,7 @@
           <a:p>
             <a:fld id="{B22DF019-3CA4-4DC1-8436-443526D0032F}" type="datetimeFigureOut">
               <a:rPr kumimoji="1" lang="ja-JP" altLang="en-US" smtClean="0"/>
-              <a:t>2016/4/5</a:t>
+              <a:t>2016/6/21</a:t>
             </a:fld>
             <a:endParaRPr kumimoji="1" lang="ja-JP" altLang="en-US"/>
           </a:p>
@@ -1960,7 +1962,7 @@
           <a:p>
             <a:fld id="{B22DF019-3CA4-4DC1-8436-443526D0032F}" type="datetimeFigureOut">
               <a:rPr kumimoji="1" lang="ja-JP" altLang="en-US" smtClean="0"/>
-              <a:t>2016/4/5</a:t>
+              <a:t>2016/6/21</a:t>
             </a:fld>
             <a:endParaRPr kumimoji="1" lang="ja-JP" altLang="en-US"/>
           </a:p>
@@ -2055,7 +2057,7 @@
           <a:p>
             <a:fld id="{B22DF019-3CA4-4DC1-8436-443526D0032F}" type="datetimeFigureOut">
               <a:rPr kumimoji="1" lang="ja-JP" altLang="en-US" smtClean="0"/>
-              <a:t>2016/4/5</a:t>
+              <a:t>2016/6/21</a:t>
             </a:fld>
             <a:endParaRPr kumimoji="1" lang="ja-JP" altLang="en-US"/>
           </a:p>
@@ -2364,7 +2366,7 @@
           <a:p>
             <a:fld id="{B22DF019-3CA4-4DC1-8436-443526D0032F}" type="datetimeFigureOut">
               <a:rPr kumimoji="1" lang="ja-JP" altLang="en-US" smtClean="0"/>
-              <a:t>2016/4/5</a:t>
+              <a:t>2016/6/21</a:t>
             </a:fld>
             <a:endParaRPr kumimoji="1" lang="ja-JP" altLang="en-US"/>
           </a:p>
@@ -2621,7 +2623,7 @@
           <a:p>
             <a:fld id="{B22DF019-3CA4-4DC1-8436-443526D0032F}" type="datetimeFigureOut">
               <a:rPr kumimoji="1" lang="ja-JP" altLang="en-US" smtClean="0"/>
-              <a:t>2016/4/5</a:t>
+              <a:t>2016/6/21</a:t>
             </a:fld>
             <a:endParaRPr kumimoji="1" lang="ja-JP" altLang="en-US"/>
           </a:p>
@@ -2866,7 +2868,7 @@
           <a:p>
             <a:fld id="{B22DF019-3CA4-4DC1-8436-443526D0032F}" type="datetimeFigureOut">
               <a:rPr kumimoji="1" lang="ja-JP" altLang="en-US" smtClean="0"/>
-              <a:t>2016/4/5</a:t>
+              <a:t>2016/6/21</a:t>
             </a:fld>
             <a:endParaRPr kumimoji="1" lang="ja-JP" altLang="en-US"/>
           </a:p>
@@ -3830,13 +3832,13 @@
       </p:grpSpPr>
       <p:sp>
         <p:nvSpPr>
-          <p:cNvPr id="9" name="正方形/長方形 8"/>
+          <p:cNvPr id="10" name="正方形/長方形 9"/>
           <p:cNvSpPr/>
           <p:nvPr/>
         </p:nvSpPr>
         <p:spPr>
           <a:xfrm>
-            <a:off x="980740" y="2280621"/>
+            <a:off x="977833" y="2122843"/>
             <a:ext cx="1439730" cy="441063"/>
           </a:xfrm>
           <a:prstGeom prst="rect">
@@ -3872,21 +3874,60 @@
             <a:pPr algn="ctr"/>
             <a:r>
               <a:rPr kumimoji="1" lang="en-US" altLang="ja-JP" sz="2400" dirty="0" smtClean="0"/>
-              <a:t>f1</a:t>
+              <a:t>h1</a:t>
             </a:r>
             <a:endParaRPr kumimoji="1" lang="ja-JP" altLang="en-US" sz="2400" dirty="0"/>
           </a:p>
         </p:txBody>
       </p:sp>
-      <p:sp>
-        <p:nvSpPr>
-          <p:cNvPr id="10" name="正方形/長方形 9"/>
+      <p:cxnSp>
+        <p:nvCxnSpPr>
+          <p:cNvPr id="3" name="直線矢印コネクタ 2"/>
+          <p:cNvCxnSpPr>
+            <a:stCxn id="9" idx="0"/>
+            <a:endCxn id="10" idx="2"/>
+          </p:cNvCxnSpPr>
+          <p:nvPr/>
+        </p:nvCxnSpPr>
+        <p:spPr>
+          <a:xfrm flipV="1">
+            <a:off x="1697698" y="2563906"/>
+            <a:ext cx="0" cy="424031"/>
+          </a:xfrm>
+          <a:prstGeom prst="straightConnector1">
+            <a:avLst/>
+          </a:prstGeom>
+          <a:ln w="31750">
+            <a:solidFill>
+              <a:schemeClr val="tx1"/>
+            </a:solidFill>
+            <a:tailEnd type="triangle"/>
+          </a:ln>
+        </p:spPr>
+        <p:style>
+          <a:lnRef idx="1">
+            <a:schemeClr val="accent1"/>
+          </a:lnRef>
+          <a:fillRef idx="0">
+            <a:schemeClr val="accent1"/>
+          </a:fillRef>
+          <a:effectRef idx="0">
+            <a:schemeClr val="accent1"/>
+          </a:effectRef>
+          <a:fontRef idx="minor">
+            <a:schemeClr val="tx1"/>
+          </a:fontRef>
+        </p:style>
+      </p:cxnSp>
+      <p:sp>
+        <p:nvSpPr>
+          <p:cNvPr id="14" name="正方形/長方形 13"/>
           <p:cNvSpPr/>
           <p:nvPr/>
         </p:nvSpPr>
         <p:spPr>
           <a:xfrm>
-            <a:off x="980740" y="1421802"/>
+            <a:off x="977833" y="1257749"/>
             <a:ext cx="1439730" cy="441063"/>
           </a:xfrm>
           <a:prstGeom prst="rect">
@@ -3922,8 +3963,1732 @@
             <a:pPr algn="ctr"/>
             <a:r>
               <a:rPr kumimoji="1" lang="en-US" altLang="ja-JP" sz="2400" dirty="0" smtClean="0"/>
-              <a:t>f2</a:t>
-            </a:r>
+              <a:t>h2</a:t>
+            </a:r>
+            <a:endParaRPr kumimoji="1" lang="ja-JP" altLang="en-US" sz="2400" dirty="0"/>
+          </a:p>
+        </p:txBody>
+      </p:sp>
+      <p:cxnSp>
+        <p:nvCxnSpPr>
+          <p:cNvPr id="15" name="直線矢印コネクタ 14"/>
+          <p:cNvCxnSpPr>
+            <a:stCxn id="10" idx="0"/>
+            <a:endCxn id="14" idx="2"/>
+          </p:cNvCxnSpPr>
+          <p:nvPr/>
+        </p:nvCxnSpPr>
+        <p:spPr>
+          <a:xfrm flipV="1">
+            <a:off x="1697698" y="1698812"/>
+            <a:ext cx="0" cy="424031"/>
+          </a:xfrm>
+          <a:prstGeom prst="straightConnector1">
+            <a:avLst/>
+          </a:prstGeom>
+          <a:ln w="31750">
+            <a:solidFill>
+              <a:schemeClr val="tx1"/>
+            </a:solidFill>
+            <a:tailEnd type="triangle"/>
+          </a:ln>
+        </p:spPr>
+        <p:style>
+          <a:lnRef idx="1">
+            <a:schemeClr val="accent1"/>
+          </a:lnRef>
+          <a:fillRef idx="0">
+            <a:schemeClr val="accent1"/>
+          </a:fillRef>
+          <a:effectRef idx="0">
+            <a:schemeClr val="accent1"/>
+          </a:effectRef>
+          <a:fontRef idx="minor">
+            <a:schemeClr val="tx1"/>
+          </a:fontRef>
+        </p:style>
+      </p:cxnSp>
+      <p:sp>
+        <p:nvSpPr>
+          <p:cNvPr id="4" name="テキスト ボックス 3"/>
+          <p:cNvSpPr txBox="1"/>
+          <p:nvPr/>
+        </p:nvSpPr>
+        <p:spPr>
+          <a:xfrm>
+            <a:off x="2414871" y="2563906"/>
+            <a:ext cx="1021977" cy="461665"/>
+          </a:xfrm>
+          <a:prstGeom prst="rect">
+            <a:avLst/>
+          </a:prstGeom>
+          <a:noFill/>
+        </p:spPr>
+        <p:txBody>
+          <a:bodyPr wrap="square" rtlCol="0">
+            <a:spAutoFit/>
+          </a:bodyPr>
+          <a:lstStyle/>
+          <a:p>
+            <a:pPr algn="ctr"/>
+            <a:r>
+              <a:rPr kumimoji="1" lang="en-US" altLang="ja-JP" sz="2400" dirty="0" smtClean="0"/>
+              <a:t>Linear</a:t>
+            </a:r>
+            <a:endParaRPr kumimoji="1" lang="ja-JP" altLang="en-US" sz="2400" dirty="0"/>
+          </a:p>
+        </p:txBody>
+      </p:sp>
+      <p:sp>
+        <p:nvSpPr>
+          <p:cNvPr id="21" name="テキスト ボックス 20"/>
+          <p:cNvSpPr txBox="1"/>
+          <p:nvPr/>
+        </p:nvSpPr>
+        <p:spPr>
+          <a:xfrm>
+            <a:off x="2414872" y="1679995"/>
+            <a:ext cx="1021977" cy="461665"/>
+          </a:xfrm>
+          <a:prstGeom prst="rect">
+            <a:avLst/>
+          </a:prstGeom>
+          <a:noFill/>
+        </p:spPr>
+        <p:txBody>
+          <a:bodyPr wrap="square" rtlCol="0">
+            <a:spAutoFit/>
+          </a:bodyPr>
+          <a:lstStyle/>
+          <a:p>
+            <a:pPr algn="ctr"/>
+            <a:r>
+              <a:rPr kumimoji="1" lang="en-US" altLang="ja-JP" sz="2400" dirty="0" err="1" smtClean="0"/>
+              <a:t>relu</a:t>
+            </a:r>
+            <a:endParaRPr kumimoji="1" lang="ja-JP" altLang="en-US" sz="2400" dirty="0"/>
+          </a:p>
+        </p:txBody>
+      </p:sp>
+      <p:cxnSp>
+        <p:nvCxnSpPr>
+          <p:cNvPr id="24" name="直線矢印コネクタ 23"/>
+          <p:cNvCxnSpPr>
+            <a:stCxn id="14" idx="0"/>
+            <a:endCxn id="23" idx="2"/>
+          </p:cNvCxnSpPr>
+          <p:nvPr/>
+        </p:nvCxnSpPr>
+        <p:spPr>
+          <a:xfrm flipH="1" flipV="1">
+            <a:off x="1695006" y="793809"/>
+            <a:ext cx="2692" cy="463940"/>
+          </a:xfrm>
+          <a:prstGeom prst="straightConnector1">
+            <a:avLst/>
+          </a:prstGeom>
+          <a:ln w="31750">
+            <a:solidFill>
+              <a:schemeClr val="tx1"/>
+            </a:solidFill>
+            <a:tailEnd type="triangle"/>
+          </a:ln>
+        </p:spPr>
+        <p:style>
+          <a:lnRef idx="1">
+            <a:schemeClr val="accent1"/>
+          </a:lnRef>
+          <a:fillRef idx="0">
+            <a:schemeClr val="accent1"/>
+          </a:fillRef>
+          <a:effectRef idx="0">
+            <a:schemeClr val="accent1"/>
+          </a:effectRef>
+          <a:fontRef idx="minor">
+            <a:schemeClr val="tx1"/>
+          </a:fontRef>
+        </p:style>
+      </p:cxnSp>
+      <p:sp>
+        <p:nvSpPr>
+          <p:cNvPr id="26" name="テキスト ボックス 25"/>
+          <p:cNvSpPr txBox="1"/>
+          <p:nvPr/>
+        </p:nvSpPr>
+        <p:spPr>
+          <a:xfrm>
+            <a:off x="2432352" y="800997"/>
+            <a:ext cx="1021977" cy="461665"/>
+          </a:xfrm>
+          <a:prstGeom prst="rect">
+            <a:avLst/>
+          </a:prstGeom>
+          <a:noFill/>
+        </p:spPr>
+        <p:txBody>
+          <a:bodyPr wrap="square" rtlCol="0">
+            <a:spAutoFit/>
+          </a:bodyPr>
+          <a:lstStyle/>
+          <a:p>
+            <a:pPr algn="ctr"/>
+            <a:r>
+              <a:rPr kumimoji="1" lang="en-US" altLang="ja-JP" sz="2400" dirty="0" smtClean="0"/>
+              <a:t>Linear</a:t>
+            </a:r>
+            <a:endParaRPr kumimoji="1" lang="ja-JP" altLang="en-US" sz="2400" dirty="0"/>
+          </a:p>
+        </p:txBody>
+      </p:sp>
+      <p:sp>
+        <p:nvSpPr>
+          <p:cNvPr id="27" name="正方形/長方形 26"/>
+          <p:cNvSpPr/>
+          <p:nvPr/>
+        </p:nvSpPr>
+        <p:spPr>
+          <a:xfrm>
+            <a:off x="4572000" y="3692111"/>
+            <a:ext cx="505610" cy="1186496"/>
+          </a:xfrm>
+          <a:prstGeom prst="rect">
+            <a:avLst/>
+          </a:prstGeom>
+          <a:solidFill>
+            <a:srgbClr val="00B0F0"/>
+          </a:solidFill>
+          <a:ln>
+            <a:noFill/>
+          </a:ln>
+        </p:spPr>
+        <p:style>
+          <a:lnRef idx="2">
+            <a:schemeClr val="accent1">
+              <a:shade val="50000"/>
+            </a:schemeClr>
+          </a:lnRef>
+          <a:fillRef idx="1">
+            <a:schemeClr val="accent1"/>
+          </a:fillRef>
+          <a:effectRef idx="0">
+            <a:schemeClr val="accent1"/>
+          </a:effectRef>
+          <a:fontRef idx="minor">
+            <a:schemeClr val="lt1"/>
+          </a:fontRef>
+        </p:style>
+        <p:txBody>
+          <a:bodyPr rtlCol="0" anchor="ctr"/>
+          <a:lstStyle/>
+          <a:p>
+            <a:pPr algn="ctr"/>
+            <a:r>
+              <a:rPr lang="en-US" altLang="ja-JP" sz="2400" dirty="0"/>
+              <a:t>h</a:t>
+            </a:r>
+            <a:r>
+              <a:rPr lang="en-US" altLang="ja-JP" sz="2400" dirty="0" smtClean="0"/>
+              <a:t>1</a:t>
+            </a:r>
+            <a:endParaRPr kumimoji="1" lang="ja-JP" altLang="en-US" sz="2400" dirty="0"/>
+          </a:p>
+        </p:txBody>
+      </p:sp>
+      <p:cxnSp>
+        <p:nvCxnSpPr>
+          <p:cNvPr id="29" name="直線矢印コネクタ 28"/>
+          <p:cNvCxnSpPr>
+            <a:stCxn id="27" idx="3"/>
+          </p:cNvCxnSpPr>
+          <p:nvPr/>
+        </p:nvCxnSpPr>
+        <p:spPr>
+          <a:xfrm>
+            <a:off x="5077610" y="4285359"/>
+            <a:ext cx="531156" cy="0"/>
+          </a:xfrm>
+          <a:prstGeom prst="straightConnector1">
+            <a:avLst/>
+          </a:prstGeom>
+          <a:ln w="31750">
+            <a:solidFill>
+              <a:schemeClr val="tx1"/>
+            </a:solidFill>
+            <a:tailEnd type="triangle"/>
+          </a:ln>
+        </p:spPr>
+        <p:style>
+          <a:lnRef idx="1">
+            <a:schemeClr val="accent1"/>
+          </a:lnRef>
+          <a:fillRef idx="0">
+            <a:schemeClr val="accent1"/>
+          </a:fillRef>
+          <a:effectRef idx="0">
+            <a:schemeClr val="accent1"/>
+          </a:effectRef>
+          <a:fontRef idx="minor">
+            <a:schemeClr val="tx1"/>
+          </a:fontRef>
+        </p:style>
+      </p:cxnSp>
+      <p:sp>
+        <p:nvSpPr>
+          <p:cNvPr id="37" name="正方形/長方形 36"/>
+          <p:cNvSpPr/>
+          <p:nvPr/>
+        </p:nvSpPr>
+        <p:spPr>
+          <a:xfrm>
+            <a:off x="7667508" y="3692111"/>
+            <a:ext cx="494852" cy="1186496"/>
+          </a:xfrm>
+          <a:prstGeom prst="rect">
+            <a:avLst/>
+          </a:prstGeom>
+          <a:solidFill>
+            <a:srgbClr val="00B0F0"/>
+          </a:solidFill>
+          <a:ln>
+            <a:noFill/>
+          </a:ln>
+        </p:spPr>
+        <p:style>
+          <a:lnRef idx="2">
+            <a:schemeClr val="accent1">
+              <a:shade val="50000"/>
+            </a:schemeClr>
+          </a:lnRef>
+          <a:fillRef idx="1">
+            <a:schemeClr val="accent1"/>
+          </a:fillRef>
+          <a:effectRef idx="0">
+            <a:schemeClr val="accent1"/>
+          </a:effectRef>
+          <a:fontRef idx="minor">
+            <a:schemeClr val="lt1"/>
+          </a:fontRef>
+        </p:style>
+        <p:txBody>
+          <a:bodyPr rtlCol="0" anchor="ctr"/>
+          <a:lstStyle/>
+          <a:p>
+            <a:pPr algn="ctr"/>
+            <a:r>
+              <a:rPr lang="en-US" altLang="ja-JP" sz="2400" dirty="0" smtClean="0"/>
+              <a:t>x</a:t>
+            </a:r>
+            <a:endParaRPr kumimoji="1" lang="ja-JP" altLang="en-US" sz="2400" dirty="0"/>
+          </a:p>
+        </p:txBody>
+      </p:sp>
+      <p:sp>
+        <p:nvSpPr>
+          <p:cNvPr id="43" name="テキスト ボックス 42"/>
+          <p:cNvSpPr txBox="1"/>
+          <p:nvPr/>
+        </p:nvSpPr>
+        <p:spPr>
+          <a:xfrm>
+            <a:off x="4504764" y="5444061"/>
+            <a:ext cx="629323" cy="461665"/>
+          </a:xfrm>
+          <a:prstGeom prst="rect">
+            <a:avLst/>
+          </a:prstGeom>
+          <a:noFill/>
+        </p:spPr>
+        <p:txBody>
+          <a:bodyPr wrap="square" rtlCol="0">
+            <a:spAutoFit/>
+          </a:bodyPr>
+          <a:lstStyle/>
+          <a:p>
+            <a:pPr algn="ctr"/>
+            <a:r>
+              <a:rPr kumimoji="1" lang="en-US" altLang="ja-JP" sz="2400" dirty="0" smtClean="0"/>
+              <a:t>x1</a:t>
+            </a:r>
+            <a:endParaRPr kumimoji="1" lang="ja-JP" altLang="en-US" sz="2400" dirty="0"/>
+          </a:p>
+        </p:txBody>
+      </p:sp>
+      <p:cxnSp>
+        <p:nvCxnSpPr>
+          <p:cNvPr id="44" name="直線矢印コネクタ 43"/>
+          <p:cNvCxnSpPr>
+            <a:endCxn id="27" idx="2"/>
+          </p:cNvCxnSpPr>
+          <p:nvPr/>
+        </p:nvCxnSpPr>
+        <p:spPr>
+          <a:xfrm flipV="1">
+            <a:off x="4819426" y="4878607"/>
+            <a:ext cx="5379" cy="565454"/>
+          </a:xfrm>
+          <a:prstGeom prst="straightConnector1">
+            <a:avLst/>
+          </a:prstGeom>
+          <a:ln w="31750">
+            <a:solidFill>
+              <a:schemeClr val="tx1"/>
+            </a:solidFill>
+            <a:tailEnd type="triangle"/>
+          </a:ln>
+        </p:spPr>
+        <p:style>
+          <a:lnRef idx="1">
+            <a:schemeClr val="accent1"/>
+          </a:lnRef>
+          <a:fillRef idx="0">
+            <a:schemeClr val="accent1"/>
+          </a:fillRef>
+          <a:effectRef idx="0">
+            <a:schemeClr val="accent1"/>
+          </a:effectRef>
+          <a:fontRef idx="minor">
+            <a:schemeClr val="tx1"/>
+          </a:fontRef>
+        </p:style>
+      </p:cxnSp>
+      <p:cxnSp>
+        <p:nvCxnSpPr>
+          <p:cNvPr id="48" name="直線矢印コネクタ 47"/>
+          <p:cNvCxnSpPr>
+            <a:stCxn id="27" idx="0"/>
+          </p:cNvCxnSpPr>
+          <p:nvPr/>
+        </p:nvCxnSpPr>
+        <p:spPr>
+          <a:xfrm flipH="1" flipV="1">
+            <a:off x="4819425" y="3208468"/>
+            <a:ext cx="5380" cy="483643"/>
+          </a:xfrm>
+          <a:prstGeom prst="straightConnector1">
+            <a:avLst/>
+          </a:prstGeom>
+          <a:ln w="31750">
+            <a:solidFill>
+              <a:schemeClr val="tx1"/>
+            </a:solidFill>
+            <a:tailEnd type="triangle"/>
+          </a:ln>
+        </p:spPr>
+        <p:style>
+          <a:lnRef idx="1">
+            <a:schemeClr val="accent1"/>
+          </a:lnRef>
+          <a:fillRef idx="0">
+            <a:schemeClr val="accent1"/>
+          </a:fillRef>
+          <a:effectRef idx="0">
+            <a:schemeClr val="accent1"/>
+          </a:effectRef>
+          <a:fontRef idx="minor">
+            <a:schemeClr val="tx1"/>
+          </a:fontRef>
+        </p:style>
+      </p:cxnSp>
+      <p:sp>
+        <p:nvSpPr>
+          <p:cNvPr id="59" name="テキスト ボックス 58"/>
+          <p:cNvSpPr txBox="1"/>
+          <p:nvPr/>
+        </p:nvSpPr>
+        <p:spPr>
+          <a:xfrm>
+            <a:off x="4504764" y="2716887"/>
+            <a:ext cx="629323" cy="461665"/>
+          </a:xfrm>
+          <a:prstGeom prst="rect">
+            <a:avLst/>
+          </a:prstGeom>
+          <a:noFill/>
+        </p:spPr>
+        <p:txBody>
+          <a:bodyPr wrap="square" rtlCol="0">
+            <a:spAutoFit/>
+          </a:bodyPr>
+          <a:lstStyle/>
+          <a:p>
+            <a:pPr algn="ctr"/>
+            <a:r>
+              <a:rPr lang="en-US" altLang="ja-JP" sz="2400" dirty="0"/>
+              <a:t>y</a:t>
+            </a:r>
+            <a:r>
+              <a:rPr kumimoji="1" lang="en-US" altLang="ja-JP" sz="2400" dirty="0" smtClean="0"/>
+              <a:t>1</a:t>
+            </a:r>
+            <a:endParaRPr kumimoji="1" lang="ja-JP" altLang="en-US" sz="2400" dirty="0"/>
+          </a:p>
+        </p:txBody>
+      </p:sp>
+      <p:sp>
+        <p:nvSpPr>
+          <p:cNvPr id="60" name="テキスト ボックス 59"/>
+          <p:cNvSpPr txBox="1"/>
+          <p:nvPr/>
+        </p:nvSpPr>
+        <p:spPr>
+          <a:xfrm>
+            <a:off x="1380344" y="3004969"/>
+            <a:ext cx="629323" cy="461665"/>
+          </a:xfrm>
+          <a:prstGeom prst="rect">
+            <a:avLst/>
+          </a:prstGeom>
+          <a:noFill/>
+        </p:spPr>
+        <p:txBody>
+          <a:bodyPr wrap="square" rtlCol="0">
+            <a:spAutoFit/>
+          </a:bodyPr>
+          <a:lstStyle/>
+          <a:p>
+            <a:pPr algn="ctr"/>
+            <a:r>
+              <a:rPr kumimoji="1" lang="en-US" altLang="ja-JP" sz="2400" dirty="0" smtClean="0"/>
+              <a:t>x</a:t>
+            </a:r>
+            <a:endParaRPr kumimoji="1" lang="ja-JP" altLang="en-US" sz="2400" dirty="0"/>
+          </a:p>
+        </p:txBody>
+      </p:sp>
+      <p:sp>
+        <p:nvSpPr>
+          <p:cNvPr id="61" name="テキスト ボックス 60"/>
+          <p:cNvSpPr txBox="1"/>
+          <p:nvPr/>
+        </p:nvSpPr>
+        <p:spPr>
+          <a:xfrm>
+            <a:off x="1378331" y="315112"/>
+            <a:ext cx="629323" cy="461665"/>
+          </a:xfrm>
+          <a:prstGeom prst="rect">
+            <a:avLst/>
+          </a:prstGeom>
+          <a:noFill/>
+        </p:spPr>
+        <p:txBody>
+          <a:bodyPr wrap="square" rtlCol="0">
+            <a:spAutoFit/>
+          </a:bodyPr>
+          <a:lstStyle/>
+          <a:p>
+            <a:pPr algn="ctr"/>
+            <a:r>
+              <a:rPr lang="en-US" altLang="ja-JP" sz="2400" dirty="0"/>
+              <a:t>y</a:t>
+            </a:r>
+            <a:endParaRPr kumimoji="1" lang="ja-JP" altLang="en-US" sz="2400" dirty="0"/>
+          </a:p>
+        </p:txBody>
+      </p:sp>
+      <p:cxnSp>
+        <p:nvCxnSpPr>
+          <p:cNvPr id="63" name="直線矢印コネクタ 62"/>
+          <p:cNvCxnSpPr/>
+          <p:nvPr/>
+        </p:nvCxnSpPr>
+        <p:spPr>
+          <a:xfrm>
+            <a:off x="6707613" y="1883584"/>
+            <a:ext cx="531156" cy="0"/>
+          </a:xfrm>
+          <a:prstGeom prst="straightConnector1">
+            <a:avLst/>
+          </a:prstGeom>
+          <a:ln w="31750">
+            <a:solidFill>
+              <a:schemeClr val="tx1"/>
+            </a:solidFill>
+            <a:tailEnd type="triangle"/>
+          </a:ln>
+        </p:spPr>
+        <p:style>
+          <a:lnRef idx="1">
+            <a:schemeClr val="accent1"/>
+          </a:lnRef>
+          <a:fillRef idx="0">
+            <a:schemeClr val="accent1"/>
+          </a:fillRef>
+          <a:effectRef idx="0">
+            <a:schemeClr val="accent1"/>
+          </a:effectRef>
+          <a:fontRef idx="minor">
+            <a:schemeClr val="tx1"/>
+          </a:fontRef>
+        </p:style>
+      </p:cxnSp>
+      <p:sp>
+        <p:nvSpPr>
+          <p:cNvPr id="64" name="テキスト ボックス 63"/>
+          <p:cNvSpPr txBox="1"/>
+          <p:nvPr/>
+        </p:nvSpPr>
+        <p:spPr>
+          <a:xfrm>
+            <a:off x="6134767" y="2601223"/>
+            <a:ext cx="629323" cy="461665"/>
+          </a:xfrm>
+          <a:prstGeom prst="rect">
+            <a:avLst/>
+          </a:prstGeom>
+          <a:noFill/>
+        </p:spPr>
+        <p:txBody>
+          <a:bodyPr wrap="square" rtlCol="0">
+            <a:spAutoFit/>
+          </a:bodyPr>
+          <a:lstStyle/>
+          <a:p>
+            <a:pPr algn="ctr"/>
+            <a:r>
+              <a:rPr kumimoji="1" lang="en-US" altLang="ja-JP" sz="2400" dirty="0" smtClean="0"/>
+              <a:t>x1</a:t>
+            </a:r>
+            <a:endParaRPr kumimoji="1" lang="ja-JP" altLang="en-US" sz="2400" dirty="0"/>
+          </a:p>
+        </p:txBody>
+      </p:sp>
+      <p:cxnSp>
+        <p:nvCxnSpPr>
+          <p:cNvPr id="65" name="直線矢印コネクタ 64"/>
+          <p:cNvCxnSpPr/>
+          <p:nvPr/>
+        </p:nvCxnSpPr>
+        <p:spPr>
+          <a:xfrm flipH="1" flipV="1">
+            <a:off x="6444049" y="2122843"/>
+            <a:ext cx="5380" cy="478380"/>
+          </a:xfrm>
+          <a:prstGeom prst="straightConnector1">
+            <a:avLst/>
+          </a:prstGeom>
+          <a:ln w="31750">
+            <a:solidFill>
+              <a:schemeClr val="tx1"/>
+            </a:solidFill>
+            <a:tailEnd type="triangle"/>
+          </a:ln>
+        </p:spPr>
+        <p:style>
+          <a:lnRef idx="1">
+            <a:schemeClr val="accent1"/>
+          </a:lnRef>
+          <a:fillRef idx="0">
+            <a:schemeClr val="accent1"/>
+          </a:fillRef>
+          <a:effectRef idx="0">
+            <a:schemeClr val="accent1"/>
+          </a:effectRef>
+          <a:fontRef idx="minor">
+            <a:schemeClr val="tx1"/>
+          </a:fontRef>
+        </p:style>
+      </p:cxnSp>
+      <p:cxnSp>
+        <p:nvCxnSpPr>
+          <p:cNvPr id="66" name="直線矢印コネクタ 65"/>
+          <p:cNvCxnSpPr/>
+          <p:nvPr/>
+        </p:nvCxnSpPr>
+        <p:spPr>
+          <a:xfrm flipH="1" flipV="1">
+            <a:off x="6422751" y="1105093"/>
+            <a:ext cx="5380" cy="483643"/>
+          </a:xfrm>
+          <a:prstGeom prst="straightConnector1">
+            <a:avLst/>
+          </a:prstGeom>
+          <a:ln w="31750">
+            <a:solidFill>
+              <a:schemeClr val="tx1"/>
+            </a:solidFill>
+            <a:tailEnd type="triangle"/>
+          </a:ln>
+        </p:spPr>
+        <p:style>
+          <a:lnRef idx="1">
+            <a:schemeClr val="accent1"/>
+          </a:lnRef>
+          <a:fillRef idx="0">
+            <a:schemeClr val="accent1"/>
+          </a:fillRef>
+          <a:effectRef idx="0">
+            <a:schemeClr val="accent1"/>
+          </a:effectRef>
+          <a:fontRef idx="minor">
+            <a:schemeClr val="tx1"/>
+          </a:fontRef>
+        </p:style>
+      </p:cxnSp>
+      <p:sp>
+        <p:nvSpPr>
+          <p:cNvPr id="67" name="テキスト ボックス 66"/>
+          <p:cNvSpPr txBox="1"/>
+          <p:nvPr/>
+        </p:nvSpPr>
+        <p:spPr>
+          <a:xfrm>
+            <a:off x="6134767" y="540117"/>
+            <a:ext cx="629323" cy="461665"/>
+          </a:xfrm>
+          <a:prstGeom prst="rect">
+            <a:avLst/>
+          </a:prstGeom>
+          <a:noFill/>
+        </p:spPr>
+        <p:txBody>
+          <a:bodyPr wrap="square" rtlCol="0">
+            <a:spAutoFit/>
+          </a:bodyPr>
+          <a:lstStyle/>
+          <a:p>
+            <a:pPr algn="ctr"/>
+            <a:r>
+              <a:rPr lang="en-US" altLang="ja-JP" sz="2400" dirty="0"/>
+              <a:t>y</a:t>
+            </a:r>
+            <a:r>
+              <a:rPr kumimoji="1" lang="en-US" altLang="ja-JP" sz="2400" dirty="0" smtClean="0"/>
+              <a:t>1</a:t>
+            </a:r>
+            <a:endParaRPr kumimoji="1" lang="ja-JP" altLang="en-US" sz="2400" dirty="0"/>
+          </a:p>
+        </p:txBody>
+      </p:sp>
+      <p:sp>
+        <p:nvSpPr>
+          <p:cNvPr id="68" name="テキスト ボックス 67"/>
+          <p:cNvSpPr txBox="1"/>
+          <p:nvPr/>
+        </p:nvSpPr>
+        <p:spPr>
+          <a:xfrm>
+            <a:off x="6134767" y="1624957"/>
+            <a:ext cx="629323" cy="461665"/>
+          </a:xfrm>
+          <a:prstGeom prst="rect">
+            <a:avLst/>
+          </a:prstGeom>
+          <a:noFill/>
+        </p:spPr>
+        <p:txBody>
+          <a:bodyPr wrap="square" rtlCol="0">
+            <a:spAutoFit/>
+          </a:bodyPr>
+          <a:lstStyle/>
+          <a:p>
+            <a:pPr algn="ctr"/>
+            <a:r>
+              <a:rPr lang="en-US" altLang="ja-JP" sz="2400" dirty="0"/>
+              <a:t>h</a:t>
+            </a:r>
+            <a:r>
+              <a:rPr kumimoji="1" lang="en-US" altLang="ja-JP" sz="2400" dirty="0" smtClean="0"/>
+              <a:t>1</a:t>
+            </a:r>
+            <a:endParaRPr kumimoji="1" lang="ja-JP" altLang="en-US" sz="2400" dirty="0"/>
+          </a:p>
+        </p:txBody>
+      </p:sp>
+    </p:spTree>
+    <p:extLst>
+      <p:ext uri="{BB962C8B-B14F-4D97-AF65-F5344CB8AC3E}">
+        <p14:creationId xmlns:p14="http://schemas.microsoft.com/office/powerpoint/2010/main" val="1244963136"/>
+      </p:ext>
+    </p:extLst>
+  </p:cSld>
+  <p:clrMapOvr>
+    <a:masterClrMapping/>
+  </p:clrMapOvr>
+  <p:timing>
+    <p:tnLst>
+      <p:par>
+        <p:cTn id="1" dur="indefinite" restart="never" nodeType="tmRoot"/>
+      </p:par>
+    </p:tnLst>
+  </p:timing>
+</p:sld>
+</file>
+
+<file path=ppt/slides/slide3.xml><?xml version="1.0" encoding="utf-8"?>
+<p:sld xmlns:a="http://schemas.openxmlformats.org/drawingml/2006/main" xmlns:r="http://schemas.openxmlformats.org/officeDocument/2006/relationships" xmlns:p="http://schemas.openxmlformats.org/presentationml/2006/main">
+  <p:cSld>
+    <p:spTree>
+      <p:nvGrpSpPr>
+        <p:cNvPr id="1" name=""/>
+        <p:cNvGrpSpPr/>
+        <p:nvPr/>
+      </p:nvGrpSpPr>
+      <p:grpSpPr>
+        <a:xfrm>
+          <a:off x="0" y="0"/>
+          <a:ext cx="0" cy="0"/>
+          <a:chOff x="0" y="0"/>
+          <a:chExt cx="0" cy="0"/>
+        </a:xfrm>
+      </p:grpSpPr>
+      <p:cxnSp>
+        <p:nvCxnSpPr>
+          <p:cNvPr id="30" name="直線矢印コネクタ 29"/>
+          <p:cNvCxnSpPr>
+            <a:stCxn id="32" idx="0"/>
+            <a:endCxn id="54" idx="2"/>
+          </p:cNvCxnSpPr>
+          <p:nvPr/>
+        </p:nvCxnSpPr>
+        <p:spPr>
+          <a:xfrm flipH="1" flipV="1">
+            <a:off x="1131644" y="2068651"/>
+            <a:ext cx="1058" cy="642171"/>
+          </a:xfrm>
+          <a:prstGeom prst="straightConnector1">
+            <a:avLst/>
+          </a:prstGeom>
+          <a:ln w="31750">
+            <a:solidFill>
+              <a:schemeClr val="tx1"/>
+            </a:solidFill>
+            <a:tailEnd type="arrow"/>
+          </a:ln>
+        </p:spPr>
+        <p:style>
+          <a:lnRef idx="1">
+            <a:schemeClr val="accent1"/>
+          </a:lnRef>
+          <a:fillRef idx="0">
+            <a:schemeClr val="accent1"/>
+          </a:fillRef>
+          <a:effectRef idx="0">
+            <a:schemeClr val="accent1"/>
+          </a:effectRef>
+          <a:fontRef idx="minor">
+            <a:schemeClr val="tx1"/>
+          </a:fontRef>
+        </p:style>
+      </p:cxnSp>
+      <p:sp>
+        <p:nvSpPr>
+          <p:cNvPr id="31" name="正方形/長方形 30"/>
+          <p:cNvSpPr/>
+          <p:nvPr/>
+        </p:nvSpPr>
+        <p:spPr>
+          <a:xfrm>
+            <a:off x="895041" y="4041481"/>
+            <a:ext cx="473206" cy="461665"/>
+          </a:xfrm>
+          <a:prstGeom prst="rect">
+            <a:avLst/>
+          </a:prstGeom>
+        </p:spPr>
+        <p:txBody>
+          <a:bodyPr wrap="none">
+            <a:spAutoFit/>
+          </a:bodyPr>
+          <a:lstStyle/>
+          <a:p>
+            <a:pPr algn="ctr"/>
+            <a:r>
+              <a:rPr lang="en-US" altLang="ja-JP" sz="2400" dirty="0" smtClean="0"/>
+              <a:t>x1</a:t>
+            </a:r>
+            <a:endParaRPr lang="ja-JP" altLang="en-US" sz="2400" dirty="0"/>
+          </a:p>
+        </p:txBody>
+      </p:sp>
+      <p:sp>
+        <p:nvSpPr>
+          <p:cNvPr id="32" name="正方形/長方形 31"/>
+          <p:cNvSpPr/>
+          <p:nvPr/>
+        </p:nvSpPr>
+        <p:spPr>
+          <a:xfrm>
+            <a:off x="992232" y="2710822"/>
+            <a:ext cx="280939" cy="720762"/>
+          </a:xfrm>
+          <a:prstGeom prst="rect">
+            <a:avLst/>
+          </a:prstGeom>
+          <a:solidFill>
+            <a:srgbClr val="00B0F0"/>
+          </a:solidFill>
+          <a:ln w="25400">
+            <a:solidFill>
+              <a:schemeClr val="tx1"/>
+            </a:solidFill>
+          </a:ln>
+        </p:spPr>
+        <p:style>
+          <a:lnRef idx="2">
+            <a:schemeClr val="accent1">
+              <a:shade val="50000"/>
+            </a:schemeClr>
+          </a:lnRef>
+          <a:fillRef idx="1">
+            <a:schemeClr val="accent1"/>
+          </a:fillRef>
+          <a:effectRef idx="0">
+            <a:schemeClr val="accent1"/>
+          </a:effectRef>
+          <a:fontRef idx="minor">
+            <a:schemeClr val="lt1"/>
+          </a:fontRef>
+        </p:style>
+        <p:txBody>
+          <a:bodyPr rtlCol="0" anchor="ctr"/>
+          <a:lstStyle/>
+          <a:p>
+            <a:pPr algn="ctr"/>
+            <a:endParaRPr kumimoji="1" lang="ja-JP" altLang="en-US"/>
+          </a:p>
+        </p:txBody>
+      </p:sp>
+      <p:cxnSp>
+        <p:nvCxnSpPr>
+          <p:cNvPr id="33" name="直線矢印コネクタ 32"/>
+          <p:cNvCxnSpPr>
+            <a:stCxn id="31" idx="0"/>
+            <a:endCxn id="32" idx="2"/>
+          </p:cNvCxnSpPr>
+          <p:nvPr/>
+        </p:nvCxnSpPr>
+        <p:spPr>
+          <a:xfrm flipV="1">
+            <a:off x="1131644" y="3431584"/>
+            <a:ext cx="1058" cy="609897"/>
+          </a:xfrm>
+          <a:prstGeom prst="straightConnector1">
+            <a:avLst/>
+          </a:prstGeom>
+          <a:ln w="31750">
+            <a:solidFill>
+              <a:schemeClr val="tx1"/>
+            </a:solidFill>
+            <a:tailEnd type="arrow"/>
+          </a:ln>
+        </p:spPr>
+        <p:style>
+          <a:lnRef idx="1">
+            <a:schemeClr val="accent1"/>
+          </a:lnRef>
+          <a:fillRef idx="0">
+            <a:schemeClr val="accent1"/>
+          </a:fillRef>
+          <a:effectRef idx="0">
+            <a:schemeClr val="accent1"/>
+          </a:effectRef>
+          <a:fontRef idx="minor">
+            <a:schemeClr val="tx1"/>
+          </a:fontRef>
+        </p:style>
+      </p:cxnSp>
+      <p:sp>
+        <p:nvSpPr>
+          <p:cNvPr id="54" name="正方形/長方形 53"/>
+          <p:cNvSpPr/>
+          <p:nvPr/>
+        </p:nvSpPr>
+        <p:spPr>
+          <a:xfrm>
+            <a:off x="891835" y="1606986"/>
+            <a:ext cx="479618" cy="461665"/>
+          </a:xfrm>
+          <a:prstGeom prst="rect">
+            <a:avLst/>
+          </a:prstGeom>
+        </p:spPr>
+        <p:txBody>
+          <a:bodyPr wrap="none">
+            <a:spAutoFit/>
+          </a:bodyPr>
+          <a:lstStyle/>
+          <a:p>
+            <a:r>
+              <a:rPr lang="en-US" altLang="ja-JP" sz="2400" dirty="0" smtClean="0"/>
+              <a:t>y1</a:t>
+            </a:r>
+            <a:endParaRPr lang="ja-JP" altLang="en-US" sz="2400" dirty="0"/>
+          </a:p>
+        </p:txBody>
+      </p:sp>
+      <p:sp>
+        <p:nvSpPr>
+          <p:cNvPr id="57" name="正方形/長方形 56"/>
+          <p:cNvSpPr/>
+          <p:nvPr/>
+        </p:nvSpPr>
+        <p:spPr>
+          <a:xfrm>
+            <a:off x="1236657" y="2310205"/>
+            <a:ext cx="502062" cy="461665"/>
+          </a:xfrm>
+          <a:prstGeom prst="rect">
+            <a:avLst/>
+          </a:prstGeom>
+        </p:spPr>
+        <p:txBody>
+          <a:bodyPr wrap="none">
+            <a:spAutoFit/>
+          </a:bodyPr>
+          <a:lstStyle/>
+          <a:p>
+            <a:pPr algn="ctr"/>
+            <a:r>
+              <a:rPr lang="en-US" altLang="ja-JP" sz="2400" dirty="0"/>
+              <a:t>h</a:t>
+            </a:r>
+            <a:r>
+              <a:rPr lang="en-US" altLang="ja-JP" sz="2400" dirty="0" smtClean="0"/>
+              <a:t>1</a:t>
+            </a:r>
+            <a:endParaRPr lang="ja-JP" altLang="en-US" sz="2400" dirty="0"/>
+          </a:p>
+        </p:txBody>
+      </p:sp>
+      <p:pic>
+        <p:nvPicPr>
+          <p:cNvPr id="8" name="図 7"/>
+          <p:cNvPicPr>
+            <a:picLocks noChangeAspect="1"/>
+          </p:cNvPicPr>
+          <p:nvPr>
+            <p:custDataLst>
+              <p:tags r:id="rId1"/>
+            </p:custDataLst>
+          </p:nvPr>
+        </p:nvPicPr>
+        <p:blipFill>
+          <a:blip r:embed="rId4" cstate="print">
+            <a:extLst>
+              <a:ext uri="{28A0092B-C50C-407E-A947-70E740481C1C}">
+                <a14:useLocalDpi xmlns:a14="http://schemas.microsoft.com/office/drawing/2010/main" val="0"/>
+              </a:ext>
+            </a:extLst>
+          </a:blip>
+          <a:stretch>
+            <a:fillRect/>
+          </a:stretch>
+        </p:blipFill>
+        <p:spPr>
+          <a:xfrm>
+            <a:off x="573472" y="2305868"/>
+            <a:ext cx="254172" cy="301714"/>
+          </a:xfrm>
+          <a:prstGeom prst="rect">
+            <a:avLst/>
+          </a:prstGeom>
+        </p:spPr>
+      </p:pic>
+      <p:pic>
+        <p:nvPicPr>
+          <p:cNvPr id="11" name="図 10"/>
+          <p:cNvPicPr>
+            <a:picLocks noChangeAspect="1"/>
+          </p:cNvPicPr>
+          <p:nvPr>
+            <p:custDataLst>
+              <p:tags r:id="rId2"/>
+            </p:custDataLst>
+          </p:nvPr>
+        </p:nvPicPr>
+        <p:blipFill>
+          <a:blip r:embed="rId5" cstate="print">
+            <a:extLst>
+              <a:ext uri="{28A0092B-C50C-407E-A947-70E740481C1C}">
+                <a14:useLocalDpi xmlns:a14="http://schemas.microsoft.com/office/drawing/2010/main" val="0"/>
+              </a:ext>
+            </a:extLst>
+          </a:blip>
+          <a:stretch>
+            <a:fillRect/>
+          </a:stretch>
+        </p:blipFill>
+        <p:spPr>
+          <a:xfrm>
+            <a:off x="553879" y="3631663"/>
+            <a:ext cx="265143" cy="274285"/>
+          </a:xfrm>
+          <a:prstGeom prst="rect">
+            <a:avLst/>
+          </a:prstGeom>
+        </p:spPr>
+      </p:pic>
+      <p:cxnSp>
+        <p:nvCxnSpPr>
+          <p:cNvPr id="63" name="直線矢印コネクタ 62"/>
+          <p:cNvCxnSpPr>
+            <a:stCxn id="32" idx="3"/>
+            <a:endCxn id="69" idx="1"/>
+          </p:cNvCxnSpPr>
+          <p:nvPr/>
+        </p:nvCxnSpPr>
+        <p:spPr>
+          <a:xfrm>
+            <a:off x="1273171" y="3071203"/>
+            <a:ext cx="609424" cy="0"/>
+          </a:xfrm>
+          <a:prstGeom prst="straightConnector1">
+            <a:avLst/>
+          </a:prstGeom>
+          <a:ln w="31750">
+            <a:solidFill>
+              <a:schemeClr val="tx1"/>
+            </a:solidFill>
+            <a:tailEnd type="arrow"/>
+          </a:ln>
+        </p:spPr>
+        <p:style>
+          <a:lnRef idx="1">
+            <a:schemeClr val="accent1"/>
+          </a:lnRef>
+          <a:fillRef idx="0">
+            <a:schemeClr val="accent1"/>
+          </a:fillRef>
+          <a:effectRef idx="0">
+            <a:schemeClr val="accent1"/>
+          </a:effectRef>
+          <a:fontRef idx="minor">
+            <a:schemeClr val="tx1"/>
+          </a:fontRef>
+        </p:style>
+      </p:cxnSp>
+      <p:cxnSp>
+        <p:nvCxnSpPr>
+          <p:cNvPr id="67" name="直線矢印コネクタ 66"/>
+          <p:cNvCxnSpPr>
+            <a:stCxn id="69" idx="0"/>
+            <a:endCxn id="71" idx="2"/>
+          </p:cNvCxnSpPr>
+          <p:nvPr/>
+        </p:nvCxnSpPr>
+        <p:spPr>
+          <a:xfrm flipH="1" flipV="1">
+            <a:off x="2022007" y="2068651"/>
+            <a:ext cx="1058" cy="642171"/>
+          </a:xfrm>
+          <a:prstGeom prst="straightConnector1">
+            <a:avLst/>
+          </a:prstGeom>
+          <a:ln w="31750">
+            <a:solidFill>
+              <a:schemeClr val="tx1"/>
+            </a:solidFill>
+            <a:tailEnd type="arrow"/>
+          </a:ln>
+        </p:spPr>
+        <p:style>
+          <a:lnRef idx="1">
+            <a:schemeClr val="accent1"/>
+          </a:lnRef>
+          <a:fillRef idx="0">
+            <a:schemeClr val="accent1"/>
+          </a:fillRef>
+          <a:effectRef idx="0">
+            <a:schemeClr val="accent1"/>
+          </a:effectRef>
+          <a:fontRef idx="minor">
+            <a:schemeClr val="tx1"/>
+          </a:fontRef>
+        </p:style>
+      </p:cxnSp>
+      <p:sp>
+        <p:nvSpPr>
+          <p:cNvPr id="68" name="正方形/長方形 67"/>
+          <p:cNvSpPr/>
+          <p:nvPr/>
+        </p:nvSpPr>
+        <p:spPr>
+          <a:xfrm>
+            <a:off x="1785404" y="4041481"/>
+            <a:ext cx="473206" cy="461665"/>
+          </a:xfrm>
+          <a:prstGeom prst="rect">
+            <a:avLst/>
+          </a:prstGeom>
+        </p:spPr>
+        <p:txBody>
+          <a:bodyPr wrap="none">
+            <a:spAutoFit/>
+          </a:bodyPr>
+          <a:lstStyle/>
+          <a:p>
+            <a:pPr algn="ctr"/>
+            <a:r>
+              <a:rPr lang="en-US" altLang="ja-JP" sz="2400" dirty="0" smtClean="0"/>
+              <a:t>x2</a:t>
+            </a:r>
+            <a:endParaRPr lang="ja-JP" altLang="en-US" sz="2400" dirty="0"/>
+          </a:p>
+        </p:txBody>
+      </p:sp>
+      <p:sp>
+        <p:nvSpPr>
+          <p:cNvPr id="69" name="正方形/長方形 68"/>
+          <p:cNvSpPr/>
+          <p:nvPr/>
+        </p:nvSpPr>
+        <p:spPr>
+          <a:xfrm>
+            <a:off x="1882595" y="2710822"/>
+            <a:ext cx="280939" cy="720762"/>
+          </a:xfrm>
+          <a:prstGeom prst="rect">
+            <a:avLst/>
+          </a:prstGeom>
+          <a:solidFill>
+            <a:srgbClr val="00B0F0"/>
+          </a:solidFill>
+          <a:ln w="25400">
+            <a:solidFill>
+              <a:schemeClr val="tx1"/>
+            </a:solidFill>
+          </a:ln>
+        </p:spPr>
+        <p:style>
+          <a:lnRef idx="2">
+            <a:schemeClr val="accent1">
+              <a:shade val="50000"/>
+            </a:schemeClr>
+          </a:lnRef>
+          <a:fillRef idx="1">
+            <a:schemeClr val="accent1"/>
+          </a:fillRef>
+          <a:effectRef idx="0">
+            <a:schemeClr val="accent1"/>
+          </a:effectRef>
+          <a:fontRef idx="minor">
+            <a:schemeClr val="lt1"/>
+          </a:fontRef>
+        </p:style>
+        <p:txBody>
+          <a:bodyPr rtlCol="0" anchor="ctr"/>
+          <a:lstStyle/>
+          <a:p>
+            <a:pPr algn="ctr"/>
+            <a:endParaRPr kumimoji="1" lang="ja-JP" altLang="en-US"/>
+          </a:p>
+        </p:txBody>
+      </p:sp>
+      <p:cxnSp>
+        <p:nvCxnSpPr>
+          <p:cNvPr id="70" name="直線矢印コネクタ 69"/>
+          <p:cNvCxnSpPr>
+            <a:stCxn id="68" idx="0"/>
+            <a:endCxn id="69" idx="2"/>
+          </p:cNvCxnSpPr>
+          <p:nvPr/>
+        </p:nvCxnSpPr>
+        <p:spPr>
+          <a:xfrm flipV="1">
+            <a:off x="2022007" y="3431584"/>
+            <a:ext cx="1058" cy="609897"/>
+          </a:xfrm>
+          <a:prstGeom prst="straightConnector1">
+            <a:avLst/>
+          </a:prstGeom>
+          <a:ln w="31750">
+            <a:solidFill>
+              <a:schemeClr val="tx1"/>
+            </a:solidFill>
+            <a:tailEnd type="arrow"/>
+          </a:ln>
+        </p:spPr>
+        <p:style>
+          <a:lnRef idx="1">
+            <a:schemeClr val="accent1"/>
+          </a:lnRef>
+          <a:fillRef idx="0">
+            <a:schemeClr val="accent1"/>
+          </a:fillRef>
+          <a:effectRef idx="0">
+            <a:schemeClr val="accent1"/>
+          </a:effectRef>
+          <a:fontRef idx="minor">
+            <a:schemeClr val="tx1"/>
+          </a:fontRef>
+        </p:style>
+      </p:cxnSp>
+      <p:sp>
+        <p:nvSpPr>
+          <p:cNvPr id="71" name="正方形/長方形 70"/>
+          <p:cNvSpPr/>
+          <p:nvPr/>
+        </p:nvSpPr>
+        <p:spPr>
+          <a:xfrm>
+            <a:off x="1782198" y="1606986"/>
+            <a:ext cx="479618" cy="461665"/>
+          </a:xfrm>
+          <a:prstGeom prst="rect">
+            <a:avLst/>
+          </a:prstGeom>
+        </p:spPr>
+        <p:txBody>
+          <a:bodyPr wrap="none">
+            <a:spAutoFit/>
+          </a:bodyPr>
+          <a:lstStyle/>
+          <a:p>
+            <a:r>
+              <a:rPr lang="en-US" altLang="ja-JP" sz="2400" dirty="0" smtClean="0"/>
+              <a:t>y2</a:t>
+            </a:r>
+            <a:endParaRPr lang="ja-JP" altLang="en-US" sz="2400" dirty="0"/>
+          </a:p>
+        </p:txBody>
+      </p:sp>
+      <p:sp>
+        <p:nvSpPr>
+          <p:cNvPr id="72" name="正方形/長方形 71"/>
+          <p:cNvSpPr/>
+          <p:nvPr/>
+        </p:nvSpPr>
+        <p:spPr>
+          <a:xfrm>
+            <a:off x="2138242" y="2322957"/>
+            <a:ext cx="502062" cy="461665"/>
+          </a:xfrm>
+          <a:prstGeom prst="rect">
+            <a:avLst/>
+          </a:prstGeom>
+        </p:spPr>
+        <p:txBody>
+          <a:bodyPr wrap="none">
+            <a:spAutoFit/>
+          </a:bodyPr>
+          <a:lstStyle/>
+          <a:p>
+            <a:pPr algn="ctr"/>
+            <a:r>
+              <a:rPr lang="en-US" altLang="ja-JP" sz="2400" dirty="0" smtClean="0"/>
+              <a:t>h</a:t>
+            </a:r>
+            <a:r>
+              <a:rPr lang="en-US" altLang="ja-JP" sz="2400" dirty="0"/>
+              <a:t>2</a:t>
+            </a:r>
+            <a:endParaRPr lang="ja-JP" altLang="en-US" sz="2400" dirty="0"/>
+          </a:p>
+        </p:txBody>
+      </p:sp>
+      <p:sp>
+        <p:nvSpPr>
+          <p:cNvPr id="77" name="正方形/長方形 76"/>
+          <p:cNvSpPr/>
+          <p:nvPr/>
+        </p:nvSpPr>
+        <p:spPr>
+          <a:xfrm>
+            <a:off x="2814088" y="2771308"/>
+            <a:ext cx="415499" cy="461665"/>
+          </a:xfrm>
+          <a:prstGeom prst="rect">
+            <a:avLst/>
+          </a:prstGeom>
+        </p:spPr>
+        <p:txBody>
+          <a:bodyPr wrap="none">
+            <a:spAutoFit/>
+          </a:bodyPr>
+          <a:lstStyle/>
+          <a:p>
+            <a:pPr algn="ctr"/>
+            <a:r>
+              <a:rPr lang="en-US" altLang="ja-JP" sz="2400" dirty="0" smtClean="0"/>
+              <a:t>...</a:t>
+            </a:r>
+            <a:endParaRPr lang="ja-JP" altLang="en-US" sz="2400" dirty="0"/>
+          </a:p>
+        </p:txBody>
+      </p:sp>
+      <p:cxnSp>
+        <p:nvCxnSpPr>
+          <p:cNvPr id="78" name="直線矢印コネクタ 77"/>
+          <p:cNvCxnSpPr>
+            <a:stCxn id="80" idx="0"/>
+            <a:endCxn id="82" idx="2"/>
+          </p:cNvCxnSpPr>
+          <p:nvPr/>
+        </p:nvCxnSpPr>
+        <p:spPr>
+          <a:xfrm flipV="1">
+            <a:off x="3625171" y="2068651"/>
+            <a:ext cx="2436" cy="642171"/>
+          </a:xfrm>
+          <a:prstGeom prst="straightConnector1">
+            <a:avLst/>
+          </a:prstGeom>
+          <a:ln w="31750">
+            <a:solidFill>
+              <a:schemeClr val="tx1"/>
+            </a:solidFill>
+            <a:tailEnd type="arrow"/>
+          </a:ln>
+        </p:spPr>
+        <p:style>
+          <a:lnRef idx="1">
+            <a:schemeClr val="accent1"/>
+          </a:lnRef>
+          <a:fillRef idx="0">
+            <a:schemeClr val="accent1"/>
+          </a:fillRef>
+          <a:effectRef idx="0">
+            <a:schemeClr val="accent1"/>
+          </a:effectRef>
+          <a:fontRef idx="minor">
+            <a:schemeClr val="tx1"/>
+          </a:fontRef>
+        </p:style>
+      </p:cxnSp>
+      <p:sp>
+        <p:nvSpPr>
+          <p:cNvPr id="79" name="正方形/長方形 78"/>
+          <p:cNvSpPr/>
+          <p:nvPr/>
+        </p:nvSpPr>
+        <p:spPr>
+          <a:xfrm>
+            <a:off x="3413510" y="4041481"/>
+            <a:ext cx="421206" cy="461665"/>
+          </a:xfrm>
+          <a:prstGeom prst="rect">
+            <a:avLst/>
+          </a:prstGeom>
+        </p:spPr>
+        <p:txBody>
+          <a:bodyPr wrap="none">
+            <a:spAutoFit/>
+          </a:bodyPr>
+          <a:lstStyle/>
+          <a:p>
+            <a:pPr algn="ctr"/>
+            <a:r>
+              <a:rPr lang="en-US" altLang="ja-JP" sz="2400" dirty="0" err="1" smtClean="0"/>
+              <a:t>xt</a:t>
+            </a:r>
+            <a:endParaRPr lang="ja-JP" altLang="en-US" sz="2400" dirty="0"/>
+          </a:p>
+        </p:txBody>
+      </p:sp>
+      <p:sp>
+        <p:nvSpPr>
+          <p:cNvPr id="80" name="正方形/長方形 79"/>
+          <p:cNvSpPr/>
+          <p:nvPr/>
+        </p:nvSpPr>
+        <p:spPr>
+          <a:xfrm>
+            <a:off x="3484701" y="2710822"/>
+            <a:ext cx="280939" cy="720762"/>
+          </a:xfrm>
+          <a:prstGeom prst="rect">
+            <a:avLst/>
+          </a:prstGeom>
+          <a:solidFill>
+            <a:srgbClr val="00B0F0"/>
+          </a:solidFill>
+          <a:ln w="25400">
+            <a:solidFill>
+              <a:schemeClr val="tx1"/>
+            </a:solidFill>
+          </a:ln>
+        </p:spPr>
+        <p:style>
+          <a:lnRef idx="2">
+            <a:schemeClr val="accent1">
+              <a:shade val="50000"/>
+            </a:schemeClr>
+          </a:lnRef>
+          <a:fillRef idx="1">
+            <a:schemeClr val="accent1"/>
+          </a:fillRef>
+          <a:effectRef idx="0">
+            <a:schemeClr val="accent1"/>
+          </a:effectRef>
+          <a:fontRef idx="minor">
+            <a:schemeClr val="lt1"/>
+          </a:fontRef>
+        </p:style>
+        <p:txBody>
+          <a:bodyPr rtlCol="0" anchor="ctr"/>
+          <a:lstStyle/>
+          <a:p>
+            <a:pPr algn="ctr"/>
+            <a:endParaRPr kumimoji="1" lang="ja-JP" altLang="en-US"/>
+          </a:p>
+        </p:txBody>
+      </p:sp>
+      <p:cxnSp>
+        <p:nvCxnSpPr>
+          <p:cNvPr id="81" name="直線矢印コネクタ 80"/>
+          <p:cNvCxnSpPr>
+            <a:stCxn id="79" idx="0"/>
+            <a:endCxn id="80" idx="2"/>
+          </p:cNvCxnSpPr>
+          <p:nvPr/>
+        </p:nvCxnSpPr>
+        <p:spPr>
+          <a:xfrm flipV="1">
+            <a:off x="3624113" y="3431584"/>
+            <a:ext cx="1058" cy="609897"/>
+          </a:xfrm>
+          <a:prstGeom prst="straightConnector1">
+            <a:avLst/>
+          </a:prstGeom>
+          <a:ln w="31750">
+            <a:solidFill>
+              <a:schemeClr val="tx1"/>
+            </a:solidFill>
+            <a:tailEnd type="arrow"/>
+          </a:ln>
+        </p:spPr>
+        <p:style>
+          <a:lnRef idx="1">
+            <a:schemeClr val="accent1"/>
+          </a:lnRef>
+          <a:fillRef idx="0">
+            <a:schemeClr val="accent1"/>
+          </a:fillRef>
+          <a:effectRef idx="0">
+            <a:schemeClr val="accent1"/>
+          </a:effectRef>
+          <a:fontRef idx="minor">
+            <a:schemeClr val="tx1"/>
+          </a:fontRef>
+        </p:style>
+      </p:cxnSp>
+      <p:sp>
+        <p:nvSpPr>
+          <p:cNvPr id="82" name="正方形/長方形 81"/>
+          <p:cNvSpPr/>
+          <p:nvPr/>
+        </p:nvSpPr>
+        <p:spPr>
+          <a:xfrm>
+            <a:off x="3413510" y="1606986"/>
+            <a:ext cx="428194" cy="461665"/>
+          </a:xfrm>
+          <a:prstGeom prst="rect">
+            <a:avLst/>
+          </a:prstGeom>
+        </p:spPr>
+        <p:txBody>
+          <a:bodyPr wrap="none">
+            <a:spAutoFit/>
+          </a:bodyPr>
+          <a:lstStyle/>
+          <a:p>
+            <a:r>
+              <a:rPr lang="en-US" altLang="ja-JP" sz="2400" dirty="0" err="1" smtClean="0"/>
+              <a:t>yt</a:t>
+            </a:r>
+            <a:endParaRPr lang="ja-JP" altLang="en-US" sz="2400" dirty="0"/>
+          </a:p>
+        </p:txBody>
+      </p:sp>
+      <p:sp>
+        <p:nvSpPr>
+          <p:cNvPr id="83" name="正方形/長方形 82"/>
+          <p:cNvSpPr/>
+          <p:nvPr/>
+        </p:nvSpPr>
+        <p:spPr>
+          <a:xfrm>
+            <a:off x="3748889" y="2322957"/>
+            <a:ext cx="446276" cy="461665"/>
+          </a:xfrm>
+          <a:prstGeom prst="rect">
+            <a:avLst/>
+          </a:prstGeom>
+        </p:spPr>
+        <p:txBody>
+          <a:bodyPr wrap="none">
+            <a:spAutoFit/>
+          </a:bodyPr>
+          <a:lstStyle/>
+          <a:p>
+            <a:pPr algn="ctr"/>
+            <a:r>
+              <a:rPr lang="en-US" altLang="ja-JP" sz="2400" dirty="0" err="1" smtClean="0"/>
+              <a:t>ht</a:t>
+            </a:r>
+            <a:endParaRPr lang="ja-JP" altLang="en-US" sz="2400" dirty="0"/>
+          </a:p>
+        </p:txBody>
+      </p:sp>
+      <p:cxnSp>
+        <p:nvCxnSpPr>
+          <p:cNvPr id="85" name="直線矢印コネクタ 84"/>
+          <p:cNvCxnSpPr>
+            <a:stCxn id="69" idx="3"/>
+          </p:cNvCxnSpPr>
+          <p:nvPr/>
+        </p:nvCxnSpPr>
+        <p:spPr>
+          <a:xfrm>
+            <a:off x="2163534" y="3071203"/>
+            <a:ext cx="584132" cy="0"/>
+          </a:xfrm>
+          <a:prstGeom prst="straightConnector1">
+            <a:avLst/>
+          </a:prstGeom>
+          <a:ln w="31750">
+            <a:solidFill>
+              <a:schemeClr val="tx1"/>
+            </a:solidFill>
+            <a:tailEnd type="arrow"/>
+          </a:ln>
+        </p:spPr>
+        <p:style>
+          <a:lnRef idx="1">
+            <a:schemeClr val="accent1"/>
+          </a:lnRef>
+          <a:fillRef idx="0">
+            <a:schemeClr val="accent1"/>
+          </a:fillRef>
+          <a:effectRef idx="0">
+            <a:schemeClr val="accent1"/>
+          </a:effectRef>
+          <a:fontRef idx="minor">
+            <a:schemeClr val="tx1"/>
+          </a:fontRef>
+        </p:style>
+      </p:cxnSp>
+    </p:spTree>
+    <p:extLst>
+      <p:ext uri="{BB962C8B-B14F-4D97-AF65-F5344CB8AC3E}">
+        <p14:creationId xmlns:p14="http://schemas.microsoft.com/office/powerpoint/2010/main" val="2919557292"/>
+      </p:ext>
+    </p:extLst>
+  </p:cSld>
+  <p:clrMapOvr>
+    <a:masterClrMapping/>
+  </p:clrMapOvr>
+  <p:timing>
+    <p:tnLst>
+      <p:par>
+        <p:cTn id="1" dur="indefinite" restart="never" nodeType="tmRoot"/>
+      </p:par>
+    </p:tnLst>
+  </p:timing>
+</p:sld>
+</file>
+
+<file path=ppt/slides/slide4.xml><?xml version="1.0" encoding="utf-8"?>
+<p:sld xmlns:a="http://schemas.openxmlformats.org/drawingml/2006/main" xmlns:r="http://schemas.openxmlformats.org/officeDocument/2006/relationships" xmlns:p="http://schemas.openxmlformats.org/presentationml/2006/main">
+  <p:cSld>
+    <p:spTree>
+      <p:nvGrpSpPr>
+        <p:cNvPr id="1" name=""/>
+        <p:cNvGrpSpPr/>
+        <p:nvPr/>
+      </p:nvGrpSpPr>
+      <p:grpSpPr>
+        <a:xfrm>
+          <a:off x="0" y="0"/>
+          <a:ext cx="0" cy="0"/>
+          <a:chOff x="0" y="0"/>
+          <a:chExt cx="0" cy="0"/>
+        </a:xfrm>
+      </p:grpSpPr>
+      <p:sp>
+        <p:nvSpPr>
+          <p:cNvPr id="9" name="正方形/長方形 8"/>
+          <p:cNvSpPr/>
+          <p:nvPr/>
+        </p:nvSpPr>
+        <p:spPr>
+          <a:xfrm>
+            <a:off x="967076" y="4436632"/>
+            <a:ext cx="1439730" cy="441063"/>
+          </a:xfrm>
+          <a:prstGeom prst="rect">
+            <a:avLst/>
+          </a:prstGeom>
+          <a:solidFill>
+            <a:srgbClr val="00B0F0"/>
+          </a:solidFill>
+          <a:ln>
+            <a:noFill/>
+          </a:ln>
+        </p:spPr>
+        <p:style>
+          <a:lnRef idx="2">
+            <a:schemeClr val="accent1">
+              <a:shade val="50000"/>
+            </a:schemeClr>
+          </a:lnRef>
+          <a:fillRef idx="1">
+            <a:schemeClr val="accent1"/>
+          </a:fillRef>
+          <a:effectRef idx="0">
+            <a:schemeClr val="accent1"/>
+          </a:effectRef>
+          <a:fontRef idx="minor">
+            <a:schemeClr val="lt1"/>
+          </a:fontRef>
+        </p:style>
+        <p:txBody>
+          <a:bodyPr rtlCol="0" anchor="ctr"/>
+          <a:lstStyle/>
+          <a:p>
+            <a:pPr algn="ctr"/>
+            <a:r>
+              <a:rPr lang="en-US" altLang="ja-JP" sz="2400" dirty="0"/>
+              <a:t>x</a:t>
+            </a:r>
+            <a:endParaRPr kumimoji="1" lang="ja-JP" altLang="en-US" sz="2400" dirty="0"/>
+          </a:p>
+        </p:txBody>
+      </p:sp>
+      <p:sp>
+        <p:nvSpPr>
+          <p:cNvPr id="10" name="正方形/長方形 9"/>
+          <p:cNvSpPr/>
+          <p:nvPr/>
+        </p:nvSpPr>
+        <p:spPr>
+          <a:xfrm>
+            <a:off x="967076" y="3571538"/>
+            <a:ext cx="1439730" cy="441063"/>
+          </a:xfrm>
+          <a:prstGeom prst="rect">
+            <a:avLst/>
+          </a:prstGeom>
+          <a:solidFill>
+            <a:srgbClr val="00B0F0"/>
+          </a:solidFill>
+          <a:ln>
+            <a:noFill/>
+          </a:ln>
+        </p:spPr>
+        <p:style>
+          <a:lnRef idx="2">
+            <a:schemeClr val="accent1">
+              <a:shade val="50000"/>
+            </a:schemeClr>
+          </a:lnRef>
+          <a:fillRef idx="1">
+            <a:schemeClr val="accent1"/>
+          </a:fillRef>
+          <a:effectRef idx="0">
+            <a:schemeClr val="accent1"/>
+          </a:effectRef>
+          <a:fontRef idx="minor">
+            <a:schemeClr val="lt1"/>
+          </a:fontRef>
+        </p:style>
+        <p:txBody>
+          <a:bodyPr rtlCol="0" anchor="ctr"/>
+          <a:lstStyle/>
+          <a:p>
+            <a:pPr algn="ctr"/>
             <a:endParaRPr kumimoji="1" lang="ja-JP" altLang="en-US" sz="2400" dirty="0"/>
           </a:p>
         </p:txBody>
@@ -3939,8 +5704,8 @@
         </p:nvCxnSpPr>
         <p:spPr>
           <a:xfrm flipV="1">
-            <a:off x="1700605" y="1862865"/>
-            <a:ext cx="0" cy="417756"/>
+            <a:off x="1686941" y="4012601"/>
+            <a:ext cx="0" cy="424031"/>
           </a:xfrm>
           <a:prstGeom prst="straightConnector1">
             <a:avLst/>
@@ -3975,7 +5740,7 @@
         </p:nvSpPr>
         <p:spPr>
           <a:xfrm>
-            <a:off x="980740" y="556708"/>
+            <a:off x="967076" y="2706444"/>
             <a:ext cx="1439730" cy="441063"/>
           </a:xfrm>
           <a:prstGeom prst="rect">
@@ -4009,10 +5774,6 @@
           <a:lstStyle/>
           <a:p>
             <a:pPr algn="ctr"/>
-            <a:r>
-              <a:rPr kumimoji="1" lang="en-US" altLang="ja-JP" sz="2400" dirty="0" smtClean="0"/>
-              <a:t>f3</a:t>
-            </a:r>
             <a:endParaRPr kumimoji="1" lang="ja-JP" altLang="en-US" sz="2400" dirty="0"/>
           </a:p>
         </p:txBody>
@@ -4028,7 +5789,7 @@
         </p:nvCxnSpPr>
         <p:spPr>
           <a:xfrm flipV="1">
-            <a:off x="1700605" y="997771"/>
+            <a:off x="1686941" y="3147507"/>
             <a:ext cx="0" cy="424031"/>
           </a:xfrm>
           <a:prstGeom prst="straightConnector1">
@@ -4506,6 +6267,188 @@
           </a:fontRef>
         </p:style>
       </p:cxnSp>
+      <p:sp>
+        <p:nvSpPr>
+          <p:cNvPr id="4" name="テキスト ボックス 3"/>
+          <p:cNvSpPr txBox="1"/>
+          <p:nvPr/>
+        </p:nvSpPr>
+        <p:spPr>
+          <a:xfrm>
+            <a:off x="2404114" y="4012601"/>
+            <a:ext cx="1021977" cy="461665"/>
+          </a:xfrm>
+          <a:prstGeom prst="rect">
+            <a:avLst/>
+          </a:prstGeom>
+          <a:noFill/>
+        </p:spPr>
+        <p:txBody>
+          <a:bodyPr wrap="square" rtlCol="0">
+            <a:spAutoFit/>
+          </a:bodyPr>
+          <a:lstStyle/>
+          <a:p>
+            <a:pPr algn="ctr"/>
+            <a:r>
+              <a:rPr kumimoji="1" lang="en-US" altLang="ja-JP" sz="2400" dirty="0" smtClean="0"/>
+              <a:t>Linear</a:t>
+            </a:r>
+            <a:endParaRPr kumimoji="1" lang="ja-JP" altLang="en-US" sz="2400" dirty="0"/>
+          </a:p>
+        </p:txBody>
+      </p:sp>
+      <p:sp>
+        <p:nvSpPr>
+          <p:cNvPr id="21" name="テキスト ボックス 20"/>
+          <p:cNvSpPr txBox="1"/>
+          <p:nvPr/>
+        </p:nvSpPr>
+        <p:spPr>
+          <a:xfrm>
+            <a:off x="2404115" y="3128690"/>
+            <a:ext cx="1021977" cy="461665"/>
+          </a:xfrm>
+          <a:prstGeom prst="rect">
+            <a:avLst/>
+          </a:prstGeom>
+          <a:noFill/>
+        </p:spPr>
+        <p:txBody>
+          <a:bodyPr wrap="square" rtlCol="0">
+            <a:spAutoFit/>
+          </a:bodyPr>
+          <a:lstStyle/>
+          <a:p>
+            <a:pPr algn="ctr"/>
+            <a:r>
+              <a:rPr kumimoji="1" lang="en-US" altLang="ja-JP" sz="2400" dirty="0" err="1" smtClean="0"/>
+              <a:t>relu</a:t>
+            </a:r>
+            <a:endParaRPr kumimoji="1" lang="ja-JP" altLang="en-US" sz="2400" dirty="0"/>
+          </a:p>
+        </p:txBody>
+      </p:sp>
+      <p:sp>
+        <p:nvSpPr>
+          <p:cNvPr id="23" name="正方形/長方形 22"/>
+          <p:cNvSpPr/>
+          <p:nvPr/>
+        </p:nvSpPr>
+        <p:spPr>
+          <a:xfrm>
+            <a:off x="964384" y="1801441"/>
+            <a:ext cx="1439730" cy="441063"/>
+          </a:xfrm>
+          <a:prstGeom prst="rect">
+            <a:avLst/>
+          </a:prstGeom>
+          <a:solidFill>
+            <a:srgbClr val="00B0F0"/>
+          </a:solidFill>
+          <a:ln>
+            <a:noFill/>
+          </a:ln>
+        </p:spPr>
+        <p:style>
+          <a:lnRef idx="2">
+            <a:schemeClr val="accent1">
+              <a:shade val="50000"/>
+            </a:schemeClr>
+          </a:lnRef>
+          <a:fillRef idx="1">
+            <a:schemeClr val="accent1"/>
+          </a:fillRef>
+          <a:effectRef idx="0">
+            <a:schemeClr val="accent1"/>
+          </a:effectRef>
+          <a:fontRef idx="minor">
+            <a:schemeClr val="lt1"/>
+          </a:fontRef>
+        </p:style>
+        <p:txBody>
+          <a:bodyPr rtlCol="0" anchor="ctr"/>
+          <a:lstStyle/>
+          <a:p>
+            <a:pPr algn="ctr"/>
+            <a:r>
+              <a:rPr lang="en-US" altLang="ja-JP" sz="2400" dirty="0"/>
+              <a:t>y</a:t>
+            </a:r>
+            <a:endParaRPr kumimoji="1" lang="ja-JP" altLang="en-US" sz="2400" dirty="0"/>
+          </a:p>
+        </p:txBody>
+      </p:sp>
+      <p:cxnSp>
+        <p:nvCxnSpPr>
+          <p:cNvPr id="24" name="直線矢印コネクタ 23"/>
+          <p:cNvCxnSpPr>
+            <a:stCxn id="14" idx="0"/>
+            <a:endCxn id="23" idx="2"/>
+          </p:cNvCxnSpPr>
+          <p:nvPr/>
+        </p:nvCxnSpPr>
+        <p:spPr>
+          <a:xfrm flipH="1" flipV="1">
+            <a:off x="1684249" y="2242504"/>
+            <a:ext cx="2692" cy="463940"/>
+          </a:xfrm>
+          <a:prstGeom prst="straightConnector1">
+            <a:avLst/>
+          </a:prstGeom>
+          <a:ln w="31750">
+            <a:solidFill>
+              <a:schemeClr val="tx1"/>
+            </a:solidFill>
+            <a:tailEnd type="triangle"/>
+          </a:ln>
+        </p:spPr>
+        <p:style>
+          <a:lnRef idx="1">
+            <a:schemeClr val="accent1"/>
+          </a:lnRef>
+          <a:fillRef idx="0">
+            <a:schemeClr val="accent1"/>
+          </a:fillRef>
+          <a:effectRef idx="0">
+            <a:schemeClr val="accent1"/>
+          </a:effectRef>
+          <a:fontRef idx="minor">
+            <a:schemeClr val="tx1"/>
+          </a:fontRef>
+        </p:style>
+      </p:cxnSp>
+      <p:sp>
+        <p:nvSpPr>
+          <p:cNvPr id="26" name="テキスト ボックス 25"/>
+          <p:cNvSpPr txBox="1"/>
+          <p:nvPr/>
+        </p:nvSpPr>
+        <p:spPr>
+          <a:xfrm>
+            <a:off x="2421595" y="2249692"/>
+            <a:ext cx="1021977" cy="461665"/>
+          </a:xfrm>
+          <a:prstGeom prst="rect">
+            <a:avLst/>
+          </a:prstGeom>
+          <a:noFill/>
+        </p:spPr>
+        <p:txBody>
+          <a:bodyPr wrap="square" rtlCol="0">
+            <a:spAutoFit/>
+          </a:bodyPr>
+          <a:lstStyle/>
+          <a:p>
+            <a:pPr algn="ctr"/>
+            <a:r>
+              <a:rPr kumimoji="1" lang="en-US" altLang="ja-JP" sz="2400" dirty="0" smtClean="0"/>
+              <a:t>Linear</a:t>
+            </a:r>
+            <a:endParaRPr kumimoji="1" lang="ja-JP" altLang="en-US" sz="2400" dirty="0"/>
+          </a:p>
+        </p:txBody>
+      </p:sp>
     </p:spTree>
     <p:extLst>
       <p:ext uri="{BB962C8B-B14F-4D97-AF65-F5344CB8AC3E}">
@@ -4524,6 +6467,38 @@
     </p:tnLst>
   </p:timing>
 </p:sld>
+</file>
+
+<file path=ppt/tags/tag1.xml><?xml version="1.0" encoding="utf-8"?>
+<p:tagLst xmlns:a="http://schemas.openxmlformats.org/drawingml/2006/main" xmlns:r="http://schemas.openxmlformats.org/officeDocument/2006/relationships" xmlns:p="http://schemas.openxmlformats.org/presentationml/2006/main">
+  <p:tag name="ORIGINALHEIGHT" val="123.7346"/>
+  <p:tag name="ORIGINALWIDTH" val="104.237"/>
+  <p:tag name="OUTPUTDPI" val="1200"/>
+  <p:tag name="LATEXADDIN" val="\documentclass{article}&#10;\usepackage{amsmath}&#10;\pagestyle{empty}&#10;\begin{document}&#10;&#10;$f_y$&#10;&#10;&#10;\end{document}"/>
+  <p:tag name="IGUANATEXSIZE" val="24"/>
+  <p:tag name="IGUANATEXCURSOR" val="86"/>
+  <p:tag name="TRANSPARENCY" val="True"/>
+  <p:tag name="FILENAME" val=""/>
+  <p:tag name="INPUTTYPE" val="0"/>
+  <p:tag name="LATEXENGINEID" val="0"/>
+  <p:tag name="TEMPFOLDER" val="c:\temp\"/>
+</p:tagLst>
+</file>
+
+<file path=ppt/tags/tag2.xml><?xml version="1.0" encoding="utf-8"?>
+<p:tagLst xmlns:a="http://schemas.openxmlformats.org/drawingml/2006/main" xmlns:r="http://schemas.openxmlformats.org/officeDocument/2006/relationships" xmlns:p="http://schemas.openxmlformats.org/presentationml/2006/main">
+  <p:tag name="ORIGINALHEIGHT" val="112.4859"/>
+  <p:tag name="ORIGINALWIDTH" val="108.7364"/>
+  <p:tag name="OUTPUTDPI" val="1200"/>
+  <p:tag name="LATEXADDIN" val="\documentclass{article}&#10;\usepackage{amsmath}&#10;\pagestyle{empty}&#10;\begin{document}&#10;&#10;$f_h$&#10;&#10;&#10;\end{document}"/>
+  <p:tag name="IGUANATEXSIZE" val="24"/>
+  <p:tag name="IGUANATEXCURSOR" val="85"/>
+  <p:tag name="TRANSPARENCY" val="True"/>
+  <p:tag name="FILENAME" val=""/>
+  <p:tag name="INPUTTYPE" val="0"/>
+  <p:tag name="LATEXENGINEID" val="0"/>
+  <p:tag name="TEMPFOLDER" val="c:\temp\"/>
+</p:tagLst>
 </file>
 
 <file path=ppt/theme/theme1.xml><?xml version="1.0" encoding="utf-8"?>

</xml_diff>

<commit_message>
build based on 09f618e
</commit_message>
<xml_diff>
--- a/latest/assets/figures.pptx
+++ b/latest/assets/figures.pptx
@@ -3832,14 +3832,14 @@
       </p:grpSpPr>
       <p:sp>
         <p:nvSpPr>
-          <p:cNvPr id="10" name="正方形/長方形 9"/>
+          <p:cNvPr id="55" name="正方形/長方形 54"/>
           <p:cNvSpPr/>
           <p:nvPr/>
         </p:nvSpPr>
         <p:spPr>
-          <a:xfrm>
-            <a:off x="977833" y="2122843"/>
-            <a:ext cx="1439730" cy="441063"/>
+          <a:xfrm rot="5400000">
+            <a:off x="812299" y="2014024"/>
+            <a:ext cx="280939" cy="720762"/>
           </a:xfrm>
           <a:prstGeom prst="rect">
             <a:avLst/>
@@ -3847,8 +3847,10 @@
           <a:solidFill>
             <a:srgbClr val="00B0F0"/>
           </a:solidFill>
-          <a:ln>
-            <a:noFill/>
+          <a:ln w="25400">
+            <a:solidFill>
+              <a:schemeClr val="tx1"/>
+            </a:solidFill>
           </a:ln>
         </p:spPr>
         <p:style>
@@ -3872,27 +3874,53 @@
           <a:lstStyle/>
           <a:p>
             <a:pPr algn="ctr"/>
-            <a:r>
-              <a:rPr kumimoji="1" lang="en-US" altLang="ja-JP" sz="2400" dirty="0" smtClean="0"/>
-              <a:t>h1</a:t>
-            </a:r>
-            <a:endParaRPr kumimoji="1" lang="ja-JP" altLang="en-US" sz="2400" dirty="0"/>
+            <a:endParaRPr kumimoji="1" lang="ja-JP" altLang="en-US"/>
+          </a:p>
+        </p:txBody>
+      </p:sp>
+      <p:sp>
+        <p:nvSpPr>
+          <p:cNvPr id="56" name="正方形/長方形 55"/>
+          <p:cNvSpPr/>
+          <p:nvPr/>
+        </p:nvSpPr>
+        <p:spPr>
+          <a:xfrm>
+            <a:off x="793910" y="2967335"/>
+            <a:ext cx="317715" cy="461665"/>
+          </a:xfrm>
+          <a:prstGeom prst="rect">
+            <a:avLst/>
+          </a:prstGeom>
+        </p:spPr>
+        <p:txBody>
+          <a:bodyPr wrap="none">
+            <a:spAutoFit/>
+          </a:bodyPr>
+          <a:lstStyle/>
+          <a:p>
+            <a:pPr algn="ctr"/>
+            <a:r>
+              <a:rPr lang="en-US" altLang="ja-JP" sz="2400" dirty="0" smtClean="0"/>
+              <a:t>x</a:t>
+            </a:r>
+            <a:endParaRPr lang="ja-JP" altLang="en-US" sz="2400" dirty="0"/>
           </a:p>
         </p:txBody>
       </p:sp>
       <p:cxnSp>
         <p:nvCxnSpPr>
-          <p:cNvPr id="3" name="直線矢印コネクタ 2"/>
+          <p:cNvPr id="57" name="直線矢印コネクタ 56"/>
           <p:cNvCxnSpPr>
-            <a:stCxn id="9" idx="0"/>
-            <a:endCxn id="10" idx="2"/>
+            <a:stCxn id="56" idx="0"/>
+            <a:endCxn id="55" idx="3"/>
           </p:cNvCxnSpPr>
           <p:nvPr/>
         </p:nvCxnSpPr>
         <p:spPr>
           <a:xfrm flipV="1">
-            <a:off x="1697698" y="2563906"/>
-            <a:ext cx="0" cy="424031"/>
+            <a:off x="952768" y="2514875"/>
+            <a:ext cx="1" cy="452460"/>
           </a:xfrm>
           <a:prstGeom prst="straightConnector1">
             <a:avLst/>
@@ -3901,7 +3929,7 @@
             <a:solidFill>
               <a:schemeClr val="tx1"/>
             </a:solidFill>
-            <a:tailEnd type="triangle"/>
+            <a:tailEnd type="arrow"/>
           </a:ln>
         </p:spPr>
         <p:style>
@@ -3921,14 +3949,44 @@
       </p:cxnSp>
       <p:sp>
         <p:nvSpPr>
-          <p:cNvPr id="14" name="正方形/長方形 13"/>
+          <p:cNvPr id="62" name="正方形/長方形 61"/>
           <p:cNvSpPr/>
           <p:nvPr/>
         </p:nvSpPr>
         <p:spPr>
           <a:xfrm>
-            <a:off x="977833" y="1257749"/>
-            <a:ext cx="1439730" cy="441063"/>
+            <a:off x="1313149" y="2521415"/>
+            <a:ext cx="955711" cy="461665"/>
+          </a:xfrm>
+          <a:prstGeom prst="rect">
+            <a:avLst/>
+          </a:prstGeom>
+        </p:spPr>
+        <p:txBody>
+          <a:bodyPr wrap="none">
+            <a:spAutoFit/>
+          </a:bodyPr>
+          <a:lstStyle/>
+          <a:p>
+            <a:pPr algn="ctr"/>
+            <a:r>
+              <a:rPr lang="en-US" altLang="ja-JP" sz="2400" dirty="0" smtClean="0"/>
+              <a:t>Linear</a:t>
+            </a:r>
+            <a:endParaRPr lang="ja-JP" altLang="en-US" sz="2400" dirty="0"/>
+          </a:p>
+        </p:txBody>
+      </p:sp>
+      <p:sp>
+        <p:nvSpPr>
+          <p:cNvPr id="72" name="正方形/長方形 71"/>
+          <p:cNvSpPr/>
+          <p:nvPr/>
+        </p:nvSpPr>
+        <p:spPr>
+          <a:xfrm rot="5400000">
+            <a:off x="812298" y="1260029"/>
+            <a:ext cx="280939" cy="720762"/>
           </a:xfrm>
           <a:prstGeom prst="rect">
             <a:avLst/>
@@ -3936,8 +3994,10 @@
           <a:solidFill>
             <a:srgbClr val="00B0F0"/>
           </a:solidFill>
-          <a:ln>
-            <a:noFill/>
+          <a:ln w="25400">
+            <a:solidFill>
+              <a:schemeClr val="tx1"/>
+            </a:solidFill>
           </a:ln>
         </p:spPr>
         <p:style>
@@ -3961,27 +4021,23 @@
           <a:lstStyle/>
           <a:p>
             <a:pPr algn="ctr"/>
-            <a:r>
-              <a:rPr kumimoji="1" lang="en-US" altLang="ja-JP" sz="2400" dirty="0" smtClean="0"/>
-              <a:t>h2</a:t>
-            </a:r>
-            <a:endParaRPr kumimoji="1" lang="ja-JP" altLang="en-US" sz="2400" dirty="0"/>
+            <a:endParaRPr kumimoji="1" lang="ja-JP" altLang="en-US"/>
           </a:p>
         </p:txBody>
       </p:sp>
       <p:cxnSp>
         <p:nvCxnSpPr>
-          <p:cNvPr id="15" name="直線矢印コネクタ 14"/>
+          <p:cNvPr id="73" name="直線矢印コネクタ 72"/>
           <p:cNvCxnSpPr>
-            <a:stCxn id="10" idx="0"/>
-            <a:endCxn id="14" idx="2"/>
+            <a:stCxn id="55" idx="1"/>
+            <a:endCxn id="72" idx="3"/>
           </p:cNvCxnSpPr>
           <p:nvPr/>
         </p:nvCxnSpPr>
         <p:spPr>
-          <a:xfrm flipV="1">
-            <a:off x="1697698" y="1698812"/>
-            <a:ext cx="0" cy="424031"/>
+          <a:xfrm flipH="1" flipV="1">
+            <a:off x="952768" y="1760880"/>
+            <a:ext cx="1" cy="473056"/>
           </a:xfrm>
           <a:prstGeom prst="straightConnector1">
             <a:avLst/>
@@ -3990,7 +4046,7 @@
             <a:solidFill>
               <a:schemeClr val="tx1"/>
             </a:solidFill>
-            <a:tailEnd type="triangle"/>
+            <a:tailEnd type="arrow"/>
           </a:ln>
         </p:spPr>
         <p:style>
@@ -4010,79 +4066,46 @@
       </p:cxnSp>
       <p:sp>
         <p:nvSpPr>
-          <p:cNvPr id="4" name="テキスト ボックス 3"/>
-          <p:cNvSpPr txBox="1"/>
+          <p:cNvPr id="74" name="正方形/長方形 73"/>
+          <p:cNvSpPr/>
           <p:nvPr/>
         </p:nvSpPr>
         <p:spPr>
           <a:xfrm>
-            <a:off x="2414871" y="2563906"/>
-            <a:ext cx="1021977" cy="461665"/>
+            <a:off x="1452930" y="1766575"/>
+            <a:ext cx="674352" cy="461665"/>
           </a:xfrm>
           <a:prstGeom prst="rect">
             <a:avLst/>
           </a:prstGeom>
-          <a:noFill/>
-        </p:spPr>
-        <p:txBody>
-          <a:bodyPr wrap="square" rtlCol="0">
+        </p:spPr>
+        <p:txBody>
+          <a:bodyPr wrap="none">
             <a:spAutoFit/>
           </a:bodyPr>
           <a:lstStyle/>
           <a:p>
-            <a:pPr algn="ctr"/>
-            <a:r>
-              <a:rPr kumimoji="1" lang="en-US" altLang="ja-JP" sz="2400" dirty="0" smtClean="0"/>
-              <a:t>Linear</a:t>
-            </a:r>
-            <a:endParaRPr kumimoji="1" lang="ja-JP" altLang="en-US" sz="2400" dirty="0"/>
-          </a:p>
-        </p:txBody>
-      </p:sp>
-      <p:sp>
-        <p:nvSpPr>
-          <p:cNvPr id="21" name="テキスト ボックス 20"/>
-          <p:cNvSpPr txBox="1"/>
-          <p:nvPr/>
-        </p:nvSpPr>
-        <p:spPr>
-          <a:xfrm>
-            <a:off x="2414872" y="1679995"/>
-            <a:ext cx="1021977" cy="461665"/>
-          </a:xfrm>
-          <a:prstGeom prst="rect">
-            <a:avLst/>
-          </a:prstGeom>
-          <a:noFill/>
-        </p:spPr>
-        <p:txBody>
-          <a:bodyPr wrap="square" rtlCol="0">
-            <a:spAutoFit/>
-          </a:bodyPr>
-          <a:lstStyle/>
-          <a:p>
-            <a:pPr algn="ctr"/>
-            <a:r>
-              <a:rPr kumimoji="1" lang="en-US" altLang="ja-JP" sz="2400" dirty="0" err="1" smtClean="0"/>
+            <a:r>
+              <a:rPr lang="en-US" altLang="ja-JP" sz="2400" dirty="0" err="1" smtClean="0"/>
               <a:t>relu</a:t>
             </a:r>
-            <a:endParaRPr kumimoji="1" lang="ja-JP" altLang="en-US" sz="2400" dirty="0"/>
+            <a:endParaRPr lang="ja-JP" altLang="en-US" sz="2400" dirty="0"/>
           </a:p>
         </p:txBody>
       </p:sp>
       <p:cxnSp>
         <p:nvCxnSpPr>
-          <p:cNvPr id="24" name="直線矢印コネクタ 23"/>
+          <p:cNvPr id="76" name="直線矢印コネクタ 75"/>
           <p:cNvCxnSpPr>
-            <a:stCxn id="14" idx="0"/>
-            <a:endCxn id="23" idx="2"/>
+            <a:stCxn id="72" idx="1"/>
+            <a:endCxn id="79" idx="2"/>
           </p:cNvCxnSpPr>
           <p:nvPr/>
         </p:nvCxnSpPr>
         <p:spPr>
           <a:xfrm flipH="1" flipV="1">
-            <a:off x="1695006" y="793809"/>
-            <a:ext cx="2692" cy="463940"/>
+            <a:off x="952767" y="998964"/>
+            <a:ext cx="1" cy="480977"/>
           </a:xfrm>
           <a:prstGeom prst="straightConnector1">
             <a:avLst/>
@@ -4091,7 +4114,7 @@
             <a:solidFill>
               <a:schemeClr val="tx1"/>
             </a:solidFill>
-            <a:tailEnd type="triangle"/>
+            <a:tailEnd type="arrow"/>
           </a:ln>
         </p:spPr>
         <p:style>
@@ -4111,587 +4134,61 @@
       </p:cxnSp>
       <p:sp>
         <p:nvSpPr>
-          <p:cNvPr id="26" name="テキスト ボックス 25"/>
-          <p:cNvSpPr txBox="1"/>
+          <p:cNvPr id="78" name="正方形/長方形 77"/>
+          <p:cNvSpPr/>
           <p:nvPr/>
         </p:nvSpPr>
         <p:spPr>
           <a:xfrm>
-            <a:off x="2432352" y="800997"/>
-            <a:ext cx="1021977" cy="461665"/>
+            <a:off x="1312251" y="998964"/>
+            <a:ext cx="955711" cy="461665"/>
           </a:xfrm>
           <a:prstGeom prst="rect">
             <a:avLst/>
           </a:prstGeom>
-          <a:noFill/>
-        </p:spPr>
-        <p:txBody>
-          <a:bodyPr wrap="square" rtlCol="0">
+        </p:spPr>
+        <p:txBody>
+          <a:bodyPr wrap="none">
             <a:spAutoFit/>
           </a:bodyPr>
           <a:lstStyle/>
           <a:p>
             <a:pPr algn="ctr"/>
             <a:r>
-              <a:rPr kumimoji="1" lang="en-US" altLang="ja-JP" sz="2400" dirty="0" smtClean="0"/>
+              <a:rPr lang="en-US" altLang="ja-JP" sz="2400" dirty="0" smtClean="0"/>
               <a:t>Linear</a:t>
             </a:r>
-            <a:endParaRPr kumimoji="1" lang="ja-JP" altLang="en-US" sz="2400" dirty="0"/>
-          </a:p>
-        </p:txBody>
-      </p:sp>
-      <p:sp>
-        <p:nvSpPr>
-          <p:cNvPr id="27" name="正方形/長方形 26"/>
+            <a:endParaRPr lang="ja-JP" altLang="en-US" sz="2400" dirty="0"/>
+          </a:p>
+        </p:txBody>
+      </p:sp>
+      <p:sp>
+        <p:nvSpPr>
+          <p:cNvPr id="79" name="正方形/長方形 78"/>
           <p:cNvSpPr/>
           <p:nvPr/>
         </p:nvSpPr>
         <p:spPr>
           <a:xfrm>
-            <a:off x="4572000" y="3692111"/>
-            <a:ext cx="505610" cy="1186496"/>
+            <a:off x="790703" y="537299"/>
+            <a:ext cx="324128" cy="461665"/>
           </a:xfrm>
           <a:prstGeom prst="rect">
             <a:avLst/>
           </a:prstGeom>
-          <a:solidFill>
-            <a:srgbClr val="00B0F0"/>
-          </a:solidFill>
-          <a:ln>
-            <a:noFill/>
-          </a:ln>
-        </p:spPr>
-        <p:style>
-          <a:lnRef idx="2">
-            <a:schemeClr val="accent1">
-              <a:shade val="50000"/>
-            </a:schemeClr>
-          </a:lnRef>
-          <a:fillRef idx="1">
-            <a:schemeClr val="accent1"/>
-          </a:fillRef>
-          <a:effectRef idx="0">
-            <a:schemeClr val="accent1"/>
-          </a:effectRef>
-          <a:fontRef idx="minor">
-            <a:schemeClr val="lt1"/>
-          </a:fontRef>
-        </p:style>
-        <p:txBody>
-          <a:bodyPr rtlCol="0" anchor="ctr"/>
-          <a:lstStyle/>
-          <a:p>
-            <a:pPr algn="ctr"/>
-            <a:r>
-              <a:rPr lang="en-US" altLang="ja-JP" sz="2400" dirty="0"/>
-              <a:t>h</a:t>
-            </a:r>
-            <a:r>
-              <a:rPr lang="en-US" altLang="ja-JP" sz="2400" dirty="0" smtClean="0"/>
-              <a:t>1</a:t>
-            </a:r>
-            <a:endParaRPr kumimoji="1" lang="ja-JP" altLang="en-US" sz="2400" dirty="0"/>
-          </a:p>
-        </p:txBody>
-      </p:sp>
-      <p:cxnSp>
-        <p:nvCxnSpPr>
-          <p:cNvPr id="29" name="直線矢印コネクタ 28"/>
-          <p:cNvCxnSpPr>
-            <a:stCxn id="27" idx="3"/>
-          </p:cNvCxnSpPr>
-          <p:nvPr/>
-        </p:nvCxnSpPr>
-        <p:spPr>
-          <a:xfrm>
-            <a:off x="5077610" y="4285359"/>
-            <a:ext cx="531156" cy="0"/>
-          </a:xfrm>
-          <a:prstGeom prst="straightConnector1">
-            <a:avLst/>
-          </a:prstGeom>
-          <a:ln w="31750">
-            <a:solidFill>
-              <a:schemeClr val="tx1"/>
-            </a:solidFill>
-            <a:tailEnd type="triangle"/>
-          </a:ln>
-        </p:spPr>
-        <p:style>
-          <a:lnRef idx="1">
-            <a:schemeClr val="accent1"/>
-          </a:lnRef>
-          <a:fillRef idx="0">
-            <a:schemeClr val="accent1"/>
-          </a:fillRef>
-          <a:effectRef idx="0">
-            <a:schemeClr val="accent1"/>
-          </a:effectRef>
-          <a:fontRef idx="minor">
-            <a:schemeClr val="tx1"/>
-          </a:fontRef>
-        </p:style>
-      </p:cxnSp>
-      <p:sp>
-        <p:nvSpPr>
-          <p:cNvPr id="37" name="正方形/長方形 36"/>
-          <p:cNvSpPr/>
-          <p:nvPr/>
-        </p:nvSpPr>
-        <p:spPr>
-          <a:xfrm>
-            <a:off x="7667508" y="3692111"/>
-            <a:ext cx="494852" cy="1186496"/>
-          </a:xfrm>
-          <a:prstGeom prst="rect">
-            <a:avLst/>
-          </a:prstGeom>
-          <a:solidFill>
-            <a:srgbClr val="00B0F0"/>
-          </a:solidFill>
-          <a:ln>
-            <a:noFill/>
-          </a:ln>
-        </p:spPr>
-        <p:style>
-          <a:lnRef idx="2">
-            <a:schemeClr val="accent1">
-              <a:shade val="50000"/>
-            </a:schemeClr>
-          </a:lnRef>
-          <a:fillRef idx="1">
-            <a:schemeClr val="accent1"/>
-          </a:fillRef>
-          <a:effectRef idx="0">
-            <a:schemeClr val="accent1"/>
-          </a:effectRef>
-          <a:fontRef idx="minor">
-            <a:schemeClr val="lt1"/>
-          </a:fontRef>
-        </p:style>
-        <p:txBody>
-          <a:bodyPr rtlCol="0" anchor="ctr"/>
-          <a:lstStyle/>
-          <a:p>
-            <a:pPr algn="ctr"/>
-            <a:r>
-              <a:rPr lang="en-US" altLang="ja-JP" sz="2400" dirty="0" smtClean="0"/>
-              <a:t>x</a:t>
-            </a:r>
-            <a:endParaRPr kumimoji="1" lang="ja-JP" altLang="en-US" sz="2400" dirty="0"/>
-          </a:p>
-        </p:txBody>
-      </p:sp>
-      <p:sp>
-        <p:nvSpPr>
-          <p:cNvPr id="43" name="テキスト ボックス 42"/>
-          <p:cNvSpPr txBox="1"/>
-          <p:nvPr/>
-        </p:nvSpPr>
-        <p:spPr>
-          <a:xfrm>
-            <a:off x="4504764" y="5444061"/>
-            <a:ext cx="629323" cy="461665"/>
-          </a:xfrm>
-          <a:prstGeom prst="rect">
-            <a:avLst/>
-          </a:prstGeom>
-          <a:noFill/>
-        </p:spPr>
-        <p:txBody>
-          <a:bodyPr wrap="square" rtlCol="0">
+        </p:spPr>
+        <p:txBody>
+          <a:bodyPr wrap="none">
             <a:spAutoFit/>
           </a:bodyPr>
           <a:lstStyle/>
           <a:p>
             <a:pPr algn="ctr"/>
             <a:r>
-              <a:rPr kumimoji="1" lang="en-US" altLang="ja-JP" sz="2400" dirty="0" smtClean="0"/>
-              <a:t>x1</a:t>
-            </a:r>
-            <a:endParaRPr kumimoji="1" lang="ja-JP" altLang="en-US" sz="2400" dirty="0"/>
-          </a:p>
-        </p:txBody>
-      </p:sp>
-      <p:cxnSp>
-        <p:nvCxnSpPr>
-          <p:cNvPr id="44" name="直線矢印コネクタ 43"/>
-          <p:cNvCxnSpPr>
-            <a:endCxn id="27" idx="2"/>
-          </p:cNvCxnSpPr>
-          <p:nvPr/>
-        </p:nvCxnSpPr>
-        <p:spPr>
-          <a:xfrm flipV="1">
-            <a:off x="4819426" y="4878607"/>
-            <a:ext cx="5379" cy="565454"/>
-          </a:xfrm>
-          <a:prstGeom prst="straightConnector1">
-            <a:avLst/>
-          </a:prstGeom>
-          <a:ln w="31750">
-            <a:solidFill>
-              <a:schemeClr val="tx1"/>
-            </a:solidFill>
-            <a:tailEnd type="triangle"/>
-          </a:ln>
-        </p:spPr>
-        <p:style>
-          <a:lnRef idx="1">
-            <a:schemeClr val="accent1"/>
-          </a:lnRef>
-          <a:fillRef idx="0">
-            <a:schemeClr val="accent1"/>
-          </a:fillRef>
-          <a:effectRef idx="0">
-            <a:schemeClr val="accent1"/>
-          </a:effectRef>
-          <a:fontRef idx="minor">
-            <a:schemeClr val="tx1"/>
-          </a:fontRef>
-        </p:style>
-      </p:cxnSp>
-      <p:cxnSp>
-        <p:nvCxnSpPr>
-          <p:cNvPr id="48" name="直線矢印コネクタ 47"/>
-          <p:cNvCxnSpPr>
-            <a:stCxn id="27" idx="0"/>
-          </p:cNvCxnSpPr>
-          <p:nvPr/>
-        </p:nvCxnSpPr>
-        <p:spPr>
-          <a:xfrm flipH="1" flipV="1">
-            <a:off x="4819425" y="3208468"/>
-            <a:ext cx="5380" cy="483643"/>
-          </a:xfrm>
-          <a:prstGeom prst="straightConnector1">
-            <a:avLst/>
-          </a:prstGeom>
-          <a:ln w="31750">
-            <a:solidFill>
-              <a:schemeClr val="tx1"/>
-            </a:solidFill>
-            <a:tailEnd type="triangle"/>
-          </a:ln>
-        </p:spPr>
-        <p:style>
-          <a:lnRef idx="1">
-            <a:schemeClr val="accent1"/>
-          </a:lnRef>
-          <a:fillRef idx="0">
-            <a:schemeClr val="accent1"/>
-          </a:fillRef>
-          <a:effectRef idx="0">
-            <a:schemeClr val="accent1"/>
-          </a:effectRef>
-          <a:fontRef idx="minor">
-            <a:schemeClr val="tx1"/>
-          </a:fontRef>
-        </p:style>
-      </p:cxnSp>
-      <p:sp>
-        <p:nvSpPr>
-          <p:cNvPr id="59" name="テキスト ボックス 58"/>
-          <p:cNvSpPr txBox="1"/>
-          <p:nvPr/>
-        </p:nvSpPr>
-        <p:spPr>
-          <a:xfrm>
-            <a:off x="4504764" y="2716887"/>
-            <a:ext cx="629323" cy="461665"/>
-          </a:xfrm>
-          <a:prstGeom prst="rect">
-            <a:avLst/>
-          </a:prstGeom>
-          <a:noFill/>
-        </p:spPr>
-        <p:txBody>
-          <a:bodyPr wrap="square" rtlCol="0">
-            <a:spAutoFit/>
-          </a:bodyPr>
-          <a:lstStyle/>
-          <a:p>
-            <a:pPr algn="ctr"/>
-            <a:r>
-              <a:rPr lang="en-US" altLang="ja-JP" sz="2400" dirty="0"/>
+              <a:rPr lang="en-US" altLang="ja-JP" sz="2400" dirty="0" smtClean="0"/>
               <a:t>y</a:t>
             </a:r>
-            <a:r>
-              <a:rPr kumimoji="1" lang="en-US" altLang="ja-JP" sz="2400" dirty="0" smtClean="0"/>
-              <a:t>1</a:t>
-            </a:r>
-            <a:endParaRPr kumimoji="1" lang="ja-JP" altLang="en-US" sz="2400" dirty="0"/>
-          </a:p>
-        </p:txBody>
-      </p:sp>
-      <p:sp>
-        <p:nvSpPr>
-          <p:cNvPr id="60" name="テキスト ボックス 59"/>
-          <p:cNvSpPr txBox="1"/>
-          <p:nvPr/>
-        </p:nvSpPr>
-        <p:spPr>
-          <a:xfrm>
-            <a:off x="1380344" y="3004969"/>
-            <a:ext cx="629323" cy="461665"/>
-          </a:xfrm>
-          <a:prstGeom prst="rect">
-            <a:avLst/>
-          </a:prstGeom>
-          <a:noFill/>
-        </p:spPr>
-        <p:txBody>
-          <a:bodyPr wrap="square" rtlCol="0">
-            <a:spAutoFit/>
-          </a:bodyPr>
-          <a:lstStyle/>
-          <a:p>
-            <a:pPr algn="ctr"/>
-            <a:r>
-              <a:rPr kumimoji="1" lang="en-US" altLang="ja-JP" sz="2400" dirty="0" smtClean="0"/>
-              <a:t>x</a:t>
-            </a:r>
-            <a:endParaRPr kumimoji="1" lang="ja-JP" altLang="en-US" sz="2400" dirty="0"/>
-          </a:p>
-        </p:txBody>
-      </p:sp>
-      <p:sp>
-        <p:nvSpPr>
-          <p:cNvPr id="61" name="テキスト ボックス 60"/>
-          <p:cNvSpPr txBox="1"/>
-          <p:nvPr/>
-        </p:nvSpPr>
-        <p:spPr>
-          <a:xfrm>
-            <a:off x="1378331" y="315112"/>
-            <a:ext cx="629323" cy="461665"/>
-          </a:xfrm>
-          <a:prstGeom prst="rect">
-            <a:avLst/>
-          </a:prstGeom>
-          <a:noFill/>
-        </p:spPr>
-        <p:txBody>
-          <a:bodyPr wrap="square" rtlCol="0">
-            <a:spAutoFit/>
-          </a:bodyPr>
-          <a:lstStyle/>
-          <a:p>
-            <a:pPr algn="ctr"/>
-            <a:r>
-              <a:rPr lang="en-US" altLang="ja-JP" sz="2400" dirty="0"/>
-              <a:t>y</a:t>
-            </a:r>
-            <a:endParaRPr kumimoji="1" lang="ja-JP" altLang="en-US" sz="2400" dirty="0"/>
-          </a:p>
-        </p:txBody>
-      </p:sp>
-      <p:cxnSp>
-        <p:nvCxnSpPr>
-          <p:cNvPr id="63" name="直線矢印コネクタ 62"/>
-          <p:cNvCxnSpPr/>
-          <p:nvPr/>
-        </p:nvCxnSpPr>
-        <p:spPr>
-          <a:xfrm>
-            <a:off x="6707613" y="1883584"/>
-            <a:ext cx="531156" cy="0"/>
-          </a:xfrm>
-          <a:prstGeom prst="straightConnector1">
-            <a:avLst/>
-          </a:prstGeom>
-          <a:ln w="31750">
-            <a:solidFill>
-              <a:schemeClr val="tx1"/>
-            </a:solidFill>
-            <a:tailEnd type="triangle"/>
-          </a:ln>
-        </p:spPr>
-        <p:style>
-          <a:lnRef idx="1">
-            <a:schemeClr val="accent1"/>
-          </a:lnRef>
-          <a:fillRef idx="0">
-            <a:schemeClr val="accent1"/>
-          </a:fillRef>
-          <a:effectRef idx="0">
-            <a:schemeClr val="accent1"/>
-          </a:effectRef>
-          <a:fontRef idx="minor">
-            <a:schemeClr val="tx1"/>
-          </a:fontRef>
-        </p:style>
-      </p:cxnSp>
-      <p:sp>
-        <p:nvSpPr>
-          <p:cNvPr id="64" name="テキスト ボックス 63"/>
-          <p:cNvSpPr txBox="1"/>
-          <p:nvPr/>
-        </p:nvSpPr>
-        <p:spPr>
-          <a:xfrm>
-            <a:off x="6134767" y="2601223"/>
-            <a:ext cx="629323" cy="461665"/>
-          </a:xfrm>
-          <a:prstGeom prst="rect">
-            <a:avLst/>
-          </a:prstGeom>
-          <a:noFill/>
-        </p:spPr>
-        <p:txBody>
-          <a:bodyPr wrap="square" rtlCol="0">
-            <a:spAutoFit/>
-          </a:bodyPr>
-          <a:lstStyle/>
-          <a:p>
-            <a:pPr algn="ctr"/>
-            <a:r>
-              <a:rPr kumimoji="1" lang="en-US" altLang="ja-JP" sz="2400" dirty="0" smtClean="0"/>
-              <a:t>x1</a:t>
-            </a:r>
-            <a:endParaRPr kumimoji="1" lang="ja-JP" altLang="en-US" sz="2400" dirty="0"/>
-          </a:p>
-        </p:txBody>
-      </p:sp>
-      <p:cxnSp>
-        <p:nvCxnSpPr>
-          <p:cNvPr id="65" name="直線矢印コネクタ 64"/>
-          <p:cNvCxnSpPr/>
-          <p:nvPr/>
-        </p:nvCxnSpPr>
-        <p:spPr>
-          <a:xfrm flipH="1" flipV="1">
-            <a:off x="6444049" y="2122843"/>
-            <a:ext cx="5380" cy="478380"/>
-          </a:xfrm>
-          <a:prstGeom prst="straightConnector1">
-            <a:avLst/>
-          </a:prstGeom>
-          <a:ln w="31750">
-            <a:solidFill>
-              <a:schemeClr val="tx1"/>
-            </a:solidFill>
-            <a:tailEnd type="triangle"/>
-          </a:ln>
-        </p:spPr>
-        <p:style>
-          <a:lnRef idx="1">
-            <a:schemeClr val="accent1"/>
-          </a:lnRef>
-          <a:fillRef idx="0">
-            <a:schemeClr val="accent1"/>
-          </a:fillRef>
-          <a:effectRef idx="0">
-            <a:schemeClr val="accent1"/>
-          </a:effectRef>
-          <a:fontRef idx="minor">
-            <a:schemeClr val="tx1"/>
-          </a:fontRef>
-        </p:style>
-      </p:cxnSp>
-      <p:cxnSp>
-        <p:nvCxnSpPr>
-          <p:cNvPr id="66" name="直線矢印コネクタ 65"/>
-          <p:cNvCxnSpPr/>
-          <p:nvPr/>
-        </p:nvCxnSpPr>
-        <p:spPr>
-          <a:xfrm flipH="1" flipV="1">
-            <a:off x="6422751" y="1105093"/>
-            <a:ext cx="5380" cy="483643"/>
-          </a:xfrm>
-          <a:prstGeom prst="straightConnector1">
-            <a:avLst/>
-          </a:prstGeom>
-          <a:ln w="31750">
-            <a:solidFill>
-              <a:schemeClr val="tx1"/>
-            </a:solidFill>
-            <a:tailEnd type="triangle"/>
-          </a:ln>
-        </p:spPr>
-        <p:style>
-          <a:lnRef idx="1">
-            <a:schemeClr val="accent1"/>
-          </a:lnRef>
-          <a:fillRef idx="0">
-            <a:schemeClr val="accent1"/>
-          </a:fillRef>
-          <a:effectRef idx="0">
-            <a:schemeClr val="accent1"/>
-          </a:effectRef>
-          <a:fontRef idx="minor">
-            <a:schemeClr val="tx1"/>
-          </a:fontRef>
-        </p:style>
-      </p:cxnSp>
-      <p:sp>
-        <p:nvSpPr>
-          <p:cNvPr id="67" name="テキスト ボックス 66"/>
-          <p:cNvSpPr txBox="1"/>
-          <p:nvPr/>
-        </p:nvSpPr>
-        <p:spPr>
-          <a:xfrm>
-            <a:off x="6134767" y="540117"/>
-            <a:ext cx="629323" cy="461665"/>
-          </a:xfrm>
-          <a:prstGeom prst="rect">
-            <a:avLst/>
-          </a:prstGeom>
-          <a:noFill/>
-        </p:spPr>
-        <p:txBody>
-          <a:bodyPr wrap="square" rtlCol="0">
-            <a:spAutoFit/>
-          </a:bodyPr>
-          <a:lstStyle/>
-          <a:p>
-            <a:pPr algn="ctr"/>
-            <a:r>
-              <a:rPr lang="en-US" altLang="ja-JP" sz="2400" dirty="0"/>
-              <a:t>y</a:t>
-            </a:r>
-            <a:r>
-              <a:rPr kumimoji="1" lang="en-US" altLang="ja-JP" sz="2400" dirty="0" smtClean="0"/>
-              <a:t>1</a:t>
-            </a:r>
-            <a:endParaRPr kumimoji="1" lang="ja-JP" altLang="en-US" sz="2400" dirty="0"/>
-          </a:p>
-        </p:txBody>
-      </p:sp>
-      <p:sp>
-        <p:nvSpPr>
-          <p:cNvPr id="68" name="テキスト ボックス 67"/>
-          <p:cNvSpPr txBox="1"/>
-          <p:nvPr/>
-        </p:nvSpPr>
-        <p:spPr>
-          <a:xfrm>
-            <a:off x="6134767" y="1624957"/>
-            <a:ext cx="629323" cy="461665"/>
-          </a:xfrm>
-          <a:prstGeom prst="rect">
-            <a:avLst/>
-          </a:prstGeom>
-          <a:noFill/>
-        </p:spPr>
-        <p:txBody>
-          <a:bodyPr wrap="square" rtlCol="0">
-            <a:spAutoFit/>
-          </a:bodyPr>
-          <a:lstStyle/>
-          <a:p>
-            <a:pPr algn="ctr"/>
-            <a:r>
-              <a:rPr lang="en-US" altLang="ja-JP" sz="2400" dirty="0"/>
-              <a:t>h</a:t>
-            </a:r>
-            <a:r>
-              <a:rPr kumimoji="1" lang="en-US" altLang="ja-JP" sz="2400" dirty="0" smtClean="0"/>
-              <a:t>1</a:t>
-            </a:r>
-            <a:endParaRPr kumimoji="1" lang="ja-JP" altLang="en-US" sz="2400" dirty="0"/>
+            <a:endParaRPr lang="ja-JP" altLang="en-US" sz="2400" dirty="0"/>
           </a:p>
         </p:txBody>
       </p:sp>

</xml_diff>

<commit_message>
build based on 70afb07
</commit_message>
<xml_diff>
--- a/latest/assets/figures.pptx
+++ b/latest/assets/figures.pptx
@@ -4240,7 +4240,7 @@
         </p:nvCxnSpPr>
         <p:spPr>
           <a:xfrm flipH="1" flipV="1">
-            <a:off x="1131644" y="2068651"/>
+            <a:off x="1841651" y="2068651"/>
             <a:ext cx="1058" cy="642171"/>
           </a:xfrm>
           <a:prstGeom prst="straightConnector1">
@@ -4276,7 +4276,7 @@
         </p:nvSpPr>
         <p:spPr>
           <a:xfrm>
-            <a:off x="895041" y="4041481"/>
+            <a:off x="1605048" y="4041481"/>
             <a:ext cx="473206" cy="461665"/>
           </a:xfrm>
           <a:prstGeom prst="rect">
@@ -4306,7 +4306,7 @@
         </p:nvSpPr>
         <p:spPr>
           <a:xfrm>
-            <a:off x="992232" y="2710822"/>
+            <a:off x="1702239" y="2710822"/>
             <a:ext cx="280939" cy="720762"/>
           </a:xfrm>
           <a:prstGeom prst="rect">
@@ -4357,7 +4357,7 @@
         </p:nvCxnSpPr>
         <p:spPr>
           <a:xfrm flipV="1">
-            <a:off x="1131644" y="3431584"/>
+            <a:off x="1841651" y="3431584"/>
             <a:ext cx="1058" cy="609897"/>
           </a:xfrm>
           <a:prstGeom prst="straightConnector1">
@@ -4393,7 +4393,7 @@
         </p:nvSpPr>
         <p:spPr>
           <a:xfrm>
-            <a:off x="891835" y="1606986"/>
+            <a:off x="1601842" y="1606986"/>
             <a:ext cx="479618" cy="461665"/>
           </a:xfrm>
           <a:prstGeom prst="rect">
@@ -4422,7 +4422,7 @@
         </p:nvSpPr>
         <p:spPr>
           <a:xfrm>
-            <a:off x="1236657" y="2310205"/>
+            <a:off x="1946664" y="2310205"/>
             <a:ext cx="502062" cy="461665"/>
           </a:xfrm>
           <a:prstGeom prst="rect">
@@ -4474,7 +4474,7 @@
         </p:blipFill>
         <p:spPr>
           <a:xfrm>
-            <a:off x="573472" y="2305868"/>
+            <a:off x="1283479" y="2305868"/>
             <a:ext cx="254172" cy="301714"/>
           </a:xfrm>
           <a:prstGeom prst="rect">
@@ -4508,7 +4508,7 @@
         </p:blipFill>
         <p:spPr>
           <a:xfrm>
-            <a:off x="553879" y="3631663"/>
+            <a:off x="1275793" y="3397682"/>
             <a:ext cx="265143" cy="274285"/>
           </a:xfrm>
           <a:prstGeom prst="rect">
@@ -4527,7 +4527,7 @@
         </p:nvCxnSpPr>
         <p:spPr>
           <a:xfrm>
-            <a:off x="1273171" y="3071203"/>
+            <a:off x="1983178" y="3071203"/>
             <a:ext cx="609424" cy="0"/>
           </a:xfrm>
           <a:prstGeom prst="straightConnector1">
@@ -4566,7 +4566,7 @@
         </p:nvCxnSpPr>
         <p:spPr>
           <a:xfrm flipH="1" flipV="1">
-            <a:off x="2022007" y="2068651"/>
+            <a:off x="2732014" y="2068651"/>
             <a:ext cx="1058" cy="642171"/>
           </a:xfrm>
           <a:prstGeom prst="straightConnector1">
@@ -4602,7 +4602,7 @@
         </p:nvSpPr>
         <p:spPr>
           <a:xfrm>
-            <a:off x="1785404" y="4041481"/>
+            <a:off x="2495411" y="4041481"/>
             <a:ext cx="473206" cy="461665"/>
           </a:xfrm>
           <a:prstGeom prst="rect">
@@ -4632,7 +4632,7 @@
         </p:nvSpPr>
         <p:spPr>
           <a:xfrm>
-            <a:off x="1882595" y="2710822"/>
+            <a:off x="2592602" y="2710822"/>
             <a:ext cx="280939" cy="720762"/>
           </a:xfrm>
           <a:prstGeom prst="rect">
@@ -4683,7 +4683,7 @@
         </p:nvCxnSpPr>
         <p:spPr>
           <a:xfrm flipV="1">
-            <a:off x="2022007" y="3431584"/>
+            <a:off x="2732014" y="3431584"/>
             <a:ext cx="1058" cy="609897"/>
           </a:xfrm>
           <a:prstGeom prst="straightConnector1">
@@ -4719,7 +4719,7 @@
         </p:nvSpPr>
         <p:spPr>
           <a:xfrm>
-            <a:off x="1782198" y="1606986"/>
+            <a:off x="2492205" y="1606986"/>
             <a:ext cx="479618" cy="461665"/>
           </a:xfrm>
           <a:prstGeom prst="rect">
@@ -4748,7 +4748,7 @@
         </p:nvSpPr>
         <p:spPr>
           <a:xfrm>
-            <a:off x="2138242" y="2322957"/>
+            <a:off x="2848249" y="2322957"/>
             <a:ext cx="502062" cy="461665"/>
           </a:xfrm>
           <a:prstGeom prst="rect">
@@ -4782,7 +4782,7 @@
         </p:nvSpPr>
         <p:spPr>
           <a:xfrm>
-            <a:off x="2814088" y="2771308"/>
+            <a:off x="3524095" y="2771308"/>
             <a:ext cx="415499" cy="461665"/>
           </a:xfrm>
           <a:prstGeom prst="rect">
@@ -4815,7 +4815,7 @@
         </p:nvCxnSpPr>
         <p:spPr>
           <a:xfrm flipV="1">
-            <a:off x="3625171" y="2068651"/>
+            <a:off x="4335178" y="2068651"/>
             <a:ext cx="2436" cy="642171"/>
           </a:xfrm>
           <a:prstGeom prst="straightConnector1">
@@ -4851,7 +4851,7 @@
         </p:nvSpPr>
         <p:spPr>
           <a:xfrm>
-            <a:off x="3413510" y="4041481"/>
+            <a:off x="4123517" y="4041481"/>
             <a:ext cx="421206" cy="461665"/>
           </a:xfrm>
           <a:prstGeom prst="rect">
@@ -4881,7 +4881,7 @@
         </p:nvSpPr>
         <p:spPr>
           <a:xfrm>
-            <a:off x="3484701" y="2710822"/>
+            <a:off x="4194708" y="2710822"/>
             <a:ext cx="280939" cy="720762"/>
           </a:xfrm>
           <a:prstGeom prst="rect">
@@ -4932,7 +4932,7 @@
         </p:nvCxnSpPr>
         <p:spPr>
           <a:xfrm flipV="1">
-            <a:off x="3624113" y="3431584"/>
+            <a:off x="4334120" y="3431584"/>
             <a:ext cx="1058" cy="609897"/>
           </a:xfrm>
           <a:prstGeom prst="straightConnector1">
@@ -4968,7 +4968,7 @@
         </p:nvSpPr>
         <p:spPr>
           <a:xfrm>
-            <a:off x="3413510" y="1606986"/>
+            <a:off x="4123517" y="1606986"/>
             <a:ext cx="428194" cy="461665"/>
           </a:xfrm>
           <a:prstGeom prst="rect">
@@ -4997,7 +4997,7 @@
         </p:nvSpPr>
         <p:spPr>
           <a:xfrm>
-            <a:off x="3748889" y="2322957"/>
+            <a:off x="4458896" y="2322957"/>
             <a:ext cx="446276" cy="461665"/>
           </a:xfrm>
           <a:prstGeom prst="rect">
@@ -5029,7 +5029,7 @@
         </p:nvCxnSpPr>
         <p:spPr>
           <a:xfrm>
-            <a:off x="2163534" y="3071203"/>
+            <a:off x="2873541" y="3071203"/>
             <a:ext cx="584132" cy="0"/>
           </a:xfrm>
           <a:prstGeom prst="straightConnector1">
@@ -5057,6 +5057,79 @@
           </a:fontRef>
         </p:style>
       </p:cxnSp>
+      <p:cxnSp>
+        <p:nvCxnSpPr>
+          <p:cNvPr id="25" name="直線矢印コネクタ 24"/>
+          <p:cNvCxnSpPr>
+            <a:stCxn id="27" idx="3"/>
+            <a:endCxn id="32" idx="1"/>
+          </p:cNvCxnSpPr>
+          <p:nvPr/>
+        </p:nvCxnSpPr>
+        <p:spPr>
+          <a:xfrm>
+            <a:off x="1146496" y="3071203"/>
+            <a:ext cx="555743" cy="0"/>
+          </a:xfrm>
+          <a:prstGeom prst="straightConnector1">
+            <a:avLst/>
+          </a:prstGeom>
+          <a:ln w="31750">
+            <a:solidFill>
+              <a:schemeClr val="tx1"/>
+            </a:solidFill>
+            <a:tailEnd type="arrow"/>
+          </a:ln>
+        </p:spPr>
+        <p:style>
+          <a:lnRef idx="1">
+            <a:schemeClr val="accent1"/>
+          </a:lnRef>
+          <a:fillRef idx="0">
+            <a:schemeClr val="accent1"/>
+          </a:fillRef>
+          <a:effectRef idx="0">
+            <a:schemeClr val="accent1"/>
+          </a:effectRef>
+          <a:fontRef idx="minor">
+            <a:schemeClr val="tx1"/>
+          </a:fontRef>
+        </p:style>
+      </p:cxnSp>
+      <p:sp>
+        <p:nvSpPr>
+          <p:cNvPr id="27" name="正方形/長方形 26"/>
+          <p:cNvSpPr/>
+          <p:nvPr/>
+        </p:nvSpPr>
+        <p:spPr>
+          <a:xfrm>
+            <a:off x="644434" y="2840370"/>
+            <a:ext cx="502062" cy="461665"/>
+          </a:xfrm>
+          <a:prstGeom prst="rect">
+            <a:avLst/>
+          </a:prstGeom>
+        </p:spPr>
+        <p:txBody>
+          <a:bodyPr wrap="none">
+            <a:spAutoFit/>
+          </a:bodyPr>
+          <a:lstStyle/>
+          <a:p>
+            <a:pPr algn="ctr"/>
+            <a:r>
+              <a:rPr lang="en-US" altLang="ja-JP" sz="2400" dirty="0" smtClean="0"/>
+              <a:t>h</a:t>
+            </a:r>
+            <a:r>
+              <a:rPr lang="en-US" altLang="ja-JP" sz="2400" dirty="0"/>
+              <a:t>0</a:t>
+            </a:r>
+            <a:endParaRPr lang="ja-JP" altLang="en-US" sz="2400" dirty="0"/>
+          </a:p>
+        </p:txBody>
+      </p:sp>
     </p:spTree>
     <p:extLst>
       <p:ext uri="{BB962C8B-B14F-4D97-AF65-F5344CB8AC3E}">

</xml_diff>

<commit_message>
build based on 8af93be
</commit_message>
<xml_diff>
--- a/latest/assets/figures.pptx
+++ b/latest/assets/figures.pptx
@@ -4,11 +4,16 @@
   <p:sldMasterIdLst>
     <p:sldMasterId id="2147483660" r:id="rId1"/>
   </p:sldMasterIdLst>
+  <p:notesMasterIdLst>
+    <p:notesMasterId r:id="rId8"/>
+  </p:notesMasterIdLst>
   <p:sldIdLst>
     <p:sldId id="256" r:id="rId2"/>
     <p:sldId id="258" r:id="rId3"/>
     <p:sldId id="259" r:id="rId4"/>
     <p:sldId id="257" r:id="rId5"/>
+    <p:sldId id="260" r:id="rId6"/>
+    <p:sldId id="261" r:id="rId7"/>
   </p:sldIdLst>
   <p:sldSz cx="9144000" cy="6858000" type="screen4x3"/>
   <p:notesSz cx="6858000" cy="9144000"/>
@@ -126,6 +131,556 @@
 </p:presentation>
 </file>
 
+<file path=ppt/notesMasters/notesMaster1.xml><?xml version="1.0" encoding="utf-8"?>
+<p:notesMaster xmlns:a="http://schemas.openxmlformats.org/drawingml/2006/main" xmlns:r="http://schemas.openxmlformats.org/officeDocument/2006/relationships" xmlns:p="http://schemas.openxmlformats.org/presentationml/2006/main">
+  <p:cSld>
+    <p:bg>
+      <p:bgRef idx="1001">
+        <a:schemeClr val="bg1"/>
+      </p:bgRef>
+    </p:bg>
+    <p:spTree>
+      <p:nvGrpSpPr>
+        <p:cNvPr id="1" name=""/>
+        <p:cNvGrpSpPr/>
+        <p:nvPr/>
+      </p:nvGrpSpPr>
+      <p:grpSpPr>
+        <a:xfrm>
+          <a:off x="0" y="0"/>
+          <a:ext cx="0" cy="0"/>
+          <a:chOff x="0" y="0"/>
+          <a:chExt cx="0" cy="0"/>
+        </a:xfrm>
+      </p:grpSpPr>
+      <p:sp>
+        <p:nvSpPr>
+          <p:cNvPr id="2" name="ヘッダー プレースホルダー 1"/>
+          <p:cNvSpPr>
+            <a:spLocks noGrp="1"/>
+          </p:cNvSpPr>
+          <p:nvPr>
+            <p:ph type="hdr" sz="quarter"/>
+          </p:nvPr>
+        </p:nvSpPr>
+        <p:spPr>
+          <a:xfrm>
+            <a:off x="0" y="0"/>
+            <a:ext cx="2971800" cy="458788"/>
+          </a:xfrm>
+          <a:prstGeom prst="rect">
+            <a:avLst/>
+          </a:prstGeom>
+        </p:spPr>
+        <p:txBody>
+          <a:bodyPr vert="horz" lIns="91440" tIns="45720" rIns="91440" bIns="45720" rtlCol="0"/>
+          <a:lstStyle>
+            <a:lvl1pPr algn="l">
+              <a:defRPr sz="1200"/>
+            </a:lvl1pPr>
+          </a:lstStyle>
+          <a:p>
+            <a:endParaRPr kumimoji="1" lang="ja-JP" altLang="en-US"/>
+          </a:p>
+        </p:txBody>
+      </p:sp>
+      <p:sp>
+        <p:nvSpPr>
+          <p:cNvPr id="3" name="日付プレースホルダー 2"/>
+          <p:cNvSpPr>
+            <a:spLocks noGrp="1"/>
+          </p:cNvSpPr>
+          <p:nvPr>
+            <p:ph type="dt" idx="1"/>
+          </p:nvPr>
+        </p:nvSpPr>
+        <p:spPr>
+          <a:xfrm>
+            <a:off x="3884613" y="0"/>
+            <a:ext cx="2971800" cy="458788"/>
+          </a:xfrm>
+          <a:prstGeom prst="rect">
+            <a:avLst/>
+          </a:prstGeom>
+        </p:spPr>
+        <p:txBody>
+          <a:bodyPr vert="horz" lIns="91440" tIns="45720" rIns="91440" bIns="45720" rtlCol="0"/>
+          <a:lstStyle>
+            <a:lvl1pPr algn="r">
+              <a:defRPr sz="1200"/>
+            </a:lvl1pPr>
+          </a:lstStyle>
+          <a:p>
+            <a:fld id="{D4E2E5FE-BDEB-45F8-9930-277575229D95}" type="datetimeFigureOut">
+              <a:rPr kumimoji="1" lang="ja-JP" altLang="en-US" smtClean="0"/>
+              <a:t>2017/12/15</a:t>
+            </a:fld>
+            <a:endParaRPr kumimoji="1" lang="ja-JP" altLang="en-US"/>
+          </a:p>
+        </p:txBody>
+      </p:sp>
+      <p:sp>
+        <p:nvSpPr>
+          <p:cNvPr id="4" name="スライド イメージ プレースホルダー 3"/>
+          <p:cNvSpPr>
+            <a:spLocks noGrp="1" noRot="1" noChangeAspect="1"/>
+          </p:cNvSpPr>
+          <p:nvPr>
+            <p:ph type="sldImg" idx="2"/>
+          </p:nvPr>
+        </p:nvSpPr>
+        <p:spPr>
+          <a:xfrm>
+            <a:off x="1371600" y="1143000"/>
+            <a:ext cx="4114800" cy="3086100"/>
+          </a:xfrm>
+          <a:prstGeom prst="rect">
+            <a:avLst/>
+          </a:prstGeom>
+          <a:noFill/>
+          <a:ln w="12700">
+            <a:solidFill>
+              <a:prstClr val="black"/>
+            </a:solidFill>
+          </a:ln>
+        </p:spPr>
+        <p:txBody>
+          <a:bodyPr vert="horz" lIns="91440" tIns="45720" rIns="91440" bIns="45720" rtlCol="0" anchor="ctr"/>
+          <a:lstStyle/>
+          <a:p>
+            <a:endParaRPr lang="ja-JP" altLang="en-US"/>
+          </a:p>
+        </p:txBody>
+      </p:sp>
+      <p:sp>
+        <p:nvSpPr>
+          <p:cNvPr id="5" name="ノート プレースホルダー 4"/>
+          <p:cNvSpPr>
+            <a:spLocks noGrp="1"/>
+          </p:cNvSpPr>
+          <p:nvPr>
+            <p:ph type="body" sz="quarter" idx="3"/>
+          </p:nvPr>
+        </p:nvSpPr>
+        <p:spPr>
+          <a:xfrm>
+            <a:off x="685800" y="4400550"/>
+            <a:ext cx="5486400" cy="3600450"/>
+          </a:xfrm>
+          <a:prstGeom prst="rect">
+            <a:avLst/>
+          </a:prstGeom>
+        </p:spPr>
+        <p:txBody>
+          <a:bodyPr vert="horz" lIns="91440" tIns="45720" rIns="91440" bIns="45720" rtlCol="0"/>
+          <a:lstStyle/>
+          <a:p>
+            <a:pPr lvl="0"/>
+            <a:r>
+              <a:rPr kumimoji="1" lang="ja-JP" altLang="en-US" smtClean="0"/>
+              <a:t>マスター テキストの書式設定</a:t>
+            </a:r>
+          </a:p>
+          <a:p>
+            <a:pPr lvl="1"/>
+            <a:r>
+              <a:rPr kumimoji="1" lang="ja-JP" altLang="en-US" smtClean="0"/>
+              <a:t>第 </a:t>
+            </a:r>
+            <a:r>
+              <a:rPr kumimoji="1" lang="en-US" altLang="ja-JP" smtClean="0"/>
+              <a:t>2 </a:t>
+            </a:r>
+            <a:r>
+              <a:rPr kumimoji="1" lang="ja-JP" altLang="en-US" smtClean="0"/>
+              <a:t>レベル</a:t>
+            </a:r>
+          </a:p>
+          <a:p>
+            <a:pPr lvl="2"/>
+            <a:r>
+              <a:rPr kumimoji="1" lang="ja-JP" altLang="en-US" smtClean="0"/>
+              <a:t>第 </a:t>
+            </a:r>
+            <a:r>
+              <a:rPr kumimoji="1" lang="en-US" altLang="ja-JP" smtClean="0"/>
+              <a:t>3 </a:t>
+            </a:r>
+            <a:r>
+              <a:rPr kumimoji="1" lang="ja-JP" altLang="en-US" smtClean="0"/>
+              <a:t>レベル</a:t>
+            </a:r>
+          </a:p>
+          <a:p>
+            <a:pPr lvl="3"/>
+            <a:r>
+              <a:rPr kumimoji="1" lang="ja-JP" altLang="en-US" smtClean="0"/>
+              <a:t>第 </a:t>
+            </a:r>
+            <a:r>
+              <a:rPr kumimoji="1" lang="en-US" altLang="ja-JP" smtClean="0"/>
+              <a:t>4 </a:t>
+            </a:r>
+            <a:r>
+              <a:rPr kumimoji="1" lang="ja-JP" altLang="en-US" smtClean="0"/>
+              <a:t>レベル</a:t>
+            </a:r>
+          </a:p>
+          <a:p>
+            <a:pPr lvl="4"/>
+            <a:r>
+              <a:rPr kumimoji="1" lang="ja-JP" altLang="en-US" smtClean="0"/>
+              <a:t>第 </a:t>
+            </a:r>
+            <a:r>
+              <a:rPr kumimoji="1" lang="en-US" altLang="ja-JP" smtClean="0"/>
+              <a:t>5 </a:t>
+            </a:r>
+            <a:r>
+              <a:rPr kumimoji="1" lang="ja-JP" altLang="en-US" smtClean="0"/>
+              <a:t>レベル</a:t>
+            </a:r>
+            <a:endParaRPr kumimoji="1" lang="ja-JP" altLang="en-US"/>
+          </a:p>
+        </p:txBody>
+      </p:sp>
+      <p:sp>
+        <p:nvSpPr>
+          <p:cNvPr id="6" name="フッター プレースホルダー 5"/>
+          <p:cNvSpPr>
+            <a:spLocks noGrp="1"/>
+          </p:cNvSpPr>
+          <p:nvPr>
+            <p:ph type="ftr" sz="quarter" idx="4"/>
+          </p:nvPr>
+        </p:nvSpPr>
+        <p:spPr>
+          <a:xfrm>
+            <a:off x="0" y="8685213"/>
+            <a:ext cx="2971800" cy="458787"/>
+          </a:xfrm>
+          <a:prstGeom prst="rect">
+            <a:avLst/>
+          </a:prstGeom>
+        </p:spPr>
+        <p:txBody>
+          <a:bodyPr vert="horz" lIns="91440" tIns="45720" rIns="91440" bIns="45720" rtlCol="0" anchor="b"/>
+          <a:lstStyle>
+            <a:lvl1pPr algn="l">
+              <a:defRPr sz="1200"/>
+            </a:lvl1pPr>
+          </a:lstStyle>
+          <a:p>
+            <a:endParaRPr kumimoji="1" lang="ja-JP" altLang="en-US"/>
+          </a:p>
+        </p:txBody>
+      </p:sp>
+      <p:sp>
+        <p:nvSpPr>
+          <p:cNvPr id="7" name="スライド番号プレースホルダー 6"/>
+          <p:cNvSpPr>
+            <a:spLocks noGrp="1"/>
+          </p:cNvSpPr>
+          <p:nvPr>
+            <p:ph type="sldNum" sz="quarter" idx="5"/>
+          </p:nvPr>
+        </p:nvSpPr>
+        <p:spPr>
+          <a:xfrm>
+            <a:off x="3884613" y="8685213"/>
+            <a:ext cx="2971800" cy="458787"/>
+          </a:xfrm>
+          <a:prstGeom prst="rect">
+            <a:avLst/>
+          </a:prstGeom>
+        </p:spPr>
+        <p:txBody>
+          <a:bodyPr vert="horz" lIns="91440" tIns="45720" rIns="91440" bIns="45720" rtlCol="0" anchor="b"/>
+          <a:lstStyle>
+            <a:lvl1pPr algn="r">
+              <a:defRPr sz="1200"/>
+            </a:lvl1pPr>
+          </a:lstStyle>
+          <a:p>
+            <a:fld id="{410EC14F-AE84-4C17-9629-02953E61BE35}" type="slidenum">
+              <a:rPr kumimoji="1" lang="ja-JP" altLang="en-US" smtClean="0"/>
+              <a:t>‹#›</a:t>
+            </a:fld>
+            <a:endParaRPr kumimoji="1" lang="ja-JP" altLang="en-US"/>
+          </a:p>
+        </p:txBody>
+      </p:sp>
+    </p:spTree>
+    <p:extLst>
+      <p:ext uri="{BB962C8B-B14F-4D97-AF65-F5344CB8AC3E}">
+        <p14:creationId xmlns:p14="http://schemas.microsoft.com/office/powerpoint/2010/main" val="2745953206"/>
+      </p:ext>
+    </p:extLst>
+  </p:cSld>
+  <p:clrMap bg1="lt1" tx1="dk1" bg2="lt2" tx2="dk2" accent1="accent1" accent2="accent2" accent3="accent3" accent4="accent4" accent5="accent5" accent6="accent6" hlink="hlink" folHlink="folHlink"/>
+  <p:notesStyle>
+    <a:lvl1pPr marL="0" algn="l" defTabSz="914400" rtl="0" eaLnBrk="1" latinLnBrk="0" hangingPunct="1">
+      <a:defRPr kumimoji="1" sz="1200" kern="1200">
+        <a:solidFill>
+          <a:schemeClr val="tx1"/>
+        </a:solidFill>
+        <a:latin typeface="+mn-lt"/>
+        <a:ea typeface="+mn-ea"/>
+        <a:cs typeface="+mn-cs"/>
+      </a:defRPr>
+    </a:lvl1pPr>
+    <a:lvl2pPr marL="457200" algn="l" defTabSz="914400" rtl="0" eaLnBrk="1" latinLnBrk="0" hangingPunct="1">
+      <a:defRPr kumimoji="1" sz="1200" kern="1200">
+        <a:solidFill>
+          <a:schemeClr val="tx1"/>
+        </a:solidFill>
+        <a:latin typeface="+mn-lt"/>
+        <a:ea typeface="+mn-ea"/>
+        <a:cs typeface="+mn-cs"/>
+      </a:defRPr>
+    </a:lvl2pPr>
+    <a:lvl3pPr marL="914400" algn="l" defTabSz="914400" rtl="0" eaLnBrk="1" latinLnBrk="0" hangingPunct="1">
+      <a:defRPr kumimoji="1" sz="1200" kern="1200">
+        <a:solidFill>
+          <a:schemeClr val="tx1"/>
+        </a:solidFill>
+        <a:latin typeface="+mn-lt"/>
+        <a:ea typeface="+mn-ea"/>
+        <a:cs typeface="+mn-cs"/>
+      </a:defRPr>
+    </a:lvl3pPr>
+    <a:lvl4pPr marL="1371600" algn="l" defTabSz="914400" rtl="0" eaLnBrk="1" latinLnBrk="0" hangingPunct="1">
+      <a:defRPr kumimoji="1" sz="1200" kern="1200">
+        <a:solidFill>
+          <a:schemeClr val="tx1"/>
+        </a:solidFill>
+        <a:latin typeface="+mn-lt"/>
+        <a:ea typeface="+mn-ea"/>
+        <a:cs typeface="+mn-cs"/>
+      </a:defRPr>
+    </a:lvl4pPr>
+    <a:lvl5pPr marL="1828800" algn="l" defTabSz="914400" rtl="0" eaLnBrk="1" latinLnBrk="0" hangingPunct="1">
+      <a:defRPr kumimoji="1" sz="1200" kern="1200">
+        <a:solidFill>
+          <a:schemeClr val="tx1"/>
+        </a:solidFill>
+        <a:latin typeface="+mn-lt"/>
+        <a:ea typeface="+mn-ea"/>
+        <a:cs typeface="+mn-cs"/>
+      </a:defRPr>
+    </a:lvl5pPr>
+    <a:lvl6pPr marL="2286000" algn="l" defTabSz="914400" rtl="0" eaLnBrk="1" latinLnBrk="0" hangingPunct="1">
+      <a:defRPr kumimoji="1" sz="1200" kern="1200">
+        <a:solidFill>
+          <a:schemeClr val="tx1"/>
+        </a:solidFill>
+        <a:latin typeface="+mn-lt"/>
+        <a:ea typeface="+mn-ea"/>
+        <a:cs typeface="+mn-cs"/>
+      </a:defRPr>
+    </a:lvl6pPr>
+    <a:lvl7pPr marL="2743200" algn="l" defTabSz="914400" rtl="0" eaLnBrk="1" latinLnBrk="0" hangingPunct="1">
+      <a:defRPr kumimoji="1" sz="1200" kern="1200">
+        <a:solidFill>
+          <a:schemeClr val="tx1"/>
+        </a:solidFill>
+        <a:latin typeface="+mn-lt"/>
+        <a:ea typeface="+mn-ea"/>
+        <a:cs typeface="+mn-cs"/>
+      </a:defRPr>
+    </a:lvl7pPr>
+    <a:lvl8pPr marL="3200400" algn="l" defTabSz="914400" rtl="0" eaLnBrk="1" latinLnBrk="0" hangingPunct="1">
+      <a:defRPr kumimoji="1" sz="1200" kern="1200">
+        <a:solidFill>
+          <a:schemeClr val="tx1"/>
+        </a:solidFill>
+        <a:latin typeface="+mn-lt"/>
+        <a:ea typeface="+mn-ea"/>
+        <a:cs typeface="+mn-cs"/>
+      </a:defRPr>
+    </a:lvl8pPr>
+    <a:lvl9pPr marL="3657600" algn="l" defTabSz="914400" rtl="0" eaLnBrk="1" latinLnBrk="0" hangingPunct="1">
+      <a:defRPr kumimoji="1" sz="1200" kern="1200">
+        <a:solidFill>
+          <a:schemeClr val="tx1"/>
+        </a:solidFill>
+        <a:latin typeface="+mn-lt"/>
+        <a:ea typeface="+mn-ea"/>
+        <a:cs typeface="+mn-cs"/>
+      </a:defRPr>
+    </a:lvl9pPr>
+  </p:notesStyle>
+</p:notesMaster>
+</file>
+
+<file path=ppt/notesSlides/notesSlide1.xml><?xml version="1.0" encoding="utf-8"?>
+<p:notes xmlns:a="http://schemas.openxmlformats.org/drawingml/2006/main" xmlns:r="http://schemas.openxmlformats.org/officeDocument/2006/relationships" xmlns:p="http://schemas.openxmlformats.org/presentationml/2006/main">
+  <p:cSld>
+    <p:spTree>
+      <p:nvGrpSpPr>
+        <p:cNvPr id="1" name=""/>
+        <p:cNvGrpSpPr/>
+        <p:nvPr/>
+      </p:nvGrpSpPr>
+      <p:grpSpPr>
+        <a:xfrm>
+          <a:off x="0" y="0"/>
+          <a:ext cx="0" cy="0"/>
+          <a:chOff x="0" y="0"/>
+          <a:chExt cx="0" cy="0"/>
+        </a:xfrm>
+      </p:grpSpPr>
+      <p:sp>
+        <p:nvSpPr>
+          <p:cNvPr id="2" name="スライド イメージ プレースホルダー 1"/>
+          <p:cNvSpPr>
+            <a:spLocks noGrp="1" noRot="1" noChangeAspect="1"/>
+          </p:cNvSpPr>
+          <p:nvPr>
+            <p:ph type="sldImg"/>
+          </p:nvPr>
+        </p:nvSpPr>
+        <p:spPr/>
+      </p:sp>
+      <p:sp>
+        <p:nvSpPr>
+          <p:cNvPr id="3" name="ノート プレースホルダー 2"/>
+          <p:cNvSpPr>
+            <a:spLocks noGrp="1"/>
+          </p:cNvSpPr>
+          <p:nvPr>
+            <p:ph type="body" idx="1"/>
+          </p:nvPr>
+        </p:nvSpPr>
+        <p:spPr/>
+        <p:txBody>
+          <a:bodyPr/>
+          <a:lstStyle/>
+          <a:p>
+            <a:endParaRPr kumimoji="1" lang="ja-JP" altLang="en-US"/>
+          </a:p>
+        </p:txBody>
+      </p:sp>
+      <p:sp>
+        <p:nvSpPr>
+          <p:cNvPr id="4" name="スライド番号プレースホルダー 3"/>
+          <p:cNvSpPr>
+            <a:spLocks noGrp="1"/>
+          </p:cNvSpPr>
+          <p:nvPr>
+            <p:ph type="sldNum" sz="quarter" idx="10"/>
+          </p:nvPr>
+        </p:nvSpPr>
+        <p:spPr/>
+        <p:txBody>
+          <a:bodyPr/>
+          <a:lstStyle/>
+          <a:p>
+            <a:fld id="{A13346AC-834C-4A56-95C5-E001FE57D90F}" type="slidenum">
+              <a:rPr kumimoji="1" lang="ja-JP" altLang="en-US" smtClean="0"/>
+              <a:t>5</a:t>
+            </a:fld>
+            <a:endParaRPr kumimoji="1" lang="ja-JP" altLang="en-US"/>
+          </a:p>
+        </p:txBody>
+      </p:sp>
+    </p:spTree>
+    <p:extLst>
+      <p:ext uri="{BB962C8B-B14F-4D97-AF65-F5344CB8AC3E}">
+        <p14:creationId xmlns:p14="http://schemas.microsoft.com/office/powerpoint/2010/main" val="2001654703"/>
+      </p:ext>
+    </p:extLst>
+  </p:cSld>
+  <p:clrMapOvr>
+    <a:masterClrMapping/>
+  </p:clrMapOvr>
+</p:notes>
+</file>
+
+<file path=ppt/notesSlides/notesSlide2.xml><?xml version="1.0" encoding="utf-8"?>
+<p:notes xmlns:a="http://schemas.openxmlformats.org/drawingml/2006/main" xmlns:r="http://schemas.openxmlformats.org/officeDocument/2006/relationships" xmlns:p="http://schemas.openxmlformats.org/presentationml/2006/main">
+  <p:cSld>
+    <p:spTree>
+      <p:nvGrpSpPr>
+        <p:cNvPr id="1" name=""/>
+        <p:cNvGrpSpPr/>
+        <p:nvPr/>
+      </p:nvGrpSpPr>
+      <p:grpSpPr>
+        <a:xfrm>
+          <a:off x="0" y="0"/>
+          <a:ext cx="0" cy="0"/>
+          <a:chOff x="0" y="0"/>
+          <a:chExt cx="0" cy="0"/>
+        </a:xfrm>
+      </p:grpSpPr>
+      <p:sp>
+        <p:nvSpPr>
+          <p:cNvPr id="2" name="スライド イメージ プレースホルダー 1"/>
+          <p:cNvSpPr>
+            <a:spLocks noGrp="1" noRot="1" noChangeAspect="1"/>
+          </p:cNvSpPr>
+          <p:nvPr>
+            <p:ph type="sldImg"/>
+          </p:nvPr>
+        </p:nvSpPr>
+        <p:spPr/>
+      </p:sp>
+      <p:sp>
+        <p:nvSpPr>
+          <p:cNvPr id="3" name="ノート プレースホルダー 2"/>
+          <p:cNvSpPr>
+            <a:spLocks noGrp="1"/>
+          </p:cNvSpPr>
+          <p:nvPr>
+            <p:ph type="body" idx="1"/>
+          </p:nvPr>
+        </p:nvSpPr>
+        <p:spPr/>
+        <p:txBody>
+          <a:bodyPr/>
+          <a:lstStyle/>
+          <a:p>
+            <a:endParaRPr kumimoji="1" lang="ja-JP" altLang="en-US"/>
+          </a:p>
+        </p:txBody>
+      </p:sp>
+      <p:sp>
+        <p:nvSpPr>
+          <p:cNvPr id="4" name="スライド番号プレースホルダー 3"/>
+          <p:cNvSpPr>
+            <a:spLocks noGrp="1"/>
+          </p:cNvSpPr>
+          <p:nvPr>
+            <p:ph type="sldNum" sz="quarter" idx="10"/>
+          </p:nvPr>
+        </p:nvSpPr>
+        <p:spPr/>
+        <p:txBody>
+          <a:bodyPr/>
+          <a:lstStyle/>
+          <a:p>
+            <a:fld id="{A13346AC-834C-4A56-95C5-E001FE57D90F}" type="slidenum">
+              <a:rPr kumimoji="1" lang="ja-JP" altLang="en-US" smtClean="0"/>
+              <a:t>6</a:t>
+            </a:fld>
+            <a:endParaRPr kumimoji="1" lang="ja-JP" altLang="en-US"/>
+          </a:p>
+        </p:txBody>
+      </p:sp>
+    </p:spTree>
+    <p:extLst>
+      <p:ext uri="{BB962C8B-B14F-4D97-AF65-F5344CB8AC3E}">
+        <p14:creationId xmlns:p14="http://schemas.microsoft.com/office/powerpoint/2010/main" val="2876140885"/>
+      </p:ext>
+    </p:extLst>
+  </p:cSld>
+  <p:clrMapOvr>
+    <a:masterClrMapping/>
+  </p:clrMapOvr>
+</p:notes>
+</file>
+
 <file path=ppt/slideLayouts/slideLayout1.xml><?xml version="1.0" encoding="utf-8"?>
 <p:sldLayout xmlns:a="http://schemas.openxmlformats.org/drawingml/2006/main" xmlns:r="http://schemas.openxmlformats.org/officeDocument/2006/relationships" xmlns:p="http://schemas.openxmlformats.org/presentationml/2006/main" type="title" preserve="1">
   <p:cSld name="タイトル スライド">
@@ -257,7 +812,7 @@
           <a:p>
             <a:fld id="{B22DF019-3CA4-4DC1-8436-443526D0032F}" type="datetimeFigureOut">
               <a:rPr kumimoji="1" lang="ja-JP" altLang="en-US" smtClean="0"/>
-              <a:t>2016/6/21</a:t>
+              <a:t>2017/12/15</a:t>
             </a:fld>
             <a:endParaRPr kumimoji="1" lang="ja-JP" altLang="en-US"/>
           </a:p>
@@ -459,7 +1014,7 @@
           <a:p>
             <a:fld id="{B22DF019-3CA4-4DC1-8436-443526D0032F}" type="datetimeFigureOut">
               <a:rPr kumimoji="1" lang="ja-JP" altLang="en-US" smtClean="0"/>
-              <a:t>2016/6/21</a:t>
+              <a:t>2017/12/15</a:t>
             </a:fld>
             <a:endParaRPr kumimoji="1" lang="ja-JP" altLang="en-US"/>
           </a:p>
@@ -671,7 +1226,7 @@
           <a:p>
             <a:fld id="{B22DF019-3CA4-4DC1-8436-443526D0032F}" type="datetimeFigureOut">
               <a:rPr kumimoji="1" lang="ja-JP" altLang="en-US" smtClean="0"/>
-              <a:t>2016/6/21</a:t>
+              <a:t>2017/12/15</a:t>
             </a:fld>
             <a:endParaRPr kumimoji="1" lang="ja-JP" altLang="en-US"/>
           </a:p>
@@ -873,7 +1428,7 @@
           <a:p>
             <a:fld id="{B22DF019-3CA4-4DC1-8436-443526D0032F}" type="datetimeFigureOut">
               <a:rPr kumimoji="1" lang="ja-JP" altLang="en-US" smtClean="0"/>
-              <a:t>2016/6/21</a:t>
+              <a:t>2017/12/15</a:t>
             </a:fld>
             <a:endParaRPr kumimoji="1" lang="ja-JP" altLang="en-US"/>
           </a:p>
@@ -1117,7 +1672,7 @@
           <a:p>
             <a:fld id="{B22DF019-3CA4-4DC1-8436-443526D0032F}" type="datetimeFigureOut">
               <a:rPr kumimoji="1" lang="ja-JP" altLang="en-US" smtClean="0"/>
-              <a:t>2016/6/21</a:t>
+              <a:t>2017/12/15</a:t>
             </a:fld>
             <a:endParaRPr kumimoji="1" lang="ja-JP" altLang="en-US"/>
           </a:p>
@@ -1413,7 +1968,7 @@
           <a:p>
             <a:fld id="{B22DF019-3CA4-4DC1-8436-443526D0032F}" type="datetimeFigureOut">
               <a:rPr kumimoji="1" lang="ja-JP" altLang="en-US" smtClean="0"/>
-              <a:t>2016/6/21</a:t>
+              <a:t>2017/12/15</a:t>
             </a:fld>
             <a:endParaRPr kumimoji="1" lang="ja-JP" altLang="en-US"/>
           </a:p>
@@ -1844,7 +2399,7 @@
           <a:p>
             <a:fld id="{B22DF019-3CA4-4DC1-8436-443526D0032F}" type="datetimeFigureOut">
               <a:rPr kumimoji="1" lang="ja-JP" altLang="en-US" smtClean="0"/>
-              <a:t>2016/6/21</a:t>
+              <a:t>2017/12/15</a:t>
             </a:fld>
             <a:endParaRPr kumimoji="1" lang="ja-JP" altLang="en-US"/>
           </a:p>
@@ -1962,7 +2517,7 @@
           <a:p>
             <a:fld id="{B22DF019-3CA4-4DC1-8436-443526D0032F}" type="datetimeFigureOut">
               <a:rPr kumimoji="1" lang="ja-JP" altLang="en-US" smtClean="0"/>
-              <a:t>2016/6/21</a:t>
+              <a:t>2017/12/15</a:t>
             </a:fld>
             <a:endParaRPr kumimoji="1" lang="ja-JP" altLang="en-US"/>
           </a:p>
@@ -2057,7 +2612,7 @@
           <a:p>
             <a:fld id="{B22DF019-3CA4-4DC1-8436-443526D0032F}" type="datetimeFigureOut">
               <a:rPr kumimoji="1" lang="ja-JP" altLang="en-US" smtClean="0"/>
-              <a:t>2016/6/21</a:t>
+              <a:t>2017/12/15</a:t>
             </a:fld>
             <a:endParaRPr kumimoji="1" lang="ja-JP" altLang="en-US"/>
           </a:p>
@@ -2366,7 +2921,7 @@
           <a:p>
             <a:fld id="{B22DF019-3CA4-4DC1-8436-443526D0032F}" type="datetimeFigureOut">
               <a:rPr kumimoji="1" lang="ja-JP" altLang="en-US" smtClean="0"/>
-              <a:t>2016/6/21</a:t>
+              <a:t>2017/12/15</a:t>
             </a:fld>
             <a:endParaRPr kumimoji="1" lang="ja-JP" altLang="en-US"/>
           </a:p>
@@ -2623,7 +3178,7 @@
           <a:p>
             <a:fld id="{B22DF019-3CA4-4DC1-8436-443526D0032F}" type="datetimeFigureOut">
               <a:rPr kumimoji="1" lang="ja-JP" altLang="en-US" smtClean="0"/>
-              <a:t>2016/6/21</a:t>
+              <a:t>2017/12/15</a:t>
             </a:fld>
             <a:endParaRPr kumimoji="1" lang="ja-JP" altLang="en-US"/>
           </a:p>
@@ -2868,7 +3423,7 @@
           <a:p>
             <a:fld id="{B22DF019-3CA4-4DC1-8436-443526D0032F}" type="datetimeFigureOut">
               <a:rPr kumimoji="1" lang="ja-JP" altLang="en-US" smtClean="0"/>
-              <a:t>2016/6/21</a:t>
+              <a:t>2017/12/15</a:t>
             </a:fld>
             <a:endParaRPr kumimoji="1" lang="ja-JP" altLang="en-US"/>
           </a:p>
@@ -6039,6 +6594,2030 @@
 </p:sld>
 </file>
 
+<file path=ppt/slides/slide5.xml><?xml version="1.0" encoding="utf-8"?>
+<p:sld xmlns:a="http://schemas.openxmlformats.org/drawingml/2006/main" xmlns:r="http://schemas.openxmlformats.org/officeDocument/2006/relationships" xmlns:p="http://schemas.openxmlformats.org/presentationml/2006/main">
+  <p:cSld>
+    <p:spTree>
+      <p:nvGrpSpPr>
+        <p:cNvPr id="1" name=""/>
+        <p:cNvGrpSpPr/>
+        <p:nvPr/>
+      </p:nvGrpSpPr>
+      <p:grpSpPr>
+        <a:xfrm>
+          <a:off x="0" y="0"/>
+          <a:ext cx="0" cy="0"/>
+          <a:chOff x="0" y="0"/>
+          <a:chExt cx="0" cy="0"/>
+        </a:xfrm>
+      </p:grpSpPr>
+      <p:sp>
+        <p:nvSpPr>
+          <p:cNvPr id="3" name="テキスト ボックス 2"/>
+          <p:cNvSpPr txBox="1"/>
+          <p:nvPr/>
+        </p:nvSpPr>
+        <p:spPr>
+          <a:xfrm>
+            <a:off x="2153575" y="4162170"/>
+            <a:ext cx="517161" cy="400110"/>
+          </a:xfrm>
+          <a:prstGeom prst="rect">
+            <a:avLst/>
+          </a:prstGeom>
+          <a:noFill/>
+        </p:spPr>
+        <p:txBody>
+          <a:bodyPr wrap="square" rtlCol="0">
+            <a:spAutoFit/>
+          </a:bodyPr>
+          <a:lstStyle/>
+          <a:p>
+            <a:pPr algn="ctr"/>
+            <a:r>
+              <a:rPr lang="en-US" altLang="ja-JP" sz="2000" dirty="0"/>
+              <a:t>a</a:t>
+            </a:r>
+            <a:r>
+              <a:rPr kumimoji="1" lang="en-US" altLang="ja-JP" sz="2000" dirty="0" smtClean="0"/>
+              <a:t>1</a:t>
+            </a:r>
+            <a:endParaRPr kumimoji="1" lang="ja-JP" altLang="en-US" sz="2000" dirty="0"/>
+          </a:p>
+        </p:txBody>
+      </p:sp>
+      <p:sp>
+        <p:nvSpPr>
+          <p:cNvPr id="10" name="テキスト ボックス 9"/>
+          <p:cNvSpPr txBox="1"/>
+          <p:nvPr/>
+        </p:nvSpPr>
+        <p:spPr>
+          <a:xfrm>
+            <a:off x="2880607" y="4162170"/>
+            <a:ext cx="517161" cy="400110"/>
+          </a:xfrm>
+          <a:prstGeom prst="rect">
+            <a:avLst/>
+          </a:prstGeom>
+          <a:noFill/>
+        </p:spPr>
+        <p:txBody>
+          <a:bodyPr wrap="square" rtlCol="0">
+            <a:spAutoFit/>
+          </a:bodyPr>
+          <a:lstStyle/>
+          <a:p>
+            <a:pPr algn="ctr"/>
+            <a:r>
+              <a:rPr lang="en-US" altLang="ja-JP" sz="2000" dirty="0"/>
+              <a:t>a</a:t>
+            </a:r>
+            <a:r>
+              <a:rPr kumimoji="1" lang="en-US" altLang="ja-JP" sz="2000" dirty="0" smtClean="0"/>
+              <a:t>2</a:t>
+            </a:r>
+            <a:endParaRPr kumimoji="1" lang="ja-JP" altLang="en-US" sz="2000" dirty="0"/>
+          </a:p>
+        </p:txBody>
+      </p:sp>
+      <p:sp>
+        <p:nvSpPr>
+          <p:cNvPr id="11" name="テキスト ボックス 10"/>
+          <p:cNvSpPr txBox="1"/>
+          <p:nvPr/>
+        </p:nvSpPr>
+        <p:spPr>
+          <a:xfrm>
+            <a:off x="3602634" y="4157545"/>
+            <a:ext cx="517161" cy="400110"/>
+          </a:xfrm>
+          <a:prstGeom prst="rect">
+            <a:avLst/>
+          </a:prstGeom>
+          <a:noFill/>
+        </p:spPr>
+        <p:txBody>
+          <a:bodyPr wrap="square" rtlCol="0">
+            <a:spAutoFit/>
+          </a:bodyPr>
+          <a:lstStyle/>
+          <a:p>
+            <a:pPr algn="ctr"/>
+            <a:r>
+              <a:rPr lang="en-US" altLang="ja-JP" sz="2000" dirty="0"/>
+              <a:t>a</a:t>
+            </a:r>
+            <a:r>
+              <a:rPr kumimoji="1" lang="en-US" altLang="ja-JP" sz="2000" dirty="0" smtClean="0"/>
+              <a:t>3</a:t>
+            </a:r>
+            <a:endParaRPr kumimoji="1" lang="ja-JP" altLang="en-US" sz="2000" dirty="0"/>
+          </a:p>
+        </p:txBody>
+      </p:sp>
+      <p:sp>
+        <p:nvSpPr>
+          <p:cNvPr id="15" name="正方形/長方形 14"/>
+          <p:cNvSpPr/>
+          <p:nvPr/>
+        </p:nvSpPr>
+        <p:spPr>
+          <a:xfrm>
+            <a:off x="2293493" y="3436495"/>
+            <a:ext cx="247336" cy="727023"/>
+          </a:xfrm>
+          <a:prstGeom prst="rect">
+            <a:avLst/>
+          </a:prstGeom>
+          <a:solidFill>
+            <a:srgbClr val="00B0F0">
+              <a:alpha val="40000"/>
+            </a:srgbClr>
+          </a:solidFill>
+          <a:ln w="25400">
+            <a:solidFill>
+              <a:srgbClr val="0070C0"/>
+            </a:solidFill>
+          </a:ln>
+        </p:spPr>
+        <p:style>
+          <a:lnRef idx="2">
+            <a:schemeClr val="accent1">
+              <a:shade val="50000"/>
+            </a:schemeClr>
+          </a:lnRef>
+          <a:fillRef idx="1">
+            <a:schemeClr val="accent1"/>
+          </a:fillRef>
+          <a:effectRef idx="0">
+            <a:schemeClr val="accent1"/>
+          </a:effectRef>
+          <a:fontRef idx="minor">
+            <a:schemeClr val="lt1"/>
+          </a:fontRef>
+        </p:style>
+        <p:txBody>
+          <a:bodyPr rtlCol="0" anchor="ctr"/>
+          <a:lstStyle/>
+          <a:p>
+            <a:pPr algn="ctr"/>
+            <a:endParaRPr kumimoji="1" lang="ja-JP" altLang="en-US"/>
+          </a:p>
+        </p:txBody>
+      </p:sp>
+      <p:sp>
+        <p:nvSpPr>
+          <p:cNvPr id="16" name="正方形/長方形 15"/>
+          <p:cNvSpPr/>
+          <p:nvPr/>
+        </p:nvSpPr>
+        <p:spPr>
+          <a:xfrm>
+            <a:off x="3015520" y="3436494"/>
+            <a:ext cx="247336" cy="727023"/>
+          </a:xfrm>
+          <a:prstGeom prst="rect">
+            <a:avLst/>
+          </a:prstGeom>
+          <a:solidFill>
+            <a:srgbClr val="00B0F0">
+              <a:alpha val="40000"/>
+            </a:srgbClr>
+          </a:solidFill>
+          <a:ln w="25400">
+            <a:solidFill>
+              <a:srgbClr val="0070C0"/>
+            </a:solidFill>
+          </a:ln>
+        </p:spPr>
+        <p:style>
+          <a:lnRef idx="2">
+            <a:schemeClr val="accent1">
+              <a:shade val="50000"/>
+            </a:schemeClr>
+          </a:lnRef>
+          <a:fillRef idx="1">
+            <a:schemeClr val="accent1"/>
+          </a:fillRef>
+          <a:effectRef idx="0">
+            <a:schemeClr val="accent1"/>
+          </a:effectRef>
+          <a:fontRef idx="minor">
+            <a:schemeClr val="lt1"/>
+          </a:fontRef>
+        </p:style>
+        <p:txBody>
+          <a:bodyPr rtlCol="0" anchor="ctr"/>
+          <a:lstStyle/>
+          <a:p>
+            <a:pPr algn="ctr"/>
+            <a:endParaRPr kumimoji="1" lang="ja-JP" altLang="en-US"/>
+          </a:p>
+        </p:txBody>
+      </p:sp>
+      <p:sp>
+        <p:nvSpPr>
+          <p:cNvPr id="17" name="正方形/長方形 16"/>
+          <p:cNvSpPr/>
+          <p:nvPr/>
+        </p:nvSpPr>
+        <p:spPr>
+          <a:xfrm>
+            <a:off x="3737547" y="3436494"/>
+            <a:ext cx="247336" cy="727023"/>
+          </a:xfrm>
+          <a:prstGeom prst="rect">
+            <a:avLst/>
+          </a:prstGeom>
+          <a:solidFill>
+            <a:srgbClr val="00B0F0">
+              <a:alpha val="40000"/>
+            </a:srgbClr>
+          </a:solidFill>
+          <a:ln w="25400">
+            <a:solidFill>
+              <a:srgbClr val="0070C0"/>
+            </a:solidFill>
+          </a:ln>
+        </p:spPr>
+        <p:style>
+          <a:lnRef idx="2">
+            <a:schemeClr val="accent1">
+              <a:shade val="50000"/>
+            </a:schemeClr>
+          </a:lnRef>
+          <a:fillRef idx="1">
+            <a:schemeClr val="accent1"/>
+          </a:fillRef>
+          <a:effectRef idx="0">
+            <a:schemeClr val="accent1"/>
+          </a:effectRef>
+          <a:fontRef idx="minor">
+            <a:schemeClr val="lt1"/>
+          </a:fontRef>
+        </p:style>
+        <p:txBody>
+          <a:bodyPr rtlCol="0" anchor="ctr"/>
+          <a:lstStyle/>
+          <a:p>
+            <a:pPr algn="ctr"/>
+            <a:endParaRPr kumimoji="1" lang="ja-JP" altLang="en-US"/>
+          </a:p>
+        </p:txBody>
+      </p:sp>
+      <p:sp>
+        <p:nvSpPr>
+          <p:cNvPr id="31" name="テキスト ボックス 30"/>
+          <p:cNvSpPr txBox="1"/>
+          <p:nvPr/>
+        </p:nvSpPr>
+        <p:spPr>
+          <a:xfrm>
+            <a:off x="1818802" y="3599278"/>
+            <a:ext cx="469683" cy="400110"/>
+          </a:xfrm>
+          <a:prstGeom prst="rect">
+            <a:avLst/>
+          </a:prstGeom>
+          <a:noFill/>
+        </p:spPr>
+        <p:txBody>
+          <a:bodyPr wrap="square" rtlCol="0">
+            <a:spAutoFit/>
+          </a:bodyPr>
+          <a:lstStyle/>
+          <a:p>
+            <a:pPr algn="ctr"/>
+            <a:r>
+              <a:rPr kumimoji="1" lang="en-US" altLang="ja-JP" sz="2000" dirty="0" smtClean="0"/>
+              <a:t>20</a:t>
+            </a:r>
+            <a:endParaRPr kumimoji="1" lang="ja-JP" altLang="en-US" sz="2000" dirty="0"/>
+          </a:p>
+        </p:txBody>
+      </p:sp>
+      <p:sp>
+        <p:nvSpPr>
+          <p:cNvPr id="34" name="正方形/長方形 33"/>
+          <p:cNvSpPr/>
+          <p:nvPr/>
+        </p:nvSpPr>
+        <p:spPr>
+          <a:xfrm>
+            <a:off x="1581447" y="1983122"/>
+            <a:ext cx="247336" cy="727023"/>
+          </a:xfrm>
+          <a:prstGeom prst="rect">
+            <a:avLst/>
+          </a:prstGeom>
+          <a:solidFill>
+            <a:srgbClr val="FFC000">
+              <a:alpha val="40000"/>
+            </a:srgbClr>
+          </a:solidFill>
+          <a:ln w="25400">
+            <a:solidFill>
+              <a:srgbClr val="FF0000"/>
+            </a:solidFill>
+          </a:ln>
+        </p:spPr>
+        <p:style>
+          <a:lnRef idx="2">
+            <a:schemeClr val="accent1">
+              <a:shade val="50000"/>
+            </a:schemeClr>
+          </a:lnRef>
+          <a:fillRef idx="1">
+            <a:schemeClr val="accent1"/>
+          </a:fillRef>
+          <a:effectRef idx="0">
+            <a:schemeClr val="accent1"/>
+          </a:effectRef>
+          <a:fontRef idx="minor">
+            <a:schemeClr val="lt1"/>
+          </a:fontRef>
+        </p:style>
+        <p:txBody>
+          <a:bodyPr rtlCol="0" anchor="ctr"/>
+          <a:lstStyle/>
+          <a:p>
+            <a:pPr algn="ctr"/>
+            <a:endParaRPr kumimoji="1" lang="ja-JP" altLang="en-US"/>
+          </a:p>
+        </p:txBody>
+      </p:sp>
+      <p:cxnSp>
+        <p:nvCxnSpPr>
+          <p:cNvPr id="5" name="直線矢印コネクタ 4"/>
+          <p:cNvCxnSpPr/>
+          <p:nvPr/>
+        </p:nvCxnSpPr>
+        <p:spPr>
+          <a:xfrm flipV="1">
+            <a:off x="2412155" y="2855626"/>
+            <a:ext cx="0" cy="449705"/>
+          </a:xfrm>
+          <a:prstGeom prst="straightConnector1">
+            <a:avLst/>
+          </a:prstGeom>
+          <a:ln w="31750">
+            <a:solidFill>
+              <a:schemeClr val="tx1"/>
+            </a:solidFill>
+            <a:tailEnd type="triangle"/>
+          </a:ln>
+        </p:spPr>
+        <p:style>
+          <a:lnRef idx="1">
+            <a:schemeClr val="accent1"/>
+          </a:lnRef>
+          <a:fillRef idx="0">
+            <a:schemeClr val="accent1"/>
+          </a:fillRef>
+          <a:effectRef idx="0">
+            <a:schemeClr val="accent1"/>
+          </a:effectRef>
+          <a:fontRef idx="minor">
+            <a:schemeClr val="tx1"/>
+          </a:fontRef>
+        </p:style>
+      </p:cxnSp>
+      <p:sp>
+        <p:nvSpPr>
+          <p:cNvPr id="35" name="正方形/長方形 34"/>
+          <p:cNvSpPr/>
+          <p:nvPr/>
+        </p:nvSpPr>
+        <p:spPr>
+          <a:xfrm>
+            <a:off x="2278487" y="1983123"/>
+            <a:ext cx="247336" cy="727023"/>
+          </a:xfrm>
+          <a:prstGeom prst="rect">
+            <a:avLst/>
+          </a:prstGeom>
+          <a:solidFill>
+            <a:srgbClr val="FFC000">
+              <a:alpha val="40000"/>
+            </a:srgbClr>
+          </a:solidFill>
+          <a:ln w="25400">
+            <a:solidFill>
+              <a:srgbClr val="FF0000"/>
+            </a:solidFill>
+          </a:ln>
+        </p:spPr>
+        <p:style>
+          <a:lnRef idx="2">
+            <a:schemeClr val="accent1">
+              <a:shade val="50000"/>
+            </a:schemeClr>
+          </a:lnRef>
+          <a:fillRef idx="1">
+            <a:schemeClr val="accent1"/>
+          </a:fillRef>
+          <a:effectRef idx="0">
+            <a:schemeClr val="accent1"/>
+          </a:effectRef>
+          <a:fontRef idx="minor">
+            <a:schemeClr val="lt1"/>
+          </a:fontRef>
+        </p:style>
+        <p:txBody>
+          <a:bodyPr rtlCol="0" anchor="ctr"/>
+          <a:lstStyle/>
+          <a:p>
+            <a:pPr algn="ctr"/>
+            <a:endParaRPr kumimoji="1" lang="ja-JP" altLang="en-US"/>
+          </a:p>
+        </p:txBody>
+      </p:sp>
+      <p:sp>
+        <p:nvSpPr>
+          <p:cNvPr id="36" name="正方形/長方形 35"/>
+          <p:cNvSpPr/>
+          <p:nvPr/>
+        </p:nvSpPr>
+        <p:spPr>
+          <a:xfrm>
+            <a:off x="3015519" y="1983122"/>
+            <a:ext cx="247336" cy="727023"/>
+          </a:xfrm>
+          <a:prstGeom prst="rect">
+            <a:avLst/>
+          </a:prstGeom>
+          <a:solidFill>
+            <a:srgbClr val="FFC000">
+              <a:alpha val="40000"/>
+            </a:srgbClr>
+          </a:solidFill>
+          <a:ln w="25400">
+            <a:solidFill>
+              <a:srgbClr val="FF0000"/>
+            </a:solidFill>
+          </a:ln>
+        </p:spPr>
+        <p:style>
+          <a:lnRef idx="2">
+            <a:schemeClr val="accent1">
+              <a:shade val="50000"/>
+            </a:schemeClr>
+          </a:lnRef>
+          <a:fillRef idx="1">
+            <a:schemeClr val="accent1"/>
+          </a:fillRef>
+          <a:effectRef idx="0">
+            <a:schemeClr val="accent1"/>
+          </a:effectRef>
+          <a:fontRef idx="minor">
+            <a:schemeClr val="lt1"/>
+          </a:fontRef>
+        </p:style>
+        <p:txBody>
+          <a:bodyPr rtlCol="0" anchor="ctr"/>
+          <a:lstStyle/>
+          <a:p>
+            <a:pPr algn="ctr"/>
+            <a:endParaRPr kumimoji="1" lang="ja-JP" altLang="en-US"/>
+          </a:p>
+        </p:txBody>
+      </p:sp>
+      <p:sp>
+        <p:nvSpPr>
+          <p:cNvPr id="37" name="正方形/長方形 36"/>
+          <p:cNvSpPr/>
+          <p:nvPr/>
+        </p:nvSpPr>
+        <p:spPr>
+          <a:xfrm>
+            <a:off x="3737546" y="1983122"/>
+            <a:ext cx="247336" cy="727023"/>
+          </a:xfrm>
+          <a:prstGeom prst="rect">
+            <a:avLst/>
+          </a:prstGeom>
+          <a:solidFill>
+            <a:srgbClr val="FFC000">
+              <a:alpha val="40000"/>
+            </a:srgbClr>
+          </a:solidFill>
+          <a:ln w="25400">
+            <a:solidFill>
+              <a:srgbClr val="FF0000"/>
+            </a:solidFill>
+          </a:ln>
+        </p:spPr>
+        <p:style>
+          <a:lnRef idx="2">
+            <a:schemeClr val="accent1">
+              <a:shade val="50000"/>
+            </a:schemeClr>
+          </a:lnRef>
+          <a:fillRef idx="1">
+            <a:schemeClr val="accent1"/>
+          </a:fillRef>
+          <a:effectRef idx="0">
+            <a:schemeClr val="accent1"/>
+          </a:effectRef>
+          <a:fontRef idx="minor">
+            <a:schemeClr val="lt1"/>
+          </a:fontRef>
+        </p:style>
+        <p:txBody>
+          <a:bodyPr rtlCol="0" anchor="ctr"/>
+          <a:lstStyle/>
+          <a:p>
+            <a:pPr algn="ctr"/>
+            <a:endParaRPr kumimoji="1" lang="ja-JP" altLang="en-US"/>
+          </a:p>
+        </p:txBody>
+      </p:sp>
+      <p:cxnSp>
+        <p:nvCxnSpPr>
+          <p:cNvPr id="38" name="直線矢印コネクタ 37"/>
+          <p:cNvCxnSpPr/>
+          <p:nvPr/>
+        </p:nvCxnSpPr>
+        <p:spPr>
+          <a:xfrm>
+            <a:off x="1883899" y="2366150"/>
+            <a:ext cx="354478" cy="0"/>
+          </a:xfrm>
+          <a:prstGeom prst="straightConnector1">
+            <a:avLst/>
+          </a:prstGeom>
+          <a:ln w="31750">
+            <a:solidFill>
+              <a:schemeClr val="tx1"/>
+            </a:solidFill>
+            <a:tailEnd type="triangle"/>
+          </a:ln>
+        </p:spPr>
+        <p:style>
+          <a:lnRef idx="1">
+            <a:schemeClr val="accent1"/>
+          </a:lnRef>
+          <a:fillRef idx="0">
+            <a:schemeClr val="accent1"/>
+          </a:fillRef>
+          <a:effectRef idx="0">
+            <a:schemeClr val="accent1"/>
+          </a:effectRef>
+          <a:fontRef idx="minor">
+            <a:schemeClr val="tx1"/>
+          </a:fontRef>
+        </p:style>
+      </p:cxnSp>
+      <p:cxnSp>
+        <p:nvCxnSpPr>
+          <p:cNvPr id="39" name="直線矢印コネクタ 38"/>
+          <p:cNvCxnSpPr/>
+          <p:nvPr/>
+        </p:nvCxnSpPr>
+        <p:spPr>
+          <a:xfrm>
+            <a:off x="2605925" y="2366150"/>
+            <a:ext cx="354478" cy="0"/>
+          </a:xfrm>
+          <a:prstGeom prst="straightConnector1">
+            <a:avLst/>
+          </a:prstGeom>
+          <a:ln w="31750">
+            <a:solidFill>
+              <a:schemeClr val="tx1"/>
+            </a:solidFill>
+            <a:tailEnd type="triangle"/>
+          </a:ln>
+        </p:spPr>
+        <p:style>
+          <a:lnRef idx="1">
+            <a:schemeClr val="accent1"/>
+          </a:lnRef>
+          <a:fillRef idx="0">
+            <a:schemeClr val="accent1"/>
+          </a:fillRef>
+          <a:effectRef idx="0">
+            <a:schemeClr val="accent1"/>
+          </a:effectRef>
+          <a:fontRef idx="minor">
+            <a:schemeClr val="tx1"/>
+          </a:fontRef>
+        </p:style>
+      </p:cxnSp>
+      <p:cxnSp>
+        <p:nvCxnSpPr>
+          <p:cNvPr id="40" name="直線矢印コネクタ 39"/>
+          <p:cNvCxnSpPr/>
+          <p:nvPr/>
+        </p:nvCxnSpPr>
+        <p:spPr>
+          <a:xfrm>
+            <a:off x="3332948" y="2366352"/>
+            <a:ext cx="354478" cy="0"/>
+          </a:xfrm>
+          <a:prstGeom prst="straightConnector1">
+            <a:avLst/>
+          </a:prstGeom>
+          <a:ln w="31750">
+            <a:solidFill>
+              <a:schemeClr val="tx1"/>
+            </a:solidFill>
+            <a:tailEnd type="triangle"/>
+          </a:ln>
+        </p:spPr>
+        <p:style>
+          <a:lnRef idx="1">
+            <a:schemeClr val="accent1"/>
+          </a:lnRef>
+          <a:fillRef idx="0">
+            <a:schemeClr val="accent1"/>
+          </a:fillRef>
+          <a:effectRef idx="0">
+            <a:schemeClr val="accent1"/>
+          </a:effectRef>
+          <a:fontRef idx="minor">
+            <a:schemeClr val="tx1"/>
+          </a:fontRef>
+        </p:style>
+      </p:cxnSp>
+      <p:cxnSp>
+        <p:nvCxnSpPr>
+          <p:cNvPr id="41" name="直線矢印コネクタ 40"/>
+          <p:cNvCxnSpPr/>
+          <p:nvPr/>
+        </p:nvCxnSpPr>
+        <p:spPr>
+          <a:xfrm flipV="1">
+            <a:off x="3139187" y="2855626"/>
+            <a:ext cx="0" cy="449705"/>
+          </a:xfrm>
+          <a:prstGeom prst="straightConnector1">
+            <a:avLst/>
+          </a:prstGeom>
+          <a:ln w="31750">
+            <a:solidFill>
+              <a:schemeClr val="tx1"/>
+            </a:solidFill>
+            <a:tailEnd type="triangle"/>
+          </a:ln>
+        </p:spPr>
+        <p:style>
+          <a:lnRef idx="1">
+            <a:schemeClr val="accent1"/>
+          </a:lnRef>
+          <a:fillRef idx="0">
+            <a:schemeClr val="accent1"/>
+          </a:fillRef>
+          <a:effectRef idx="0">
+            <a:schemeClr val="accent1"/>
+          </a:effectRef>
+          <a:fontRef idx="minor">
+            <a:schemeClr val="tx1"/>
+          </a:fontRef>
+        </p:style>
+      </p:cxnSp>
+      <p:cxnSp>
+        <p:nvCxnSpPr>
+          <p:cNvPr id="42" name="直線矢印コネクタ 41"/>
+          <p:cNvCxnSpPr/>
+          <p:nvPr/>
+        </p:nvCxnSpPr>
+        <p:spPr>
+          <a:xfrm flipV="1">
+            <a:off x="3861214" y="2855625"/>
+            <a:ext cx="0" cy="449705"/>
+          </a:xfrm>
+          <a:prstGeom prst="straightConnector1">
+            <a:avLst/>
+          </a:prstGeom>
+          <a:ln w="31750">
+            <a:solidFill>
+              <a:schemeClr val="tx1"/>
+            </a:solidFill>
+            <a:tailEnd type="triangle"/>
+          </a:ln>
+        </p:spPr>
+        <p:style>
+          <a:lnRef idx="1">
+            <a:schemeClr val="accent1"/>
+          </a:lnRef>
+          <a:fillRef idx="0">
+            <a:schemeClr val="accent1"/>
+          </a:fillRef>
+          <a:effectRef idx="0">
+            <a:schemeClr val="accent1"/>
+          </a:effectRef>
+          <a:fontRef idx="minor">
+            <a:schemeClr val="tx1"/>
+          </a:fontRef>
+        </p:style>
+      </p:cxnSp>
+      <p:sp>
+        <p:nvSpPr>
+          <p:cNvPr id="43" name="テキスト ボックス 42"/>
+          <p:cNvSpPr txBox="1"/>
+          <p:nvPr/>
+        </p:nvSpPr>
+        <p:spPr>
+          <a:xfrm>
+            <a:off x="1111764" y="2146578"/>
+            <a:ext cx="469683" cy="400110"/>
+          </a:xfrm>
+          <a:prstGeom prst="rect">
+            <a:avLst/>
+          </a:prstGeom>
+          <a:noFill/>
+        </p:spPr>
+        <p:txBody>
+          <a:bodyPr wrap="square" rtlCol="0">
+            <a:spAutoFit/>
+          </a:bodyPr>
+          <a:lstStyle/>
+          <a:p>
+            <a:pPr algn="ctr"/>
+            <a:r>
+              <a:rPr kumimoji="1" lang="en-US" altLang="ja-JP" sz="2000" dirty="0" smtClean="0"/>
+              <a:t>20</a:t>
+            </a:r>
+            <a:endParaRPr kumimoji="1" lang="ja-JP" altLang="en-US" sz="2000" dirty="0"/>
+          </a:p>
+        </p:txBody>
+      </p:sp>
+      <p:sp>
+        <p:nvSpPr>
+          <p:cNvPr id="22" name="テキスト ボックス 21"/>
+          <p:cNvSpPr txBox="1"/>
+          <p:nvPr/>
+        </p:nvSpPr>
+        <p:spPr>
+          <a:xfrm>
+            <a:off x="2391851" y="1439509"/>
+            <a:ext cx="782625" cy="400110"/>
+          </a:xfrm>
+          <a:prstGeom prst="rect">
+            <a:avLst/>
+          </a:prstGeom>
+          <a:noFill/>
+        </p:spPr>
+        <p:txBody>
+          <a:bodyPr wrap="square" rtlCol="0">
+            <a:spAutoFit/>
+          </a:bodyPr>
+          <a:lstStyle/>
+          <a:p>
+            <a:pPr algn="ctr"/>
+            <a:r>
+              <a:rPr kumimoji="1" lang="en-US" altLang="ja-JP" sz="2000" dirty="0" smtClean="0"/>
+              <a:t>LSTM</a:t>
+            </a:r>
+            <a:endParaRPr kumimoji="1" lang="ja-JP" altLang="en-US" sz="2000" dirty="0"/>
+          </a:p>
+        </p:txBody>
+      </p:sp>
+    </p:spTree>
+    <p:extLst>
+      <p:ext uri="{BB962C8B-B14F-4D97-AF65-F5344CB8AC3E}">
+        <p14:creationId xmlns:p14="http://schemas.microsoft.com/office/powerpoint/2010/main" val="573295304"/>
+      </p:ext>
+    </p:extLst>
+  </p:cSld>
+  <p:clrMapOvr>
+    <a:masterClrMapping/>
+  </p:clrMapOvr>
+  <p:timing>
+    <p:tnLst>
+      <p:par>
+        <p:cTn id="1" dur="indefinite" restart="never" nodeType="tmRoot"/>
+      </p:par>
+    </p:tnLst>
+  </p:timing>
+</p:sld>
+</file>
+
+<file path=ppt/slides/slide6.xml><?xml version="1.0" encoding="utf-8"?>
+<p:sld xmlns:a="http://schemas.openxmlformats.org/drawingml/2006/main" xmlns:r="http://schemas.openxmlformats.org/officeDocument/2006/relationships" xmlns:p="http://schemas.openxmlformats.org/presentationml/2006/main">
+  <p:cSld>
+    <p:spTree>
+      <p:nvGrpSpPr>
+        <p:cNvPr id="1" name=""/>
+        <p:cNvGrpSpPr/>
+        <p:nvPr/>
+      </p:nvGrpSpPr>
+      <p:grpSpPr>
+        <a:xfrm>
+          <a:off x="0" y="0"/>
+          <a:ext cx="0" cy="0"/>
+          <a:chOff x="0" y="0"/>
+          <a:chExt cx="0" cy="0"/>
+        </a:xfrm>
+      </p:grpSpPr>
+      <p:sp>
+        <p:nvSpPr>
+          <p:cNvPr id="3" name="テキスト ボックス 2"/>
+          <p:cNvSpPr txBox="1"/>
+          <p:nvPr/>
+        </p:nvSpPr>
+        <p:spPr>
+          <a:xfrm>
+            <a:off x="714518" y="2303394"/>
+            <a:ext cx="517161" cy="400110"/>
+          </a:xfrm>
+          <a:prstGeom prst="rect">
+            <a:avLst/>
+          </a:prstGeom>
+          <a:noFill/>
+        </p:spPr>
+        <p:txBody>
+          <a:bodyPr wrap="square" rtlCol="0">
+            <a:spAutoFit/>
+          </a:bodyPr>
+          <a:lstStyle/>
+          <a:p>
+            <a:pPr algn="ctr"/>
+            <a:r>
+              <a:rPr lang="en-US" altLang="ja-JP" sz="2000" dirty="0"/>
+              <a:t>a</a:t>
+            </a:r>
+            <a:r>
+              <a:rPr kumimoji="1" lang="en-US" altLang="ja-JP" sz="2000" dirty="0" smtClean="0"/>
+              <a:t>1</a:t>
+            </a:r>
+            <a:endParaRPr kumimoji="1" lang="ja-JP" altLang="en-US" sz="2000" dirty="0"/>
+          </a:p>
+        </p:txBody>
+      </p:sp>
+      <p:sp>
+        <p:nvSpPr>
+          <p:cNvPr id="10" name="テキスト ボックス 9"/>
+          <p:cNvSpPr txBox="1"/>
+          <p:nvPr/>
+        </p:nvSpPr>
+        <p:spPr>
+          <a:xfrm>
+            <a:off x="1441550" y="2303394"/>
+            <a:ext cx="517161" cy="400110"/>
+          </a:xfrm>
+          <a:prstGeom prst="rect">
+            <a:avLst/>
+          </a:prstGeom>
+          <a:noFill/>
+        </p:spPr>
+        <p:txBody>
+          <a:bodyPr wrap="square" rtlCol="0">
+            <a:spAutoFit/>
+          </a:bodyPr>
+          <a:lstStyle/>
+          <a:p>
+            <a:pPr algn="ctr"/>
+            <a:r>
+              <a:rPr lang="en-US" altLang="ja-JP" sz="2000" dirty="0"/>
+              <a:t>a</a:t>
+            </a:r>
+            <a:r>
+              <a:rPr kumimoji="1" lang="en-US" altLang="ja-JP" sz="2000" dirty="0" smtClean="0"/>
+              <a:t>2</a:t>
+            </a:r>
+            <a:endParaRPr kumimoji="1" lang="ja-JP" altLang="en-US" sz="2000" dirty="0"/>
+          </a:p>
+        </p:txBody>
+      </p:sp>
+      <p:sp>
+        <p:nvSpPr>
+          <p:cNvPr id="11" name="テキスト ボックス 10"/>
+          <p:cNvSpPr txBox="1"/>
+          <p:nvPr/>
+        </p:nvSpPr>
+        <p:spPr>
+          <a:xfrm>
+            <a:off x="2163577" y="2298769"/>
+            <a:ext cx="517161" cy="400110"/>
+          </a:xfrm>
+          <a:prstGeom prst="rect">
+            <a:avLst/>
+          </a:prstGeom>
+          <a:noFill/>
+        </p:spPr>
+        <p:txBody>
+          <a:bodyPr wrap="square" rtlCol="0">
+            <a:spAutoFit/>
+          </a:bodyPr>
+          <a:lstStyle/>
+          <a:p>
+            <a:pPr algn="ctr"/>
+            <a:r>
+              <a:rPr lang="en-US" altLang="ja-JP" sz="2000" dirty="0"/>
+              <a:t>a</a:t>
+            </a:r>
+            <a:r>
+              <a:rPr kumimoji="1" lang="en-US" altLang="ja-JP" sz="2000" dirty="0" smtClean="0"/>
+              <a:t>3</a:t>
+            </a:r>
+            <a:endParaRPr kumimoji="1" lang="ja-JP" altLang="en-US" sz="2000" dirty="0"/>
+          </a:p>
+        </p:txBody>
+      </p:sp>
+      <p:sp>
+        <p:nvSpPr>
+          <p:cNvPr id="12" name="テキスト ボックス 11"/>
+          <p:cNvSpPr txBox="1"/>
+          <p:nvPr/>
+        </p:nvSpPr>
+        <p:spPr>
+          <a:xfrm>
+            <a:off x="728265" y="4156197"/>
+            <a:ext cx="517161" cy="400110"/>
+          </a:xfrm>
+          <a:prstGeom prst="rect">
+            <a:avLst/>
+          </a:prstGeom>
+          <a:noFill/>
+        </p:spPr>
+        <p:txBody>
+          <a:bodyPr wrap="square" rtlCol="0">
+            <a:spAutoFit/>
+          </a:bodyPr>
+          <a:lstStyle/>
+          <a:p>
+            <a:pPr algn="ctr"/>
+            <a:r>
+              <a:rPr lang="en-US" altLang="ja-JP" sz="2000" dirty="0"/>
+              <a:t>b</a:t>
+            </a:r>
+            <a:r>
+              <a:rPr kumimoji="1" lang="en-US" altLang="ja-JP" sz="2000" dirty="0" smtClean="0"/>
+              <a:t>1</a:t>
+            </a:r>
+            <a:endParaRPr kumimoji="1" lang="ja-JP" altLang="en-US" sz="2000" dirty="0"/>
+          </a:p>
+        </p:txBody>
+      </p:sp>
+      <p:sp>
+        <p:nvSpPr>
+          <p:cNvPr id="15" name="正方形/長方形 14"/>
+          <p:cNvSpPr/>
+          <p:nvPr/>
+        </p:nvSpPr>
+        <p:spPr>
+          <a:xfrm>
+            <a:off x="854436" y="1577719"/>
+            <a:ext cx="247336" cy="727023"/>
+          </a:xfrm>
+          <a:prstGeom prst="rect">
+            <a:avLst/>
+          </a:prstGeom>
+          <a:solidFill>
+            <a:srgbClr val="00B0F0">
+              <a:alpha val="40000"/>
+            </a:srgbClr>
+          </a:solidFill>
+          <a:ln w="25400">
+            <a:solidFill>
+              <a:srgbClr val="0070C0"/>
+            </a:solidFill>
+          </a:ln>
+        </p:spPr>
+        <p:style>
+          <a:lnRef idx="2">
+            <a:schemeClr val="accent1">
+              <a:shade val="50000"/>
+            </a:schemeClr>
+          </a:lnRef>
+          <a:fillRef idx="1">
+            <a:schemeClr val="accent1"/>
+          </a:fillRef>
+          <a:effectRef idx="0">
+            <a:schemeClr val="accent1"/>
+          </a:effectRef>
+          <a:fontRef idx="minor">
+            <a:schemeClr val="lt1"/>
+          </a:fontRef>
+        </p:style>
+        <p:txBody>
+          <a:bodyPr rtlCol="0" anchor="ctr"/>
+          <a:lstStyle/>
+          <a:p>
+            <a:pPr algn="ctr"/>
+            <a:endParaRPr kumimoji="1" lang="ja-JP" altLang="en-US"/>
+          </a:p>
+        </p:txBody>
+      </p:sp>
+      <p:sp>
+        <p:nvSpPr>
+          <p:cNvPr id="16" name="正方形/長方形 15"/>
+          <p:cNvSpPr/>
+          <p:nvPr/>
+        </p:nvSpPr>
+        <p:spPr>
+          <a:xfrm>
+            <a:off x="1576463" y="1577718"/>
+            <a:ext cx="247336" cy="727023"/>
+          </a:xfrm>
+          <a:prstGeom prst="rect">
+            <a:avLst/>
+          </a:prstGeom>
+          <a:solidFill>
+            <a:srgbClr val="00B0F0">
+              <a:alpha val="40000"/>
+            </a:srgbClr>
+          </a:solidFill>
+          <a:ln w="25400">
+            <a:solidFill>
+              <a:srgbClr val="0070C0"/>
+            </a:solidFill>
+          </a:ln>
+        </p:spPr>
+        <p:style>
+          <a:lnRef idx="2">
+            <a:schemeClr val="accent1">
+              <a:shade val="50000"/>
+            </a:schemeClr>
+          </a:lnRef>
+          <a:fillRef idx="1">
+            <a:schemeClr val="accent1"/>
+          </a:fillRef>
+          <a:effectRef idx="0">
+            <a:schemeClr val="accent1"/>
+          </a:effectRef>
+          <a:fontRef idx="minor">
+            <a:schemeClr val="lt1"/>
+          </a:fontRef>
+        </p:style>
+        <p:txBody>
+          <a:bodyPr rtlCol="0" anchor="ctr"/>
+          <a:lstStyle/>
+          <a:p>
+            <a:pPr algn="ctr"/>
+            <a:endParaRPr kumimoji="1" lang="ja-JP" altLang="en-US"/>
+          </a:p>
+        </p:txBody>
+      </p:sp>
+      <p:sp>
+        <p:nvSpPr>
+          <p:cNvPr id="17" name="正方形/長方形 16"/>
+          <p:cNvSpPr/>
+          <p:nvPr/>
+        </p:nvSpPr>
+        <p:spPr>
+          <a:xfrm>
+            <a:off x="2298490" y="1577718"/>
+            <a:ext cx="247336" cy="727023"/>
+          </a:xfrm>
+          <a:prstGeom prst="rect">
+            <a:avLst/>
+          </a:prstGeom>
+          <a:solidFill>
+            <a:srgbClr val="00B0F0">
+              <a:alpha val="40000"/>
+            </a:srgbClr>
+          </a:solidFill>
+          <a:ln w="25400">
+            <a:solidFill>
+              <a:srgbClr val="0070C0"/>
+            </a:solidFill>
+          </a:ln>
+        </p:spPr>
+        <p:style>
+          <a:lnRef idx="2">
+            <a:schemeClr val="accent1">
+              <a:shade val="50000"/>
+            </a:schemeClr>
+          </a:lnRef>
+          <a:fillRef idx="1">
+            <a:schemeClr val="accent1"/>
+          </a:fillRef>
+          <a:effectRef idx="0">
+            <a:schemeClr val="accent1"/>
+          </a:effectRef>
+          <a:fontRef idx="minor">
+            <a:schemeClr val="lt1"/>
+          </a:fontRef>
+        </p:style>
+        <p:txBody>
+          <a:bodyPr rtlCol="0" anchor="ctr"/>
+          <a:lstStyle/>
+          <a:p>
+            <a:pPr algn="ctr"/>
+            <a:endParaRPr kumimoji="1" lang="ja-JP" altLang="en-US"/>
+          </a:p>
+        </p:txBody>
+      </p:sp>
+      <p:sp>
+        <p:nvSpPr>
+          <p:cNvPr id="18" name="正方形/長方形 17"/>
+          <p:cNvSpPr/>
+          <p:nvPr/>
+        </p:nvSpPr>
+        <p:spPr>
+          <a:xfrm>
+            <a:off x="863178" y="3431870"/>
+            <a:ext cx="247336" cy="727023"/>
+          </a:xfrm>
+          <a:prstGeom prst="rect">
+            <a:avLst/>
+          </a:prstGeom>
+          <a:solidFill>
+            <a:srgbClr val="00B0F0">
+              <a:alpha val="40000"/>
+            </a:srgbClr>
+          </a:solidFill>
+          <a:ln w="25400">
+            <a:solidFill>
+              <a:srgbClr val="0070C0"/>
+            </a:solidFill>
+          </a:ln>
+        </p:spPr>
+        <p:style>
+          <a:lnRef idx="2">
+            <a:schemeClr val="accent1">
+              <a:shade val="50000"/>
+            </a:schemeClr>
+          </a:lnRef>
+          <a:fillRef idx="1">
+            <a:schemeClr val="accent1"/>
+          </a:fillRef>
+          <a:effectRef idx="0">
+            <a:schemeClr val="accent1"/>
+          </a:effectRef>
+          <a:fontRef idx="minor">
+            <a:schemeClr val="lt1"/>
+          </a:fontRef>
+        </p:style>
+        <p:txBody>
+          <a:bodyPr rtlCol="0" anchor="ctr"/>
+          <a:lstStyle/>
+          <a:p>
+            <a:pPr algn="ctr"/>
+            <a:endParaRPr kumimoji="1" lang="ja-JP" altLang="en-US"/>
+          </a:p>
+        </p:txBody>
+      </p:sp>
+      <p:sp>
+        <p:nvSpPr>
+          <p:cNvPr id="19" name="テキスト ボックス 18"/>
+          <p:cNvSpPr txBox="1"/>
+          <p:nvPr/>
+        </p:nvSpPr>
+        <p:spPr>
+          <a:xfrm>
+            <a:off x="1441550" y="4154850"/>
+            <a:ext cx="517161" cy="400110"/>
+          </a:xfrm>
+          <a:prstGeom prst="rect">
+            <a:avLst/>
+          </a:prstGeom>
+          <a:noFill/>
+        </p:spPr>
+        <p:txBody>
+          <a:bodyPr wrap="square" rtlCol="0">
+            <a:spAutoFit/>
+          </a:bodyPr>
+          <a:lstStyle/>
+          <a:p>
+            <a:pPr algn="ctr"/>
+            <a:r>
+              <a:rPr lang="en-US" altLang="ja-JP" sz="2000" dirty="0"/>
+              <a:t>b</a:t>
+            </a:r>
+            <a:r>
+              <a:rPr kumimoji="1" lang="en-US" altLang="ja-JP" sz="2000" dirty="0" smtClean="0"/>
+              <a:t>2</a:t>
+            </a:r>
+            <a:endParaRPr kumimoji="1" lang="ja-JP" altLang="en-US" sz="2000" dirty="0"/>
+          </a:p>
+        </p:txBody>
+      </p:sp>
+      <p:sp>
+        <p:nvSpPr>
+          <p:cNvPr id="20" name="正方形/長方形 19"/>
+          <p:cNvSpPr/>
+          <p:nvPr/>
+        </p:nvSpPr>
+        <p:spPr>
+          <a:xfrm>
+            <a:off x="1576463" y="3429174"/>
+            <a:ext cx="247336" cy="727023"/>
+          </a:xfrm>
+          <a:prstGeom prst="rect">
+            <a:avLst/>
+          </a:prstGeom>
+          <a:solidFill>
+            <a:srgbClr val="00B0F0">
+              <a:alpha val="40000"/>
+            </a:srgbClr>
+          </a:solidFill>
+          <a:ln w="25400">
+            <a:solidFill>
+              <a:srgbClr val="0070C0"/>
+            </a:solidFill>
+          </a:ln>
+        </p:spPr>
+        <p:style>
+          <a:lnRef idx="2">
+            <a:schemeClr val="accent1">
+              <a:shade val="50000"/>
+            </a:schemeClr>
+          </a:lnRef>
+          <a:fillRef idx="1">
+            <a:schemeClr val="accent1"/>
+          </a:fillRef>
+          <a:effectRef idx="0">
+            <a:schemeClr val="accent1"/>
+          </a:effectRef>
+          <a:fontRef idx="minor">
+            <a:schemeClr val="lt1"/>
+          </a:fontRef>
+        </p:style>
+        <p:txBody>
+          <a:bodyPr rtlCol="0" anchor="ctr"/>
+          <a:lstStyle/>
+          <a:p>
+            <a:pPr algn="ctr"/>
+            <a:endParaRPr kumimoji="1" lang="ja-JP" altLang="en-US"/>
+          </a:p>
+        </p:txBody>
+      </p:sp>
+      <p:sp>
+        <p:nvSpPr>
+          <p:cNvPr id="21" name="テキスト ボックス 20"/>
+          <p:cNvSpPr txBox="1"/>
+          <p:nvPr/>
+        </p:nvSpPr>
+        <p:spPr>
+          <a:xfrm>
+            <a:off x="738250" y="5958466"/>
+            <a:ext cx="517161" cy="400110"/>
+          </a:xfrm>
+          <a:prstGeom prst="rect">
+            <a:avLst/>
+          </a:prstGeom>
+          <a:noFill/>
+        </p:spPr>
+        <p:txBody>
+          <a:bodyPr wrap="square" rtlCol="0">
+            <a:spAutoFit/>
+          </a:bodyPr>
+          <a:lstStyle/>
+          <a:p>
+            <a:pPr algn="ctr"/>
+            <a:r>
+              <a:rPr lang="en-US" altLang="ja-JP" sz="2000" dirty="0"/>
+              <a:t>c</a:t>
+            </a:r>
+            <a:r>
+              <a:rPr kumimoji="1" lang="en-US" altLang="ja-JP" sz="2000" dirty="0" smtClean="0"/>
+              <a:t>1</a:t>
+            </a:r>
+            <a:endParaRPr kumimoji="1" lang="ja-JP" altLang="en-US" sz="2000" dirty="0"/>
+          </a:p>
+        </p:txBody>
+      </p:sp>
+      <p:sp>
+        <p:nvSpPr>
+          <p:cNvPr id="22" name="テキスト ボックス 21"/>
+          <p:cNvSpPr txBox="1"/>
+          <p:nvPr/>
+        </p:nvSpPr>
+        <p:spPr>
+          <a:xfrm>
+            <a:off x="1465282" y="5958466"/>
+            <a:ext cx="517161" cy="400110"/>
+          </a:xfrm>
+          <a:prstGeom prst="rect">
+            <a:avLst/>
+          </a:prstGeom>
+          <a:noFill/>
+        </p:spPr>
+        <p:txBody>
+          <a:bodyPr wrap="square" rtlCol="0">
+            <a:spAutoFit/>
+          </a:bodyPr>
+          <a:lstStyle/>
+          <a:p>
+            <a:pPr algn="ctr"/>
+            <a:r>
+              <a:rPr lang="en-US" altLang="ja-JP" sz="2000" dirty="0"/>
+              <a:t>c</a:t>
+            </a:r>
+            <a:r>
+              <a:rPr kumimoji="1" lang="en-US" altLang="ja-JP" sz="2000" dirty="0" smtClean="0"/>
+              <a:t>2</a:t>
+            </a:r>
+            <a:endParaRPr kumimoji="1" lang="ja-JP" altLang="en-US" sz="2000" dirty="0"/>
+          </a:p>
+        </p:txBody>
+      </p:sp>
+      <p:sp>
+        <p:nvSpPr>
+          <p:cNvPr id="23" name="テキスト ボックス 22"/>
+          <p:cNvSpPr txBox="1"/>
+          <p:nvPr/>
+        </p:nvSpPr>
+        <p:spPr>
+          <a:xfrm>
+            <a:off x="2187309" y="5953841"/>
+            <a:ext cx="517161" cy="400110"/>
+          </a:xfrm>
+          <a:prstGeom prst="rect">
+            <a:avLst/>
+          </a:prstGeom>
+          <a:noFill/>
+        </p:spPr>
+        <p:txBody>
+          <a:bodyPr wrap="square" rtlCol="0">
+            <a:spAutoFit/>
+          </a:bodyPr>
+          <a:lstStyle/>
+          <a:p>
+            <a:pPr algn="ctr"/>
+            <a:r>
+              <a:rPr lang="en-US" altLang="ja-JP" sz="2000" dirty="0"/>
+              <a:t>c</a:t>
+            </a:r>
+            <a:r>
+              <a:rPr kumimoji="1" lang="en-US" altLang="ja-JP" sz="2000" dirty="0" smtClean="0"/>
+              <a:t>3</a:t>
+            </a:r>
+            <a:endParaRPr kumimoji="1" lang="ja-JP" altLang="en-US" sz="2000" dirty="0"/>
+          </a:p>
+        </p:txBody>
+      </p:sp>
+      <p:sp>
+        <p:nvSpPr>
+          <p:cNvPr id="24" name="正方形/長方形 23"/>
+          <p:cNvSpPr/>
+          <p:nvPr/>
+        </p:nvSpPr>
+        <p:spPr>
+          <a:xfrm>
+            <a:off x="878168" y="5232791"/>
+            <a:ext cx="247336" cy="727023"/>
+          </a:xfrm>
+          <a:prstGeom prst="rect">
+            <a:avLst/>
+          </a:prstGeom>
+          <a:solidFill>
+            <a:srgbClr val="00B0F0">
+              <a:alpha val="40000"/>
+            </a:srgbClr>
+          </a:solidFill>
+          <a:ln w="25400">
+            <a:solidFill>
+              <a:srgbClr val="0070C0"/>
+            </a:solidFill>
+          </a:ln>
+        </p:spPr>
+        <p:style>
+          <a:lnRef idx="2">
+            <a:schemeClr val="accent1">
+              <a:shade val="50000"/>
+            </a:schemeClr>
+          </a:lnRef>
+          <a:fillRef idx="1">
+            <a:schemeClr val="accent1"/>
+          </a:fillRef>
+          <a:effectRef idx="0">
+            <a:schemeClr val="accent1"/>
+          </a:effectRef>
+          <a:fontRef idx="minor">
+            <a:schemeClr val="lt1"/>
+          </a:fontRef>
+        </p:style>
+        <p:txBody>
+          <a:bodyPr rtlCol="0" anchor="ctr"/>
+          <a:lstStyle/>
+          <a:p>
+            <a:pPr algn="ctr"/>
+            <a:endParaRPr kumimoji="1" lang="ja-JP" altLang="en-US"/>
+          </a:p>
+        </p:txBody>
+      </p:sp>
+      <p:sp>
+        <p:nvSpPr>
+          <p:cNvPr id="25" name="正方形/長方形 24"/>
+          <p:cNvSpPr/>
+          <p:nvPr/>
+        </p:nvSpPr>
+        <p:spPr>
+          <a:xfrm>
+            <a:off x="1600195" y="5232790"/>
+            <a:ext cx="247336" cy="727023"/>
+          </a:xfrm>
+          <a:prstGeom prst="rect">
+            <a:avLst/>
+          </a:prstGeom>
+          <a:solidFill>
+            <a:srgbClr val="00B0F0">
+              <a:alpha val="40000"/>
+            </a:srgbClr>
+          </a:solidFill>
+          <a:ln w="25400">
+            <a:solidFill>
+              <a:srgbClr val="0070C0"/>
+            </a:solidFill>
+          </a:ln>
+        </p:spPr>
+        <p:style>
+          <a:lnRef idx="2">
+            <a:schemeClr val="accent1">
+              <a:shade val="50000"/>
+            </a:schemeClr>
+          </a:lnRef>
+          <a:fillRef idx="1">
+            <a:schemeClr val="accent1"/>
+          </a:fillRef>
+          <a:effectRef idx="0">
+            <a:schemeClr val="accent1"/>
+          </a:effectRef>
+          <a:fontRef idx="minor">
+            <a:schemeClr val="lt1"/>
+          </a:fontRef>
+        </p:style>
+        <p:txBody>
+          <a:bodyPr rtlCol="0" anchor="ctr"/>
+          <a:lstStyle/>
+          <a:p>
+            <a:pPr algn="ctr"/>
+            <a:endParaRPr kumimoji="1" lang="ja-JP" altLang="en-US"/>
+          </a:p>
+        </p:txBody>
+      </p:sp>
+      <p:sp>
+        <p:nvSpPr>
+          <p:cNvPr id="26" name="正方形/長方形 25"/>
+          <p:cNvSpPr/>
+          <p:nvPr/>
+        </p:nvSpPr>
+        <p:spPr>
+          <a:xfrm>
+            <a:off x="2322222" y="5232790"/>
+            <a:ext cx="247336" cy="727023"/>
+          </a:xfrm>
+          <a:prstGeom prst="rect">
+            <a:avLst/>
+          </a:prstGeom>
+          <a:solidFill>
+            <a:srgbClr val="00B0F0">
+              <a:alpha val="40000"/>
+            </a:srgbClr>
+          </a:solidFill>
+          <a:ln w="25400">
+            <a:solidFill>
+              <a:srgbClr val="0070C0"/>
+            </a:solidFill>
+          </a:ln>
+        </p:spPr>
+        <p:style>
+          <a:lnRef idx="2">
+            <a:schemeClr val="accent1">
+              <a:shade val="50000"/>
+            </a:schemeClr>
+          </a:lnRef>
+          <a:fillRef idx="1">
+            <a:schemeClr val="accent1"/>
+          </a:fillRef>
+          <a:effectRef idx="0">
+            <a:schemeClr val="accent1"/>
+          </a:effectRef>
+          <a:fontRef idx="minor">
+            <a:schemeClr val="lt1"/>
+          </a:fontRef>
+        </p:style>
+        <p:txBody>
+          <a:bodyPr rtlCol="0" anchor="ctr"/>
+          <a:lstStyle/>
+          <a:p>
+            <a:pPr algn="ctr"/>
+            <a:endParaRPr kumimoji="1" lang="ja-JP" altLang="en-US"/>
+          </a:p>
+        </p:txBody>
+      </p:sp>
+      <p:sp>
+        <p:nvSpPr>
+          <p:cNvPr id="27" name="テキスト ボックス 26"/>
+          <p:cNvSpPr txBox="1"/>
+          <p:nvPr/>
+        </p:nvSpPr>
+        <p:spPr>
+          <a:xfrm>
+            <a:off x="2884351" y="5958466"/>
+            <a:ext cx="517161" cy="400110"/>
+          </a:xfrm>
+          <a:prstGeom prst="rect">
+            <a:avLst/>
+          </a:prstGeom>
+          <a:noFill/>
+        </p:spPr>
+        <p:txBody>
+          <a:bodyPr wrap="square" rtlCol="0">
+            <a:spAutoFit/>
+          </a:bodyPr>
+          <a:lstStyle/>
+          <a:p>
+            <a:pPr algn="ctr"/>
+            <a:r>
+              <a:rPr lang="en-US" altLang="ja-JP" sz="2000" dirty="0"/>
+              <a:t>c</a:t>
+            </a:r>
+            <a:r>
+              <a:rPr kumimoji="1" lang="en-US" altLang="ja-JP" sz="2000" dirty="0" smtClean="0"/>
+              <a:t>4</a:t>
+            </a:r>
+            <a:endParaRPr kumimoji="1" lang="ja-JP" altLang="en-US" sz="2000" dirty="0"/>
+          </a:p>
+        </p:txBody>
+      </p:sp>
+      <p:sp>
+        <p:nvSpPr>
+          <p:cNvPr id="28" name="テキスト ボックス 27"/>
+          <p:cNvSpPr txBox="1"/>
+          <p:nvPr/>
+        </p:nvSpPr>
+        <p:spPr>
+          <a:xfrm>
+            <a:off x="3606378" y="5953841"/>
+            <a:ext cx="517161" cy="400110"/>
+          </a:xfrm>
+          <a:prstGeom prst="rect">
+            <a:avLst/>
+          </a:prstGeom>
+          <a:noFill/>
+        </p:spPr>
+        <p:txBody>
+          <a:bodyPr wrap="square" rtlCol="0">
+            <a:spAutoFit/>
+          </a:bodyPr>
+          <a:lstStyle/>
+          <a:p>
+            <a:pPr algn="ctr"/>
+            <a:r>
+              <a:rPr lang="en-US" altLang="ja-JP" sz="2000" dirty="0"/>
+              <a:t>c</a:t>
+            </a:r>
+            <a:r>
+              <a:rPr kumimoji="1" lang="en-US" altLang="ja-JP" sz="2000" dirty="0" smtClean="0"/>
+              <a:t>5</a:t>
+            </a:r>
+            <a:endParaRPr kumimoji="1" lang="ja-JP" altLang="en-US" sz="2000" dirty="0"/>
+          </a:p>
+        </p:txBody>
+      </p:sp>
+      <p:sp>
+        <p:nvSpPr>
+          <p:cNvPr id="29" name="正方形/長方形 28"/>
+          <p:cNvSpPr/>
+          <p:nvPr/>
+        </p:nvSpPr>
+        <p:spPr>
+          <a:xfrm>
+            <a:off x="3019264" y="5232790"/>
+            <a:ext cx="247336" cy="727023"/>
+          </a:xfrm>
+          <a:prstGeom prst="rect">
+            <a:avLst/>
+          </a:prstGeom>
+          <a:solidFill>
+            <a:srgbClr val="00B0F0">
+              <a:alpha val="40000"/>
+            </a:srgbClr>
+          </a:solidFill>
+          <a:ln w="25400">
+            <a:solidFill>
+              <a:srgbClr val="0070C0"/>
+            </a:solidFill>
+          </a:ln>
+        </p:spPr>
+        <p:style>
+          <a:lnRef idx="2">
+            <a:schemeClr val="accent1">
+              <a:shade val="50000"/>
+            </a:schemeClr>
+          </a:lnRef>
+          <a:fillRef idx="1">
+            <a:schemeClr val="accent1"/>
+          </a:fillRef>
+          <a:effectRef idx="0">
+            <a:schemeClr val="accent1"/>
+          </a:effectRef>
+          <a:fontRef idx="minor">
+            <a:schemeClr val="lt1"/>
+          </a:fontRef>
+        </p:style>
+        <p:txBody>
+          <a:bodyPr rtlCol="0" anchor="ctr"/>
+          <a:lstStyle/>
+          <a:p>
+            <a:pPr algn="ctr"/>
+            <a:endParaRPr kumimoji="1" lang="ja-JP" altLang="en-US"/>
+          </a:p>
+        </p:txBody>
+      </p:sp>
+      <p:sp>
+        <p:nvSpPr>
+          <p:cNvPr id="30" name="正方形/長方形 29"/>
+          <p:cNvSpPr/>
+          <p:nvPr/>
+        </p:nvSpPr>
+        <p:spPr>
+          <a:xfrm>
+            <a:off x="3741291" y="5232790"/>
+            <a:ext cx="247336" cy="727023"/>
+          </a:xfrm>
+          <a:prstGeom prst="rect">
+            <a:avLst/>
+          </a:prstGeom>
+          <a:solidFill>
+            <a:srgbClr val="00B0F0">
+              <a:alpha val="40000"/>
+            </a:srgbClr>
+          </a:solidFill>
+          <a:ln w="25400">
+            <a:solidFill>
+              <a:srgbClr val="0070C0"/>
+            </a:solidFill>
+          </a:ln>
+        </p:spPr>
+        <p:style>
+          <a:lnRef idx="2">
+            <a:schemeClr val="accent1">
+              <a:shade val="50000"/>
+            </a:schemeClr>
+          </a:lnRef>
+          <a:fillRef idx="1">
+            <a:schemeClr val="accent1"/>
+          </a:fillRef>
+          <a:effectRef idx="0">
+            <a:schemeClr val="accent1"/>
+          </a:effectRef>
+          <a:fontRef idx="minor">
+            <a:schemeClr val="lt1"/>
+          </a:fontRef>
+        </p:style>
+        <p:txBody>
+          <a:bodyPr rtlCol="0" anchor="ctr"/>
+          <a:lstStyle/>
+          <a:p>
+            <a:pPr algn="ctr"/>
+            <a:endParaRPr kumimoji="1" lang="ja-JP" altLang="en-US"/>
+          </a:p>
+        </p:txBody>
+      </p:sp>
+      <p:sp>
+        <p:nvSpPr>
+          <p:cNvPr id="31" name="テキスト ボックス 30"/>
+          <p:cNvSpPr txBox="1"/>
+          <p:nvPr/>
+        </p:nvSpPr>
+        <p:spPr>
+          <a:xfrm>
+            <a:off x="379745" y="1740502"/>
+            <a:ext cx="469683" cy="400110"/>
+          </a:xfrm>
+          <a:prstGeom prst="rect">
+            <a:avLst/>
+          </a:prstGeom>
+          <a:noFill/>
+        </p:spPr>
+        <p:txBody>
+          <a:bodyPr wrap="square" rtlCol="0">
+            <a:spAutoFit/>
+          </a:bodyPr>
+          <a:lstStyle/>
+          <a:p>
+            <a:pPr algn="ctr"/>
+            <a:r>
+              <a:rPr kumimoji="1" lang="en-US" altLang="ja-JP" sz="2000" dirty="0" smtClean="0"/>
+              <a:t>20</a:t>
+            </a:r>
+            <a:endParaRPr kumimoji="1" lang="ja-JP" altLang="en-US" sz="2000" dirty="0"/>
+          </a:p>
+        </p:txBody>
+      </p:sp>
+      <p:sp>
+        <p:nvSpPr>
+          <p:cNvPr id="32" name="テキスト ボックス 31"/>
+          <p:cNvSpPr txBox="1"/>
+          <p:nvPr/>
+        </p:nvSpPr>
+        <p:spPr>
+          <a:xfrm>
+            <a:off x="393485" y="3592630"/>
+            <a:ext cx="469683" cy="400110"/>
+          </a:xfrm>
+          <a:prstGeom prst="rect">
+            <a:avLst/>
+          </a:prstGeom>
+          <a:noFill/>
+        </p:spPr>
+        <p:txBody>
+          <a:bodyPr wrap="square" rtlCol="0">
+            <a:spAutoFit/>
+          </a:bodyPr>
+          <a:lstStyle/>
+          <a:p>
+            <a:pPr algn="ctr"/>
+            <a:r>
+              <a:rPr kumimoji="1" lang="en-US" altLang="ja-JP" sz="2000" dirty="0" smtClean="0"/>
+              <a:t>20</a:t>
+            </a:r>
+            <a:endParaRPr kumimoji="1" lang="ja-JP" altLang="en-US" sz="2000" dirty="0"/>
+          </a:p>
+        </p:txBody>
+      </p:sp>
+      <p:sp>
+        <p:nvSpPr>
+          <p:cNvPr id="33" name="テキスト ボックス 32"/>
+          <p:cNvSpPr txBox="1"/>
+          <p:nvPr/>
+        </p:nvSpPr>
+        <p:spPr>
+          <a:xfrm>
+            <a:off x="408485" y="5392293"/>
+            <a:ext cx="469683" cy="400110"/>
+          </a:xfrm>
+          <a:prstGeom prst="rect">
+            <a:avLst/>
+          </a:prstGeom>
+          <a:noFill/>
+        </p:spPr>
+        <p:txBody>
+          <a:bodyPr wrap="square" rtlCol="0">
+            <a:spAutoFit/>
+          </a:bodyPr>
+          <a:lstStyle/>
+          <a:p>
+            <a:pPr algn="ctr"/>
+            <a:r>
+              <a:rPr kumimoji="1" lang="en-US" altLang="ja-JP" sz="2000" dirty="0" smtClean="0"/>
+              <a:t>20</a:t>
+            </a:r>
+            <a:endParaRPr kumimoji="1" lang="ja-JP" altLang="en-US" sz="2000" dirty="0"/>
+          </a:p>
+        </p:txBody>
+      </p:sp>
+      <p:sp>
+        <p:nvSpPr>
+          <p:cNvPr id="36" name="右矢印 35"/>
+          <p:cNvSpPr/>
+          <p:nvPr/>
+        </p:nvSpPr>
+        <p:spPr>
+          <a:xfrm>
+            <a:off x="878168" y="1141655"/>
+            <a:ext cx="1655179" cy="254833"/>
+          </a:xfrm>
+          <a:prstGeom prst="rightArrow">
+            <a:avLst/>
+          </a:prstGeom>
+          <a:solidFill>
+            <a:srgbClr val="FFC000">
+              <a:alpha val="40000"/>
+            </a:srgbClr>
+          </a:solidFill>
+          <a:ln w="25400">
+            <a:solidFill>
+              <a:srgbClr val="FF0000"/>
+            </a:solidFill>
+          </a:ln>
+        </p:spPr>
+        <p:style>
+          <a:lnRef idx="2">
+            <a:schemeClr val="accent1">
+              <a:shade val="50000"/>
+            </a:schemeClr>
+          </a:lnRef>
+          <a:fillRef idx="1">
+            <a:schemeClr val="accent1"/>
+          </a:fillRef>
+          <a:effectRef idx="0">
+            <a:schemeClr val="accent1"/>
+          </a:effectRef>
+          <a:fontRef idx="minor">
+            <a:schemeClr val="lt1"/>
+          </a:fontRef>
+        </p:style>
+        <p:txBody>
+          <a:bodyPr rtlCol="0" anchor="ctr"/>
+          <a:lstStyle/>
+          <a:p>
+            <a:pPr algn="ctr"/>
+            <a:endParaRPr kumimoji="1" lang="ja-JP" altLang="en-US"/>
+          </a:p>
+        </p:txBody>
+      </p:sp>
+      <p:sp>
+        <p:nvSpPr>
+          <p:cNvPr id="39" name="テキスト ボックス 38"/>
+          <p:cNvSpPr txBox="1"/>
+          <p:nvPr/>
+        </p:nvSpPr>
+        <p:spPr>
+          <a:xfrm>
+            <a:off x="1308817" y="793835"/>
+            <a:ext cx="782625" cy="400110"/>
+          </a:xfrm>
+          <a:prstGeom prst="rect">
+            <a:avLst/>
+          </a:prstGeom>
+          <a:noFill/>
+        </p:spPr>
+        <p:txBody>
+          <a:bodyPr wrap="square" rtlCol="0">
+            <a:spAutoFit/>
+          </a:bodyPr>
+          <a:lstStyle/>
+          <a:p>
+            <a:pPr algn="ctr"/>
+            <a:r>
+              <a:rPr kumimoji="1" lang="en-US" altLang="ja-JP" sz="2000" dirty="0" smtClean="0"/>
+              <a:t>LSTM</a:t>
+            </a:r>
+            <a:endParaRPr kumimoji="1" lang="ja-JP" altLang="en-US" sz="2000" dirty="0"/>
+          </a:p>
+        </p:txBody>
+      </p:sp>
+      <p:sp>
+        <p:nvSpPr>
+          <p:cNvPr id="40" name="右矢印 39"/>
+          <p:cNvSpPr/>
+          <p:nvPr/>
+        </p:nvSpPr>
+        <p:spPr>
+          <a:xfrm>
+            <a:off x="863168" y="3092892"/>
+            <a:ext cx="960631" cy="254833"/>
+          </a:xfrm>
+          <a:prstGeom prst="rightArrow">
+            <a:avLst/>
+          </a:prstGeom>
+          <a:solidFill>
+            <a:srgbClr val="FFC000">
+              <a:alpha val="40000"/>
+            </a:srgbClr>
+          </a:solidFill>
+          <a:ln w="25400">
+            <a:solidFill>
+              <a:srgbClr val="FF0000"/>
+            </a:solidFill>
+          </a:ln>
+        </p:spPr>
+        <p:style>
+          <a:lnRef idx="2">
+            <a:schemeClr val="accent1">
+              <a:shade val="50000"/>
+            </a:schemeClr>
+          </a:lnRef>
+          <a:fillRef idx="1">
+            <a:schemeClr val="accent1"/>
+          </a:fillRef>
+          <a:effectRef idx="0">
+            <a:schemeClr val="accent1"/>
+          </a:effectRef>
+          <a:fontRef idx="minor">
+            <a:schemeClr val="lt1"/>
+          </a:fontRef>
+        </p:style>
+        <p:txBody>
+          <a:bodyPr rtlCol="0" anchor="ctr"/>
+          <a:lstStyle/>
+          <a:p>
+            <a:pPr algn="ctr"/>
+            <a:endParaRPr kumimoji="1" lang="ja-JP" altLang="en-US"/>
+          </a:p>
+        </p:txBody>
+      </p:sp>
+      <p:sp>
+        <p:nvSpPr>
+          <p:cNvPr id="42" name="テキスト ボックス 41"/>
+          <p:cNvSpPr txBox="1"/>
+          <p:nvPr/>
+        </p:nvSpPr>
+        <p:spPr>
+          <a:xfrm>
+            <a:off x="942485" y="2747957"/>
+            <a:ext cx="782625" cy="400110"/>
+          </a:xfrm>
+          <a:prstGeom prst="rect">
+            <a:avLst/>
+          </a:prstGeom>
+          <a:noFill/>
+        </p:spPr>
+        <p:txBody>
+          <a:bodyPr wrap="square" rtlCol="0">
+            <a:spAutoFit/>
+          </a:bodyPr>
+          <a:lstStyle/>
+          <a:p>
+            <a:pPr algn="ctr"/>
+            <a:r>
+              <a:rPr kumimoji="1" lang="en-US" altLang="ja-JP" sz="2000" dirty="0" smtClean="0"/>
+              <a:t>LSTM</a:t>
+            </a:r>
+            <a:endParaRPr kumimoji="1" lang="ja-JP" altLang="en-US" sz="2000" dirty="0"/>
+          </a:p>
+        </p:txBody>
+      </p:sp>
+      <p:sp>
+        <p:nvSpPr>
+          <p:cNvPr id="43" name="右矢印 42"/>
+          <p:cNvSpPr/>
+          <p:nvPr/>
+        </p:nvSpPr>
+        <p:spPr>
+          <a:xfrm>
+            <a:off x="897520" y="4858782"/>
+            <a:ext cx="3091107" cy="254833"/>
+          </a:xfrm>
+          <a:prstGeom prst="rightArrow">
+            <a:avLst/>
+          </a:prstGeom>
+          <a:solidFill>
+            <a:srgbClr val="FFC000">
+              <a:alpha val="40000"/>
+            </a:srgbClr>
+          </a:solidFill>
+          <a:ln w="25400">
+            <a:solidFill>
+              <a:srgbClr val="FF0000"/>
+            </a:solidFill>
+          </a:ln>
+        </p:spPr>
+        <p:style>
+          <a:lnRef idx="2">
+            <a:schemeClr val="accent1">
+              <a:shade val="50000"/>
+            </a:schemeClr>
+          </a:lnRef>
+          <a:fillRef idx="1">
+            <a:schemeClr val="accent1"/>
+          </a:fillRef>
+          <a:effectRef idx="0">
+            <a:schemeClr val="accent1"/>
+          </a:effectRef>
+          <a:fontRef idx="minor">
+            <a:schemeClr val="lt1"/>
+          </a:fontRef>
+        </p:style>
+        <p:txBody>
+          <a:bodyPr rtlCol="0" anchor="ctr"/>
+          <a:lstStyle/>
+          <a:p>
+            <a:pPr algn="ctr"/>
+            <a:endParaRPr kumimoji="1" lang="ja-JP" altLang="en-US"/>
+          </a:p>
+        </p:txBody>
+      </p:sp>
+      <p:sp>
+        <p:nvSpPr>
+          <p:cNvPr id="44" name="テキスト ボックス 43"/>
+          <p:cNvSpPr txBox="1"/>
+          <p:nvPr/>
+        </p:nvSpPr>
+        <p:spPr>
+          <a:xfrm>
+            <a:off x="2025209" y="4510962"/>
+            <a:ext cx="859140" cy="400110"/>
+          </a:xfrm>
+          <a:prstGeom prst="rect">
+            <a:avLst/>
+          </a:prstGeom>
+          <a:noFill/>
+        </p:spPr>
+        <p:txBody>
+          <a:bodyPr wrap="square" rtlCol="0">
+            <a:spAutoFit/>
+          </a:bodyPr>
+          <a:lstStyle/>
+          <a:p>
+            <a:pPr algn="ctr"/>
+            <a:r>
+              <a:rPr kumimoji="1" lang="en-US" altLang="ja-JP" sz="2000" dirty="0" smtClean="0"/>
+              <a:t>LSTM</a:t>
+            </a:r>
+            <a:endParaRPr kumimoji="1" lang="ja-JP" altLang="en-US" sz="2000" dirty="0"/>
+          </a:p>
+        </p:txBody>
+      </p:sp>
+    </p:spTree>
+    <p:extLst>
+      <p:ext uri="{BB962C8B-B14F-4D97-AF65-F5344CB8AC3E}">
+        <p14:creationId xmlns:p14="http://schemas.microsoft.com/office/powerpoint/2010/main" val="234671897"/>
+      </p:ext>
+    </p:extLst>
+  </p:cSld>
+  <p:clrMapOvr>
+    <a:masterClrMapping/>
+  </p:clrMapOvr>
+  <p:timing>
+    <p:tnLst>
+      <p:par>
+        <p:cTn id="1" dur="indefinite" restart="never" nodeType="tmRoot"/>
+      </p:par>
+    </p:tnLst>
+  </p:timing>
+</p:sld>
+</file>
+
 <file path=ppt/tags/tag1.xml><?xml version="1.0" encoding="utf-8"?>
 <p:tagLst xmlns:a="http://schemas.openxmlformats.org/drawingml/2006/main" xmlns:r="http://schemas.openxmlformats.org/officeDocument/2006/relationships" xmlns:p="http://schemas.openxmlformats.org/presentationml/2006/main">
   <p:tag name="ORIGINALHEIGHT" val="123.7346"/>
@@ -6330,4 +8909,265 @@
     </a:ext>
   </a:extLst>
 </a:theme>
+</file>
+
+<file path=ppt/theme/theme2.xml><?xml version="1.0" encoding="utf-8"?>
+<a:theme xmlns:a="http://schemas.openxmlformats.org/drawingml/2006/main" name="Office テーマ">
+  <a:themeElements>
+    <a:clrScheme name="Office">
+      <a:dk1>
+        <a:sysClr val="windowText" lastClr="000000"/>
+      </a:dk1>
+      <a:lt1>
+        <a:sysClr val="window" lastClr="FFFFFF"/>
+      </a:lt1>
+      <a:dk2>
+        <a:srgbClr val="44546A"/>
+      </a:dk2>
+      <a:lt2>
+        <a:srgbClr val="E7E6E6"/>
+      </a:lt2>
+      <a:accent1>
+        <a:srgbClr val="5B9BD5"/>
+      </a:accent1>
+      <a:accent2>
+        <a:srgbClr val="ED7D31"/>
+      </a:accent2>
+      <a:accent3>
+        <a:srgbClr val="A5A5A5"/>
+      </a:accent3>
+      <a:accent4>
+        <a:srgbClr val="FFC000"/>
+      </a:accent4>
+      <a:accent5>
+        <a:srgbClr val="4472C4"/>
+      </a:accent5>
+      <a:accent6>
+        <a:srgbClr val="70AD47"/>
+      </a:accent6>
+      <a:hlink>
+        <a:srgbClr val="0563C1"/>
+      </a:hlink>
+      <a:folHlink>
+        <a:srgbClr val="954F72"/>
+      </a:folHlink>
+    </a:clrScheme>
+    <a:fontScheme name="Office">
+      <a:majorFont>
+        <a:latin typeface="游ゴシック Light" panose="020F0302020204030204"/>
+        <a:ea typeface=""/>
+        <a:cs typeface=""/>
+        <a:font script="Jpan" typeface="游ゴシック Light"/>
+        <a:font script="Hang" typeface="맑은 고딕"/>
+        <a:font script="Hans" typeface="等线 Light"/>
+        <a:font script="Hant" typeface="新細明體"/>
+        <a:font script="Arab" typeface="Times New Roman"/>
+        <a:font script="Hebr" typeface="Times New Roman"/>
+        <a:font script="Thai" typeface="Angsana New"/>
+        <a:font script="Ethi" typeface="Nyala"/>
+        <a:font script="Beng" typeface="Vrinda"/>
+        <a:font script="Gujr" typeface="Shruti"/>
+        <a:font script="Khmr" typeface="MoolBoran"/>
+        <a:font script="Knda" typeface="Tunga"/>
+        <a:font script="Guru" typeface="Raavi"/>
+        <a:font script="Cans" typeface="Euphemia"/>
+        <a:font script="Cher" typeface="Plantagenet Cherokee"/>
+        <a:font script="Yiii" typeface="Microsoft Yi Baiti"/>
+        <a:font script="Tibt" typeface="Microsoft Himalaya"/>
+        <a:font script="Thaa" typeface="MV Boli"/>
+        <a:font script="Deva" typeface="Mangal"/>
+        <a:font script="Telu" typeface="Gautami"/>
+        <a:font script="Taml" typeface="Latha"/>
+        <a:font script="Syrc" typeface="Estrangelo Edessa"/>
+        <a:font script="Orya" typeface="Kalinga"/>
+        <a:font script="Mlym" typeface="Kartika"/>
+        <a:font script="Laoo" typeface="DokChampa"/>
+        <a:font script="Sinh" typeface="Iskoola Pota"/>
+        <a:font script="Mong" typeface="Mongolian Baiti"/>
+        <a:font script="Viet" typeface="Times New Roman"/>
+        <a:font script="Uigh" typeface="Microsoft Uighur"/>
+        <a:font script="Geor" typeface="Sylfaen"/>
+      </a:majorFont>
+      <a:minorFont>
+        <a:latin typeface="游ゴシック" panose="020F0502020204030204"/>
+        <a:ea typeface=""/>
+        <a:cs typeface=""/>
+        <a:font script="Jpan" typeface="游ゴシック"/>
+        <a:font script="Hang" typeface="맑은 고딕"/>
+        <a:font script="Hans" typeface="等线"/>
+        <a:font script="Hant" typeface="新細明體"/>
+        <a:font script="Arab" typeface="Arial"/>
+        <a:font script="Hebr" typeface="Arial"/>
+        <a:font script="Thai" typeface="Cordia New"/>
+        <a:font script="Ethi" typeface="Nyala"/>
+        <a:font script="Beng" typeface="Vrinda"/>
+        <a:font script="Gujr" typeface="Shruti"/>
+        <a:font script="Khmr" typeface="DaunPenh"/>
+        <a:font script="Knda" typeface="Tunga"/>
+        <a:font script="Guru" typeface="Raavi"/>
+        <a:font script="Cans" typeface="Euphemia"/>
+        <a:font script="Cher" typeface="Plantagenet Cherokee"/>
+        <a:font script="Yiii" typeface="Microsoft Yi Baiti"/>
+        <a:font script="Tibt" typeface="Microsoft Himalaya"/>
+        <a:font script="Thaa" typeface="MV Boli"/>
+        <a:font script="Deva" typeface="Mangal"/>
+        <a:font script="Telu" typeface="Gautami"/>
+        <a:font script="Taml" typeface="Latha"/>
+        <a:font script="Syrc" typeface="Estrangelo Edessa"/>
+        <a:font script="Orya" typeface="Kalinga"/>
+        <a:font script="Mlym" typeface="Kartika"/>
+        <a:font script="Laoo" typeface="DokChampa"/>
+        <a:font script="Sinh" typeface="Iskoola Pota"/>
+        <a:font script="Mong" typeface="Mongolian Baiti"/>
+        <a:font script="Viet" typeface="Arial"/>
+        <a:font script="Uigh" typeface="Microsoft Uighur"/>
+        <a:font script="Geor" typeface="Sylfaen"/>
+      </a:minorFont>
+    </a:fontScheme>
+    <a:fmtScheme name="Office">
+      <a:fillStyleLst>
+        <a:solidFill>
+          <a:schemeClr val="phClr"/>
+        </a:solidFill>
+        <a:gradFill rotWithShape="1">
+          <a:gsLst>
+            <a:gs pos="0">
+              <a:schemeClr val="phClr">
+                <a:lumMod val="110000"/>
+                <a:satMod val="105000"/>
+                <a:tint val="67000"/>
+              </a:schemeClr>
+            </a:gs>
+            <a:gs pos="50000">
+              <a:schemeClr val="phClr">
+                <a:lumMod val="105000"/>
+                <a:satMod val="103000"/>
+                <a:tint val="73000"/>
+              </a:schemeClr>
+            </a:gs>
+            <a:gs pos="100000">
+              <a:schemeClr val="phClr">
+                <a:lumMod val="105000"/>
+                <a:satMod val="109000"/>
+                <a:tint val="81000"/>
+              </a:schemeClr>
+            </a:gs>
+          </a:gsLst>
+          <a:lin ang="5400000" scaled="0"/>
+        </a:gradFill>
+        <a:gradFill rotWithShape="1">
+          <a:gsLst>
+            <a:gs pos="0">
+              <a:schemeClr val="phClr">
+                <a:satMod val="103000"/>
+                <a:lumMod val="102000"/>
+                <a:tint val="94000"/>
+              </a:schemeClr>
+            </a:gs>
+            <a:gs pos="50000">
+              <a:schemeClr val="phClr">
+                <a:satMod val="110000"/>
+                <a:lumMod val="100000"/>
+                <a:shade val="100000"/>
+              </a:schemeClr>
+            </a:gs>
+            <a:gs pos="100000">
+              <a:schemeClr val="phClr">
+                <a:lumMod val="99000"/>
+                <a:satMod val="120000"/>
+                <a:shade val="78000"/>
+              </a:schemeClr>
+            </a:gs>
+          </a:gsLst>
+          <a:lin ang="5400000" scaled="0"/>
+        </a:gradFill>
+      </a:fillStyleLst>
+      <a:lnStyleLst>
+        <a:ln w="6350" cap="flat" cmpd="sng" algn="ctr">
+          <a:solidFill>
+            <a:schemeClr val="phClr"/>
+          </a:solidFill>
+          <a:prstDash val="solid"/>
+          <a:miter lim="800000"/>
+        </a:ln>
+        <a:ln w="12700" cap="flat" cmpd="sng" algn="ctr">
+          <a:solidFill>
+            <a:schemeClr val="phClr"/>
+          </a:solidFill>
+          <a:prstDash val="solid"/>
+          <a:miter lim="800000"/>
+        </a:ln>
+        <a:ln w="19050" cap="flat" cmpd="sng" algn="ctr">
+          <a:solidFill>
+            <a:schemeClr val="phClr"/>
+          </a:solidFill>
+          <a:prstDash val="solid"/>
+          <a:miter lim="800000"/>
+        </a:ln>
+      </a:lnStyleLst>
+      <a:effectStyleLst>
+        <a:effectStyle>
+          <a:effectLst/>
+        </a:effectStyle>
+        <a:effectStyle>
+          <a:effectLst/>
+        </a:effectStyle>
+        <a:effectStyle>
+          <a:effectLst>
+            <a:outerShdw blurRad="57150" dist="19050" dir="5400000" algn="ctr" rotWithShape="0">
+              <a:srgbClr val="000000">
+                <a:alpha val="63000"/>
+              </a:srgbClr>
+            </a:outerShdw>
+          </a:effectLst>
+        </a:effectStyle>
+      </a:effectStyleLst>
+      <a:bgFillStyleLst>
+        <a:solidFill>
+          <a:schemeClr val="phClr"/>
+        </a:solidFill>
+        <a:solidFill>
+          <a:schemeClr val="phClr">
+            <a:tint val="95000"/>
+            <a:satMod val="170000"/>
+          </a:schemeClr>
+        </a:solidFill>
+        <a:gradFill rotWithShape="1">
+          <a:gsLst>
+            <a:gs pos="0">
+              <a:schemeClr val="phClr">
+                <a:tint val="93000"/>
+                <a:satMod val="150000"/>
+                <a:shade val="98000"/>
+                <a:lumMod val="102000"/>
+              </a:schemeClr>
+            </a:gs>
+            <a:gs pos="50000">
+              <a:schemeClr val="phClr">
+                <a:tint val="98000"/>
+                <a:satMod val="130000"/>
+                <a:shade val="90000"/>
+                <a:lumMod val="103000"/>
+              </a:schemeClr>
+            </a:gs>
+            <a:gs pos="100000">
+              <a:schemeClr val="phClr">
+                <a:shade val="63000"/>
+                <a:satMod val="120000"/>
+              </a:schemeClr>
+            </a:gs>
+          </a:gsLst>
+          <a:lin ang="5400000" scaled="0"/>
+        </a:gradFill>
+      </a:bgFillStyleLst>
+    </a:fmtScheme>
+  </a:themeElements>
+  <a:objectDefaults/>
+  <a:extraClrSchemeLst/>
+  <a:extLst>
+    <a:ext uri="{05A4C25C-085E-4340-85A3-A5531E510DB2}">
+      <thm15:themeFamily xmlns:thm15="http://schemas.microsoft.com/office/thememl/2012/main" name="Office Theme" id="{62F939B6-93AF-4DB8-9C6B-D6C7DFDC589F}" vid="{4A3C46E8-61CC-4603-A589-7422A47A8E4A}"/>
+    </a:ext>
+  </a:extLst>
+</a:theme>
 </file>
</xml_diff>

<commit_message>
build based on 99f3281
</commit_message>
<xml_diff>
--- a/latest/assets/figures.pptx
+++ b/latest/assets/figures.pptx
@@ -7421,7 +7421,7 @@
         <p:spPr>
           <a:xfrm>
             <a:off x="714518" y="2303394"/>
-            <a:ext cx="517161" cy="400110"/>
+            <a:ext cx="517161" cy="369332"/>
           </a:xfrm>
           <a:prstGeom prst="rect">
             <a:avLst/>
@@ -7436,14 +7436,14 @@
           <a:p>
             <a:pPr algn="ctr"/>
             <a:r>
-              <a:rPr lang="en-US" altLang="ja-JP" sz="2000" dirty="0"/>
+              <a:rPr lang="en-US" altLang="ja-JP" dirty="0"/>
               <a:t>a</a:t>
             </a:r>
             <a:r>
-              <a:rPr kumimoji="1" lang="en-US" altLang="ja-JP" sz="2000" dirty="0" smtClean="0"/>
+              <a:rPr kumimoji="1" lang="en-US" altLang="ja-JP" dirty="0" smtClean="0"/>
               <a:t>1</a:t>
             </a:r>
-            <a:endParaRPr kumimoji="1" lang="ja-JP" altLang="en-US" sz="2000" dirty="0"/>
+            <a:endParaRPr kumimoji="1" lang="ja-JP" altLang="en-US" dirty="0"/>
           </a:p>
         </p:txBody>
       </p:sp>
@@ -7456,7 +7456,7 @@
         <p:spPr>
           <a:xfrm>
             <a:off x="1441550" y="2303394"/>
-            <a:ext cx="517161" cy="400110"/>
+            <a:ext cx="517161" cy="369332"/>
           </a:xfrm>
           <a:prstGeom prst="rect">
             <a:avLst/>
@@ -7471,14 +7471,14 @@
           <a:p>
             <a:pPr algn="ctr"/>
             <a:r>
-              <a:rPr lang="en-US" altLang="ja-JP" sz="2000" dirty="0"/>
+              <a:rPr lang="en-US" altLang="ja-JP" dirty="0"/>
               <a:t>a</a:t>
             </a:r>
             <a:r>
-              <a:rPr kumimoji="1" lang="en-US" altLang="ja-JP" sz="2000" dirty="0" smtClean="0"/>
+              <a:rPr kumimoji="1" lang="en-US" altLang="ja-JP" dirty="0" smtClean="0"/>
               <a:t>2</a:t>
             </a:r>
-            <a:endParaRPr kumimoji="1" lang="ja-JP" altLang="en-US" sz="2000" dirty="0"/>
+            <a:endParaRPr kumimoji="1" lang="ja-JP" altLang="en-US" dirty="0"/>
           </a:p>
         </p:txBody>
       </p:sp>
@@ -7491,7 +7491,7 @@
         <p:spPr>
           <a:xfrm>
             <a:off x="2163577" y="2298769"/>
-            <a:ext cx="517161" cy="400110"/>
+            <a:ext cx="517161" cy="369332"/>
           </a:xfrm>
           <a:prstGeom prst="rect">
             <a:avLst/>
@@ -7506,14 +7506,14 @@
           <a:p>
             <a:pPr algn="ctr"/>
             <a:r>
-              <a:rPr lang="en-US" altLang="ja-JP" sz="2000" dirty="0"/>
+              <a:rPr lang="en-US" altLang="ja-JP" dirty="0"/>
               <a:t>a</a:t>
             </a:r>
             <a:r>
-              <a:rPr kumimoji="1" lang="en-US" altLang="ja-JP" sz="2000" dirty="0" smtClean="0"/>
+              <a:rPr kumimoji="1" lang="en-US" altLang="ja-JP" dirty="0" smtClean="0"/>
               <a:t>3</a:t>
             </a:r>
-            <a:endParaRPr kumimoji="1" lang="ja-JP" altLang="en-US" sz="2000" dirty="0"/>
+            <a:endParaRPr kumimoji="1" lang="ja-JP" altLang="en-US" dirty="0"/>
           </a:p>
         </p:txBody>
       </p:sp>
@@ -7526,7 +7526,7 @@
         <p:spPr>
           <a:xfrm>
             <a:off x="728265" y="4156197"/>
-            <a:ext cx="517161" cy="400110"/>
+            <a:ext cx="517161" cy="369332"/>
           </a:xfrm>
           <a:prstGeom prst="rect">
             <a:avLst/>
@@ -7541,14 +7541,14 @@
           <a:p>
             <a:pPr algn="ctr"/>
             <a:r>
-              <a:rPr lang="en-US" altLang="ja-JP" sz="2000" dirty="0"/>
+              <a:rPr lang="en-US" altLang="ja-JP" dirty="0"/>
               <a:t>b</a:t>
             </a:r>
             <a:r>
-              <a:rPr kumimoji="1" lang="en-US" altLang="ja-JP" sz="2000" dirty="0" smtClean="0"/>
+              <a:rPr kumimoji="1" lang="en-US" altLang="ja-JP" dirty="0" smtClean="0"/>
               <a:t>1</a:t>
             </a:r>
-            <a:endParaRPr kumimoji="1" lang="ja-JP" altLang="en-US" sz="2000" dirty="0"/>
+            <a:endParaRPr kumimoji="1" lang="ja-JP" altLang="en-US" dirty="0"/>
           </a:p>
         </p:txBody>
       </p:sp>
@@ -7761,7 +7761,7 @@
         <p:spPr>
           <a:xfrm>
             <a:off x="1441550" y="4154850"/>
-            <a:ext cx="517161" cy="400110"/>
+            <a:ext cx="517161" cy="369332"/>
           </a:xfrm>
           <a:prstGeom prst="rect">
             <a:avLst/>
@@ -7776,14 +7776,14 @@
           <a:p>
             <a:pPr algn="ctr"/>
             <a:r>
-              <a:rPr lang="en-US" altLang="ja-JP" sz="2000" dirty="0"/>
+              <a:rPr lang="en-US" altLang="ja-JP" dirty="0"/>
               <a:t>b</a:t>
             </a:r>
             <a:r>
-              <a:rPr kumimoji="1" lang="en-US" altLang="ja-JP" sz="2000" dirty="0" smtClean="0"/>
+              <a:rPr kumimoji="1" lang="en-US" altLang="ja-JP" dirty="0" smtClean="0"/>
               <a:t>2</a:t>
             </a:r>
-            <a:endParaRPr kumimoji="1" lang="ja-JP" altLang="en-US" sz="2000" dirty="0"/>
+            <a:endParaRPr kumimoji="1" lang="ja-JP" altLang="en-US" dirty="0"/>
           </a:p>
         </p:txBody>
       </p:sp>
@@ -7846,7 +7846,7 @@
         <p:spPr>
           <a:xfrm>
             <a:off x="738250" y="5958466"/>
-            <a:ext cx="517161" cy="400110"/>
+            <a:ext cx="517161" cy="369332"/>
           </a:xfrm>
           <a:prstGeom prst="rect">
             <a:avLst/>
@@ -7861,14 +7861,14 @@
           <a:p>
             <a:pPr algn="ctr"/>
             <a:r>
-              <a:rPr lang="en-US" altLang="ja-JP" sz="2000" dirty="0"/>
+              <a:rPr lang="en-US" altLang="ja-JP" dirty="0"/>
               <a:t>c</a:t>
             </a:r>
             <a:r>
-              <a:rPr kumimoji="1" lang="en-US" altLang="ja-JP" sz="2000" dirty="0" smtClean="0"/>
+              <a:rPr kumimoji="1" lang="en-US" altLang="ja-JP" dirty="0" smtClean="0"/>
               <a:t>1</a:t>
             </a:r>
-            <a:endParaRPr kumimoji="1" lang="ja-JP" altLang="en-US" sz="2000" dirty="0"/>
+            <a:endParaRPr kumimoji="1" lang="ja-JP" altLang="en-US" dirty="0"/>
           </a:p>
         </p:txBody>
       </p:sp>
@@ -7881,7 +7881,7 @@
         <p:spPr>
           <a:xfrm>
             <a:off x="1465282" y="5958466"/>
-            <a:ext cx="517161" cy="400110"/>
+            <a:ext cx="517161" cy="369332"/>
           </a:xfrm>
           <a:prstGeom prst="rect">
             <a:avLst/>
@@ -7896,14 +7896,14 @@
           <a:p>
             <a:pPr algn="ctr"/>
             <a:r>
-              <a:rPr lang="en-US" altLang="ja-JP" sz="2000" dirty="0"/>
+              <a:rPr lang="en-US" altLang="ja-JP" dirty="0"/>
               <a:t>c</a:t>
             </a:r>
             <a:r>
-              <a:rPr kumimoji="1" lang="en-US" altLang="ja-JP" sz="2000" dirty="0" smtClean="0"/>
+              <a:rPr kumimoji="1" lang="en-US" altLang="ja-JP" dirty="0" smtClean="0"/>
               <a:t>2</a:t>
             </a:r>
-            <a:endParaRPr kumimoji="1" lang="ja-JP" altLang="en-US" sz="2000" dirty="0"/>
+            <a:endParaRPr kumimoji="1" lang="ja-JP" altLang="en-US" dirty="0"/>
           </a:p>
         </p:txBody>
       </p:sp>
@@ -7916,7 +7916,7 @@
         <p:spPr>
           <a:xfrm>
             <a:off x="2187309" y="5953841"/>
-            <a:ext cx="517161" cy="400110"/>
+            <a:ext cx="517161" cy="369332"/>
           </a:xfrm>
           <a:prstGeom prst="rect">
             <a:avLst/>
@@ -7931,14 +7931,14 @@
           <a:p>
             <a:pPr algn="ctr"/>
             <a:r>
-              <a:rPr lang="en-US" altLang="ja-JP" sz="2000" dirty="0"/>
+              <a:rPr lang="en-US" altLang="ja-JP" dirty="0"/>
               <a:t>c</a:t>
             </a:r>
             <a:r>
-              <a:rPr kumimoji="1" lang="en-US" altLang="ja-JP" sz="2000" dirty="0" smtClean="0"/>
+              <a:rPr kumimoji="1" lang="en-US" altLang="ja-JP" dirty="0" smtClean="0"/>
               <a:t>3</a:t>
             </a:r>
-            <a:endParaRPr kumimoji="1" lang="ja-JP" altLang="en-US" sz="2000" dirty="0"/>
+            <a:endParaRPr kumimoji="1" lang="ja-JP" altLang="en-US" dirty="0"/>
           </a:p>
         </p:txBody>
       </p:sp>
@@ -8101,7 +8101,7 @@
         <p:spPr>
           <a:xfrm>
             <a:off x="2884351" y="5958466"/>
-            <a:ext cx="517161" cy="400110"/>
+            <a:ext cx="517161" cy="369332"/>
           </a:xfrm>
           <a:prstGeom prst="rect">
             <a:avLst/>
@@ -8116,14 +8116,14 @@
           <a:p>
             <a:pPr algn="ctr"/>
             <a:r>
-              <a:rPr lang="en-US" altLang="ja-JP" sz="2000" dirty="0"/>
+              <a:rPr lang="en-US" altLang="ja-JP" dirty="0"/>
               <a:t>c</a:t>
             </a:r>
             <a:r>
-              <a:rPr kumimoji="1" lang="en-US" altLang="ja-JP" sz="2000" dirty="0" smtClean="0"/>
+              <a:rPr kumimoji="1" lang="en-US" altLang="ja-JP" dirty="0" smtClean="0"/>
               <a:t>4</a:t>
             </a:r>
-            <a:endParaRPr kumimoji="1" lang="ja-JP" altLang="en-US" sz="2000" dirty="0"/>
+            <a:endParaRPr kumimoji="1" lang="ja-JP" altLang="en-US" dirty="0"/>
           </a:p>
         </p:txBody>
       </p:sp>
@@ -8136,7 +8136,7 @@
         <p:spPr>
           <a:xfrm>
             <a:off x="3606378" y="5953841"/>
-            <a:ext cx="517161" cy="400110"/>
+            <a:ext cx="517161" cy="369332"/>
           </a:xfrm>
           <a:prstGeom prst="rect">
             <a:avLst/>
@@ -8151,14 +8151,14 @@
           <a:p>
             <a:pPr algn="ctr"/>
             <a:r>
-              <a:rPr lang="en-US" altLang="ja-JP" sz="2000" dirty="0"/>
+              <a:rPr lang="en-US" altLang="ja-JP" dirty="0"/>
               <a:t>c</a:t>
             </a:r>
             <a:r>
-              <a:rPr kumimoji="1" lang="en-US" altLang="ja-JP" sz="2000" dirty="0" smtClean="0"/>
+              <a:rPr kumimoji="1" lang="en-US" altLang="ja-JP" dirty="0" smtClean="0"/>
               <a:t>5</a:t>
             </a:r>
-            <a:endParaRPr kumimoji="1" lang="ja-JP" altLang="en-US" sz="2000" dirty="0"/>
+            <a:endParaRPr kumimoji="1" lang="ja-JP" altLang="en-US" dirty="0"/>
           </a:p>
         </p:txBody>
       </p:sp>
@@ -8271,7 +8271,7 @@
         <p:spPr>
           <a:xfrm>
             <a:off x="379745" y="1740502"/>
-            <a:ext cx="469683" cy="400110"/>
+            <a:ext cx="469683" cy="369332"/>
           </a:xfrm>
           <a:prstGeom prst="rect">
             <a:avLst/>
@@ -8286,10 +8286,10 @@
           <a:p>
             <a:pPr algn="ctr"/>
             <a:r>
-              <a:rPr kumimoji="1" lang="en-US" altLang="ja-JP" sz="2000" dirty="0" smtClean="0"/>
+              <a:rPr kumimoji="1" lang="en-US" altLang="ja-JP" dirty="0" smtClean="0"/>
               <a:t>20</a:t>
             </a:r>
-            <a:endParaRPr kumimoji="1" lang="ja-JP" altLang="en-US" sz="2000" dirty="0"/>
+            <a:endParaRPr kumimoji="1" lang="ja-JP" altLang="en-US" dirty="0"/>
           </a:p>
         </p:txBody>
       </p:sp>
@@ -8302,7 +8302,7 @@
         <p:spPr>
           <a:xfrm>
             <a:off x="393485" y="3592630"/>
-            <a:ext cx="469683" cy="400110"/>
+            <a:ext cx="469683" cy="369332"/>
           </a:xfrm>
           <a:prstGeom prst="rect">
             <a:avLst/>
@@ -8317,10 +8317,10 @@
           <a:p>
             <a:pPr algn="ctr"/>
             <a:r>
-              <a:rPr kumimoji="1" lang="en-US" altLang="ja-JP" sz="2000" dirty="0" smtClean="0"/>
+              <a:rPr kumimoji="1" lang="en-US" altLang="ja-JP" dirty="0" smtClean="0"/>
               <a:t>20</a:t>
             </a:r>
-            <a:endParaRPr kumimoji="1" lang="ja-JP" altLang="en-US" sz="2000" dirty="0"/>
+            <a:endParaRPr kumimoji="1" lang="ja-JP" altLang="en-US" dirty="0"/>
           </a:p>
         </p:txBody>
       </p:sp>
@@ -8333,7 +8333,7 @@
         <p:spPr>
           <a:xfrm>
             <a:off x="408485" y="5392293"/>
-            <a:ext cx="469683" cy="400110"/>
+            <a:ext cx="469683" cy="369332"/>
           </a:xfrm>
           <a:prstGeom prst="rect">
             <a:avLst/>
@@ -8348,10 +8348,10 @@
           <a:p>
             <a:pPr algn="ctr"/>
             <a:r>
-              <a:rPr kumimoji="1" lang="en-US" altLang="ja-JP" sz="2000" dirty="0" smtClean="0"/>
+              <a:rPr kumimoji="1" lang="en-US" altLang="ja-JP" dirty="0" smtClean="0"/>
               <a:t>20</a:t>
             </a:r>
-            <a:endParaRPr kumimoji="1" lang="ja-JP" altLang="en-US" sz="2000" dirty="0"/>
+            <a:endParaRPr kumimoji="1" lang="ja-JP" altLang="en-US" dirty="0"/>
           </a:p>
         </p:txBody>
       </p:sp>
@@ -8363,7 +8363,7 @@
         </p:nvSpPr>
         <p:spPr>
           <a:xfrm>
-            <a:off x="878168" y="1141655"/>
+            <a:off x="878168" y="1201615"/>
             <a:ext cx="1655179" cy="254833"/>
           </a:xfrm>
           <a:prstGeom prst="rightArrow">
@@ -8413,8 +8413,8 @@
         </p:nvSpPr>
         <p:spPr>
           <a:xfrm>
-            <a:off x="1308817" y="793835"/>
-            <a:ext cx="782625" cy="400110"/>
+            <a:off x="1308817" y="891270"/>
+            <a:ext cx="782625" cy="369332"/>
           </a:xfrm>
           <a:prstGeom prst="rect">
             <a:avLst/>
@@ -8429,10 +8429,10 @@
           <a:p>
             <a:pPr algn="ctr"/>
             <a:r>
-              <a:rPr kumimoji="1" lang="en-US" altLang="ja-JP" sz="2000" dirty="0" smtClean="0"/>
+              <a:rPr kumimoji="1" lang="en-US" altLang="ja-JP" dirty="0" smtClean="0"/>
               <a:t>LSTM</a:t>
             </a:r>
-            <a:endParaRPr kumimoji="1" lang="ja-JP" altLang="en-US" sz="2000" dirty="0"/>
+            <a:endParaRPr kumimoji="1" lang="ja-JP" altLang="en-US" dirty="0"/>
           </a:p>
         </p:txBody>
       </p:sp>
@@ -8444,7 +8444,7 @@
         </p:nvSpPr>
         <p:spPr>
           <a:xfrm>
-            <a:off x="863168" y="3092892"/>
+            <a:off x="863168" y="3071503"/>
             <a:ext cx="960631" cy="254833"/>
           </a:xfrm>
           <a:prstGeom prst="rightArrow">
@@ -8494,8 +8494,8 @@
         </p:nvSpPr>
         <p:spPr>
           <a:xfrm>
-            <a:off x="942485" y="2747957"/>
-            <a:ext cx="782625" cy="400110"/>
+            <a:off x="942485" y="2764043"/>
+            <a:ext cx="782625" cy="369332"/>
           </a:xfrm>
           <a:prstGeom prst="rect">
             <a:avLst/>
@@ -8510,10 +8510,10 @@
           <a:p>
             <a:pPr algn="ctr"/>
             <a:r>
-              <a:rPr kumimoji="1" lang="en-US" altLang="ja-JP" sz="2000" dirty="0" smtClean="0"/>
+              <a:rPr kumimoji="1" lang="en-US" altLang="ja-JP" dirty="0" smtClean="0"/>
               <a:t>LSTM</a:t>
             </a:r>
-            <a:endParaRPr kumimoji="1" lang="ja-JP" altLang="en-US" sz="2000" dirty="0"/>
+            <a:endParaRPr kumimoji="1" lang="ja-JP" altLang="en-US" dirty="0"/>
           </a:p>
         </p:txBody>
       </p:sp>
@@ -8525,7 +8525,7 @@
         </p:nvSpPr>
         <p:spPr>
           <a:xfrm>
-            <a:off x="897520" y="4858782"/>
+            <a:off x="897520" y="4865567"/>
             <a:ext cx="3091107" cy="254833"/>
           </a:xfrm>
           <a:prstGeom prst="rightArrow">
@@ -8575,8 +8575,8 @@
         </p:nvSpPr>
         <p:spPr>
           <a:xfrm>
-            <a:off x="2025209" y="4510962"/>
-            <a:ext cx="859140" cy="400110"/>
+            <a:off x="2025209" y="4555222"/>
+            <a:ext cx="859140" cy="369332"/>
           </a:xfrm>
           <a:prstGeom prst="rect">
             <a:avLst/>
@@ -8591,10 +8591,10 @@
           <a:p>
             <a:pPr algn="ctr"/>
             <a:r>
-              <a:rPr kumimoji="1" lang="en-US" altLang="ja-JP" sz="2000" dirty="0" smtClean="0"/>
+              <a:rPr kumimoji="1" lang="en-US" altLang="ja-JP" dirty="0" smtClean="0"/>
               <a:t>LSTM</a:t>
             </a:r>
-            <a:endParaRPr kumimoji="1" lang="ja-JP" altLang="en-US" sz="2000" dirty="0"/>
+            <a:endParaRPr kumimoji="1" lang="ja-JP" altLang="en-US" dirty="0"/>
           </a:p>
         </p:txBody>
       </p:sp>

</xml_diff>